<commit_message>
jupyter notebooks: Updates after video creation
</commit_message>
<xml_diff>
--- a/presentations/SimCenter Bootcamp Python.pptx
+++ b/presentations/SimCenter Bootcamp Python.pptx
@@ -4,38 +4,50 @@
   <p:sldMasterIdLst>
     <p:sldMasterId id="2147483648" r:id="rId1"/>
   </p:sldMasterIdLst>
+  <p:notesMasterIdLst>
+    <p:notesMasterId r:id="rId42"/>
+  </p:notesMasterIdLst>
   <p:sldIdLst>
     <p:sldId id="258" r:id="rId2"/>
-    <p:sldId id="256" r:id="rId3"/>
-    <p:sldId id="279" r:id="rId4"/>
-    <p:sldId id="277" r:id="rId5"/>
-    <p:sldId id="259" r:id="rId6"/>
-    <p:sldId id="283" r:id="rId7"/>
-    <p:sldId id="284" r:id="rId8"/>
-    <p:sldId id="281" r:id="rId9"/>
-    <p:sldId id="282" r:id="rId10"/>
-    <p:sldId id="263" r:id="rId11"/>
-    <p:sldId id="278" r:id="rId12"/>
-    <p:sldId id="280" r:id="rId13"/>
-    <p:sldId id="260" r:id="rId14"/>
-    <p:sldId id="261" r:id="rId15"/>
-    <p:sldId id="262" r:id="rId16"/>
-    <p:sldId id="264" r:id="rId17"/>
-    <p:sldId id="285" r:id="rId18"/>
-    <p:sldId id="286" r:id="rId19"/>
-    <p:sldId id="265" r:id="rId20"/>
-    <p:sldId id="266" r:id="rId21"/>
-    <p:sldId id="267" r:id="rId22"/>
-    <p:sldId id="268" r:id="rId23"/>
-    <p:sldId id="269" r:id="rId24"/>
-    <p:sldId id="270" r:id="rId25"/>
-    <p:sldId id="271" r:id="rId26"/>
-    <p:sldId id="272" r:id="rId27"/>
-    <p:sldId id="273" r:id="rId28"/>
-    <p:sldId id="274" r:id="rId29"/>
-    <p:sldId id="275" r:id="rId30"/>
-    <p:sldId id="276" r:id="rId31"/>
-    <p:sldId id="257" r:id="rId32"/>
+    <p:sldId id="289" r:id="rId3"/>
+    <p:sldId id="256" r:id="rId4"/>
+    <p:sldId id="279" r:id="rId5"/>
+    <p:sldId id="294" r:id="rId6"/>
+    <p:sldId id="277" r:id="rId7"/>
+    <p:sldId id="259" r:id="rId8"/>
+    <p:sldId id="283" r:id="rId9"/>
+    <p:sldId id="284" r:id="rId10"/>
+    <p:sldId id="281" r:id="rId11"/>
+    <p:sldId id="282" r:id="rId12"/>
+    <p:sldId id="263" r:id="rId13"/>
+    <p:sldId id="297" r:id="rId14"/>
+    <p:sldId id="278" r:id="rId15"/>
+    <p:sldId id="301" r:id="rId16"/>
+    <p:sldId id="299" r:id="rId17"/>
+    <p:sldId id="300" r:id="rId18"/>
+    <p:sldId id="280" r:id="rId19"/>
+    <p:sldId id="298" r:id="rId20"/>
+    <p:sldId id="302" r:id="rId21"/>
+    <p:sldId id="260" r:id="rId22"/>
+    <p:sldId id="261" r:id="rId23"/>
+    <p:sldId id="295" r:id="rId24"/>
+    <p:sldId id="296" r:id="rId25"/>
+    <p:sldId id="262" r:id="rId26"/>
+    <p:sldId id="264" r:id="rId27"/>
+    <p:sldId id="285" r:id="rId28"/>
+    <p:sldId id="286" r:id="rId29"/>
+    <p:sldId id="265" r:id="rId30"/>
+    <p:sldId id="267" r:id="rId31"/>
+    <p:sldId id="268" r:id="rId32"/>
+    <p:sldId id="269" r:id="rId33"/>
+    <p:sldId id="288" r:id="rId34"/>
+    <p:sldId id="287" r:id="rId35"/>
+    <p:sldId id="293" r:id="rId36"/>
+    <p:sldId id="266" r:id="rId37"/>
+    <p:sldId id="290" r:id="rId38"/>
+    <p:sldId id="291" r:id="rId39"/>
+    <p:sldId id="292" r:id="rId40"/>
+    <p:sldId id="257" r:id="rId41"/>
   </p:sldIdLst>
   <p:sldSz cx="12192000" cy="6858000"/>
   <p:notesSz cx="6858000" cy="9144000"/>
@@ -134,7 +146,613 @@
       </a:defRPr>
     </a:lvl9pPr>
   </p:defaultTextStyle>
+  <p:extLst>
+    <p:ext uri="{EFAFB233-063F-42B5-8137-9DF3F51BA10A}">
+      <p15:sldGuideLst xmlns:p15="http://schemas.microsoft.com/office/powerpoint/2012/main"/>
+    </p:ext>
+  </p:extLst>
 </p:presentation>
+</file>
+
+<file path=ppt/notesMasters/notesMaster1.xml><?xml version="1.0" encoding="utf-8"?>
+<p:notesMaster xmlns:a="http://schemas.openxmlformats.org/drawingml/2006/main" xmlns:r="http://schemas.openxmlformats.org/officeDocument/2006/relationships" xmlns:p="http://schemas.openxmlformats.org/presentationml/2006/main">
+  <p:cSld>
+    <p:bg>
+      <p:bgRef idx="1001">
+        <a:schemeClr val="bg1"/>
+      </p:bgRef>
+    </p:bg>
+    <p:spTree>
+      <p:nvGrpSpPr>
+        <p:cNvPr id="1" name=""/>
+        <p:cNvGrpSpPr/>
+        <p:nvPr/>
+      </p:nvGrpSpPr>
+      <p:grpSpPr>
+        <a:xfrm>
+          <a:off x="0" y="0"/>
+          <a:ext cx="0" cy="0"/>
+          <a:chOff x="0" y="0"/>
+          <a:chExt cx="0" cy="0"/>
+        </a:xfrm>
+      </p:grpSpPr>
+      <p:sp>
+        <p:nvSpPr>
+          <p:cNvPr id="2" name="Header Placeholder 1"/>
+          <p:cNvSpPr>
+            <a:spLocks noGrp="1"/>
+          </p:cNvSpPr>
+          <p:nvPr>
+            <p:ph type="hdr" sz="quarter"/>
+          </p:nvPr>
+        </p:nvSpPr>
+        <p:spPr>
+          <a:xfrm>
+            <a:off x="0" y="0"/>
+            <a:ext cx="2971800" cy="458788"/>
+          </a:xfrm>
+          <a:prstGeom prst="rect">
+            <a:avLst/>
+          </a:prstGeom>
+        </p:spPr>
+        <p:txBody>
+          <a:bodyPr vert="horz" lIns="91440" tIns="45720" rIns="91440" bIns="45720" rtlCol="0"/>
+          <a:lstStyle>
+            <a:lvl1pPr algn="l">
+              <a:defRPr sz="1200"/>
+            </a:lvl1pPr>
+          </a:lstStyle>
+          <a:p>
+            <a:endParaRPr lang="en-US"/>
+          </a:p>
+        </p:txBody>
+      </p:sp>
+      <p:sp>
+        <p:nvSpPr>
+          <p:cNvPr id="3" name="Date Placeholder 2"/>
+          <p:cNvSpPr>
+            <a:spLocks noGrp="1"/>
+          </p:cNvSpPr>
+          <p:nvPr>
+            <p:ph type="dt" idx="1"/>
+          </p:nvPr>
+        </p:nvSpPr>
+        <p:spPr>
+          <a:xfrm>
+            <a:off x="3884613" y="0"/>
+            <a:ext cx="2971800" cy="458788"/>
+          </a:xfrm>
+          <a:prstGeom prst="rect">
+            <a:avLst/>
+          </a:prstGeom>
+        </p:spPr>
+        <p:txBody>
+          <a:bodyPr vert="horz" lIns="91440" tIns="45720" rIns="91440" bIns="45720" rtlCol="0"/>
+          <a:lstStyle>
+            <a:lvl1pPr algn="r">
+              <a:defRPr sz="1200"/>
+            </a:lvl1pPr>
+          </a:lstStyle>
+          <a:p>
+            <a:fld id="{78564C73-550F-E844-8071-9805E57FCA85}" type="datetimeFigureOut">
+              <a:rPr lang="en-US" smtClean="0"/>
+              <a:t>8/8/20</a:t>
+            </a:fld>
+            <a:endParaRPr lang="en-US"/>
+          </a:p>
+        </p:txBody>
+      </p:sp>
+      <p:sp>
+        <p:nvSpPr>
+          <p:cNvPr id="4" name="Slide Image Placeholder 3"/>
+          <p:cNvSpPr>
+            <a:spLocks noGrp="1" noRot="1" noChangeAspect="1"/>
+          </p:cNvSpPr>
+          <p:nvPr>
+            <p:ph type="sldImg" idx="2"/>
+          </p:nvPr>
+        </p:nvSpPr>
+        <p:spPr>
+          <a:xfrm>
+            <a:off x="685800" y="1143000"/>
+            <a:ext cx="5486400" cy="3086100"/>
+          </a:xfrm>
+          <a:prstGeom prst="rect">
+            <a:avLst/>
+          </a:prstGeom>
+          <a:noFill/>
+          <a:ln w="12700">
+            <a:solidFill>
+              <a:prstClr val="black"/>
+            </a:solidFill>
+          </a:ln>
+        </p:spPr>
+        <p:txBody>
+          <a:bodyPr vert="horz" lIns="91440" tIns="45720" rIns="91440" bIns="45720" rtlCol="0" anchor="ctr"/>
+          <a:lstStyle/>
+          <a:p>
+            <a:endParaRPr lang="en-US"/>
+          </a:p>
+        </p:txBody>
+      </p:sp>
+      <p:sp>
+        <p:nvSpPr>
+          <p:cNvPr id="5" name="Notes Placeholder 4"/>
+          <p:cNvSpPr>
+            <a:spLocks noGrp="1"/>
+          </p:cNvSpPr>
+          <p:nvPr>
+            <p:ph type="body" sz="quarter" idx="3"/>
+          </p:nvPr>
+        </p:nvSpPr>
+        <p:spPr>
+          <a:xfrm>
+            <a:off x="685800" y="4400550"/>
+            <a:ext cx="5486400" cy="3600450"/>
+          </a:xfrm>
+          <a:prstGeom prst="rect">
+            <a:avLst/>
+          </a:prstGeom>
+        </p:spPr>
+        <p:txBody>
+          <a:bodyPr vert="horz" lIns="91440" tIns="45720" rIns="91440" bIns="45720" rtlCol="0"/>
+          <a:lstStyle/>
+          <a:p>
+            <a:pPr lvl="0"/>
+            <a:r>
+              <a:rPr lang="en-US"/>
+              <a:t>Click to edit Master text styles</a:t>
+            </a:r>
+          </a:p>
+          <a:p>
+            <a:pPr lvl="1"/>
+            <a:r>
+              <a:rPr lang="en-US"/>
+              <a:t>Second level</a:t>
+            </a:r>
+          </a:p>
+          <a:p>
+            <a:pPr lvl="2"/>
+            <a:r>
+              <a:rPr lang="en-US"/>
+              <a:t>Third level</a:t>
+            </a:r>
+          </a:p>
+          <a:p>
+            <a:pPr lvl="3"/>
+            <a:r>
+              <a:rPr lang="en-US"/>
+              <a:t>Fourth level</a:t>
+            </a:r>
+          </a:p>
+          <a:p>
+            <a:pPr lvl="4"/>
+            <a:r>
+              <a:rPr lang="en-US"/>
+              <a:t>Fifth level</a:t>
+            </a:r>
+          </a:p>
+        </p:txBody>
+      </p:sp>
+      <p:sp>
+        <p:nvSpPr>
+          <p:cNvPr id="6" name="Footer Placeholder 5"/>
+          <p:cNvSpPr>
+            <a:spLocks noGrp="1"/>
+          </p:cNvSpPr>
+          <p:nvPr>
+            <p:ph type="ftr" sz="quarter" idx="4"/>
+          </p:nvPr>
+        </p:nvSpPr>
+        <p:spPr>
+          <a:xfrm>
+            <a:off x="0" y="8685213"/>
+            <a:ext cx="2971800" cy="458787"/>
+          </a:xfrm>
+          <a:prstGeom prst="rect">
+            <a:avLst/>
+          </a:prstGeom>
+        </p:spPr>
+        <p:txBody>
+          <a:bodyPr vert="horz" lIns="91440" tIns="45720" rIns="91440" bIns="45720" rtlCol="0" anchor="b"/>
+          <a:lstStyle>
+            <a:lvl1pPr algn="l">
+              <a:defRPr sz="1200"/>
+            </a:lvl1pPr>
+          </a:lstStyle>
+          <a:p>
+            <a:endParaRPr lang="en-US"/>
+          </a:p>
+        </p:txBody>
+      </p:sp>
+      <p:sp>
+        <p:nvSpPr>
+          <p:cNvPr id="7" name="Slide Number Placeholder 6"/>
+          <p:cNvSpPr>
+            <a:spLocks noGrp="1"/>
+          </p:cNvSpPr>
+          <p:nvPr>
+            <p:ph type="sldNum" sz="quarter" idx="5"/>
+          </p:nvPr>
+        </p:nvSpPr>
+        <p:spPr>
+          <a:xfrm>
+            <a:off x="3884613" y="8685213"/>
+            <a:ext cx="2971800" cy="458787"/>
+          </a:xfrm>
+          <a:prstGeom prst="rect">
+            <a:avLst/>
+          </a:prstGeom>
+        </p:spPr>
+        <p:txBody>
+          <a:bodyPr vert="horz" lIns="91440" tIns="45720" rIns="91440" bIns="45720" rtlCol="0" anchor="b"/>
+          <a:lstStyle>
+            <a:lvl1pPr algn="r">
+              <a:defRPr sz="1200"/>
+            </a:lvl1pPr>
+          </a:lstStyle>
+          <a:p>
+            <a:fld id="{3B463E9D-4916-634A-A75C-91C197995E34}" type="slidenum">
+              <a:rPr lang="en-US" smtClean="0"/>
+              <a:t>‹#›</a:t>
+            </a:fld>
+            <a:endParaRPr lang="en-US"/>
+          </a:p>
+        </p:txBody>
+      </p:sp>
+    </p:spTree>
+    <p:extLst>
+      <p:ext uri="{BB962C8B-B14F-4D97-AF65-F5344CB8AC3E}">
+        <p14:creationId xmlns:p14="http://schemas.microsoft.com/office/powerpoint/2010/main" val="1011143479"/>
+      </p:ext>
+    </p:extLst>
+  </p:cSld>
+  <p:clrMap bg1="lt1" tx1="dk1" bg2="lt2" tx2="dk2" accent1="accent1" accent2="accent2" accent3="accent3" accent4="accent4" accent5="accent5" accent6="accent6" hlink="hlink" folHlink="folHlink"/>
+  <p:notesStyle>
+    <a:lvl1pPr marL="0" algn="l" defTabSz="914400" rtl="0" eaLnBrk="1" latinLnBrk="0" hangingPunct="1">
+      <a:defRPr sz="1200" kern="1200">
+        <a:solidFill>
+          <a:schemeClr val="tx1"/>
+        </a:solidFill>
+        <a:latin typeface="+mn-lt"/>
+        <a:ea typeface="+mn-ea"/>
+        <a:cs typeface="+mn-cs"/>
+      </a:defRPr>
+    </a:lvl1pPr>
+    <a:lvl2pPr marL="457200" algn="l" defTabSz="914400" rtl="0" eaLnBrk="1" latinLnBrk="0" hangingPunct="1">
+      <a:defRPr sz="1200" kern="1200">
+        <a:solidFill>
+          <a:schemeClr val="tx1"/>
+        </a:solidFill>
+        <a:latin typeface="+mn-lt"/>
+        <a:ea typeface="+mn-ea"/>
+        <a:cs typeface="+mn-cs"/>
+      </a:defRPr>
+    </a:lvl2pPr>
+    <a:lvl3pPr marL="914400" algn="l" defTabSz="914400" rtl="0" eaLnBrk="1" latinLnBrk="0" hangingPunct="1">
+      <a:defRPr sz="1200" kern="1200">
+        <a:solidFill>
+          <a:schemeClr val="tx1"/>
+        </a:solidFill>
+        <a:latin typeface="+mn-lt"/>
+        <a:ea typeface="+mn-ea"/>
+        <a:cs typeface="+mn-cs"/>
+      </a:defRPr>
+    </a:lvl3pPr>
+    <a:lvl4pPr marL="1371600" algn="l" defTabSz="914400" rtl="0" eaLnBrk="1" latinLnBrk="0" hangingPunct="1">
+      <a:defRPr sz="1200" kern="1200">
+        <a:solidFill>
+          <a:schemeClr val="tx1"/>
+        </a:solidFill>
+        <a:latin typeface="+mn-lt"/>
+        <a:ea typeface="+mn-ea"/>
+        <a:cs typeface="+mn-cs"/>
+      </a:defRPr>
+    </a:lvl4pPr>
+    <a:lvl5pPr marL="1828800" algn="l" defTabSz="914400" rtl="0" eaLnBrk="1" latinLnBrk="0" hangingPunct="1">
+      <a:defRPr sz="1200" kern="1200">
+        <a:solidFill>
+          <a:schemeClr val="tx1"/>
+        </a:solidFill>
+        <a:latin typeface="+mn-lt"/>
+        <a:ea typeface="+mn-ea"/>
+        <a:cs typeface="+mn-cs"/>
+      </a:defRPr>
+    </a:lvl5pPr>
+    <a:lvl6pPr marL="2286000" algn="l" defTabSz="914400" rtl="0" eaLnBrk="1" latinLnBrk="0" hangingPunct="1">
+      <a:defRPr sz="1200" kern="1200">
+        <a:solidFill>
+          <a:schemeClr val="tx1"/>
+        </a:solidFill>
+        <a:latin typeface="+mn-lt"/>
+        <a:ea typeface="+mn-ea"/>
+        <a:cs typeface="+mn-cs"/>
+      </a:defRPr>
+    </a:lvl6pPr>
+    <a:lvl7pPr marL="2743200" algn="l" defTabSz="914400" rtl="0" eaLnBrk="1" latinLnBrk="0" hangingPunct="1">
+      <a:defRPr sz="1200" kern="1200">
+        <a:solidFill>
+          <a:schemeClr val="tx1"/>
+        </a:solidFill>
+        <a:latin typeface="+mn-lt"/>
+        <a:ea typeface="+mn-ea"/>
+        <a:cs typeface="+mn-cs"/>
+      </a:defRPr>
+    </a:lvl7pPr>
+    <a:lvl8pPr marL="3200400" algn="l" defTabSz="914400" rtl="0" eaLnBrk="1" latinLnBrk="0" hangingPunct="1">
+      <a:defRPr sz="1200" kern="1200">
+        <a:solidFill>
+          <a:schemeClr val="tx1"/>
+        </a:solidFill>
+        <a:latin typeface="+mn-lt"/>
+        <a:ea typeface="+mn-ea"/>
+        <a:cs typeface="+mn-cs"/>
+      </a:defRPr>
+    </a:lvl8pPr>
+    <a:lvl9pPr marL="3657600" algn="l" defTabSz="914400" rtl="0" eaLnBrk="1" latinLnBrk="0" hangingPunct="1">
+      <a:defRPr sz="1200" kern="1200">
+        <a:solidFill>
+          <a:schemeClr val="tx1"/>
+        </a:solidFill>
+        <a:latin typeface="+mn-lt"/>
+        <a:ea typeface="+mn-ea"/>
+        <a:cs typeface="+mn-cs"/>
+      </a:defRPr>
+    </a:lvl9pPr>
+  </p:notesStyle>
+</p:notesMaster>
+</file>
+
+<file path=ppt/notesSlides/notesSlide1.xml><?xml version="1.0" encoding="utf-8"?>
+<p:notes xmlns:a="http://schemas.openxmlformats.org/drawingml/2006/main" xmlns:r="http://schemas.openxmlformats.org/officeDocument/2006/relationships" xmlns:p="http://schemas.openxmlformats.org/presentationml/2006/main">
+  <p:cSld>
+    <p:spTree>
+      <p:nvGrpSpPr>
+        <p:cNvPr id="1" name=""/>
+        <p:cNvGrpSpPr/>
+        <p:nvPr/>
+      </p:nvGrpSpPr>
+      <p:grpSpPr>
+        <a:xfrm>
+          <a:off x="0" y="0"/>
+          <a:ext cx="0" cy="0"/>
+          <a:chOff x="0" y="0"/>
+          <a:chExt cx="0" cy="0"/>
+        </a:xfrm>
+      </p:grpSpPr>
+      <p:sp>
+        <p:nvSpPr>
+          <p:cNvPr id="2" name="Slide Image Placeholder 1"/>
+          <p:cNvSpPr>
+            <a:spLocks noGrp="1" noRot="1" noChangeAspect="1"/>
+          </p:cNvSpPr>
+          <p:nvPr>
+            <p:ph type="sldImg"/>
+          </p:nvPr>
+        </p:nvSpPr>
+        <p:spPr/>
+      </p:sp>
+      <p:sp>
+        <p:nvSpPr>
+          <p:cNvPr id="3" name="Notes Placeholder 2"/>
+          <p:cNvSpPr>
+            <a:spLocks noGrp="1"/>
+          </p:cNvSpPr>
+          <p:nvPr>
+            <p:ph type="body" idx="1"/>
+          </p:nvPr>
+        </p:nvSpPr>
+        <p:spPr/>
+        <p:txBody>
+          <a:bodyPr/>
+          <a:lstStyle/>
+          <a:p>
+            <a:endParaRPr lang="en-US" dirty="0"/>
+          </a:p>
+        </p:txBody>
+      </p:sp>
+      <p:sp>
+        <p:nvSpPr>
+          <p:cNvPr id="4" name="Slide Number Placeholder 3"/>
+          <p:cNvSpPr>
+            <a:spLocks noGrp="1"/>
+          </p:cNvSpPr>
+          <p:nvPr>
+            <p:ph type="sldNum" sz="quarter" idx="5"/>
+          </p:nvPr>
+        </p:nvSpPr>
+        <p:spPr/>
+        <p:txBody>
+          <a:bodyPr/>
+          <a:lstStyle/>
+          <a:p>
+            <a:fld id="{3B463E9D-4916-634A-A75C-91C197995E34}" type="slidenum">
+              <a:rPr lang="en-US" smtClean="0"/>
+              <a:t>5</a:t>
+            </a:fld>
+            <a:endParaRPr lang="en-US"/>
+          </a:p>
+        </p:txBody>
+      </p:sp>
+    </p:spTree>
+    <p:extLst>
+      <p:ext uri="{BB962C8B-B14F-4D97-AF65-F5344CB8AC3E}">
+        <p14:creationId xmlns:p14="http://schemas.microsoft.com/office/powerpoint/2010/main" val="1788639732"/>
+      </p:ext>
+    </p:extLst>
+  </p:cSld>
+  <p:clrMapOvr>
+    <a:masterClrMapping/>
+  </p:clrMapOvr>
+</p:notes>
+</file>
+
+<file path=ppt/notesSlides/notesSlide2.xml><?xml version="1.0" encoding="utf-8"?>
+<p:notes xmlns:a="http://schemas.openxmlformats.org/drawingml/2006/main" xmlns:r="http://schemas.openxmlformats.org/officeDocument/2006/relationships" xmlns:p="http://schemas.openxmlformats.org/presentationml/2006/main">
+  <p:cSld>
+    <p:spTree>
+      <p:nvGrpSpPr>
+        <p:cNvPr id="1" name=""/>
+        <p:cNvGrpSpPr/>
+        <p:nvPr/>
+      </p:nvGrpSpPr>
+      <p:grpSpPr>
+        <a:xfrm>
+          <a:off x="0" y="0"/>
+          <a:ext cx="0" cy="0"/>
+          <a:chOff x="0" y="0"/>
+          <a:chExt cx="0" cy="0"/>
+        </a:xfrm>
+      </p:grpSpPr>
+      <p:sp>
+        <p:nvSpPr>
+          <p:cNvPr id="2" name="Slide Image Placeholder 1"/>
+          <p:cNvSpPr>
+            <a:spLocks noGrp="1" noRot="1" noChangeAspect="1"/>
+          </p:cNvSpPr>
+          <p:nvPr>
+            <p:ph type="sldImg"/>
+          </p:nvPr>
+        </p:nvSpPr>
+        <p:spPr/>
+      </p:sp>
+      <p:sp>
+        <p:nvSpPr>
+          <p:cNvPr id="3" name="Notes Placeholder 2"/>
+          <p:cNvSpPr>
+            <a:spLocks noGrp="1"/>
+          </p:cNvSpPr>
+          <p:nvPr>
+            <p:ph type="body" idx="1"/>
+          </p:nvPr>
+        </p:nvSpPr>
+        <p:spPr/>
+        <p:txBody>
+          <a:bodyPr/>
+          <a:lstStyle/>
+          <a:p>
+            <a:endParaRPr lang="en-US" dirty="0"/>
+          </a:p>
+        </p:txBody>
+      </p:sp>
+      <p:sp>
+        <p:nvSpPr>
+          <p:cNvPr id="4" name="Slide Number Placeholder 3"/>
+          <p:cNvSpPr>
+            <a:spLocks noGrp="1"/>
+          </p:cNvSpPr>
+          <p:nvPr>
+            <p:ph type="sldNum" sz="quarter" idx="5"/>
+          </p:nvPr>
+        </p:nvSpPr>
+        <p:spPr/>
+        <p:txBody>
+          <a:bodyPr/>
+          <a:lstStyle/>
+          <a:p>
+            <a:fld id="{3B463E9D-4916-634A-A75C-91C197995E34}" type="slidenum">
+              <a:rPr lang="en-US" smtClean="0"/>
+              <a:t>19</a:t>
+            </a:fld>
+            <a:endParaRPr lang="en-US"/>
+          </a:p>
+        </p:txBody>
+      </p:sp>
+    </p:spTree>
+    <p:extLst>
+      <p:ext uri="{BB962C8B-B14F-4D97-AF65-F5344CB8AC3E}">
+        <p14:creationId xmlns:p14="http://schemas.microsoft.com/office/powerpoint/2010/main" val="21780243"/>
+      </p:ext>
+    </p:extLst>
+  </p:cSld>
+  <p:clrMapOvr>
+    <a:masterClrMapping/>
+  </p:clrMapOvr>
+</p:notes>
+</file>
+
+<file path=ppt/notesSlides/notesSlide3.xml><?xml version="1.0" encoding="utf-8"?>
+<p:notes xmlns:a="http://schemas.openxmlformats.org/drawingml/2006/main" xmlns:r="http://schemas.openxmlformats.org/officeDocument/2006/relationships" xmlns:p="http://schemas.openxmlformats.org/presentationml/2006/main">
+  <p:cSld>
+    <p:spTree>
+      <p:nvGrpSpPr>
+        <p:cNvPr id="1" name=""/>
+        <p:cNvGrpSpPr/>
+        <p:nvPr/>
+      </p:nvGrpSpPr>
+      <p:grpSpPr>
+        <a:xfrm>
+          <a:off x="0" y="0"/>
+          <a:ext cx="0" cy="0"/>
+          <a:chOff x="0" y="0"/>
+          <a:chExt cx="0" cy="0"/>
+        </a:xfrm>
+      </p:grpSpPr>
+      <p:sp>
+        <p:nvSpPr>
+          <p:cNvPr id="2" name="Slide Image Placeholder 1"/>
+          <p:cNvSpPr>
+            <a:spLocks noGrp="1" noRot="1" noChangeAspect="1"/>
+          </p:cNvSpPr>
+          <p:nvPr>
+            <p:ph type="sldImg"/>
+          </p:nvPr>
+        </p:nvSpPr>
+        <p:spPr/>
+      </p:sp>
+      <p:sp>
+        <p:nvSpPr>
+          <p:cNvPr id="3" name="Notes Placeholder 2"/>
+          <p:cNvSpPr>
+            <a:spLocks noGrp="1"/>
+          </p:cNvSpPr>
+          <p:nvPr>
+            <p:ph type="body" idx="1"/>
+          </p:nvPr>
+        </p:nvSpPr>
+        <p:spPr/>
+        <p:txBody>
+          <a:bodyPr/>
+          <a:lstStyle/>
+          <a:p>
+            <a:endParaRPr lang="en-US" dirty="0"/>
+          </a:p>
+        </p:txBody>
+      </p:sp>
+      <p:sp>
+        <p:nvSpPr>
+          <p:cNvPr id="4" name="Slide Number Placeholder 3"/>
+          <p:cNvSpPr>
+            <a:spLocks noGrp="1"/>
+          </p:cNvSpPr>
+          <p:nvPr>
+            <p:ph type="sldNum" sz="quarter" idx="5"/>
+          </p:nvPr>
+        </p:nvSpPr>
+        <p:spPr/>
+        <p:txBody>
+          <a:bodyPr/>
+          <a:lstStyle/>
+          <a:p>
+            <a:fld id="{3B463E9D-4916-634A-A75C-91C197995E34}" type="slidenum">
+              <a:rPr lang="en-US" smtClean="0"/>
+              <a:t>20</a:t>
+            </a:fld>
+            <a:endParaRPr lang="en-US"/>
+          </a:p>
+        </p:txBody>
+      </p:sp>
+    </p:spTree>
+    <p:extLst>
+      <p:ext uri="{BB962C8B-B14F-4D97-AF65-F5344CB8AC3E}">
+        <p14:creationId xmlns:p14="http://schemas.microsoft.com/office/powerpoint/2010/main" val="2312118122"/>
+      </p:ext>
+    </p:extLst>
+  </p:cSld>
+  <p:clrMapOvr>
+    <a:masterClrMapping/>
+  </p:clrMapOvr>
+</p:notes>
 </file>
 
 <file path=ppt/slideLayouts/slideLayout1.xml><?xml version="1.0" encoding="utf-8"?>
@@ -857,7 +1475,7 @@
           <a:p>
             <a:fld id="{B84125C9-AED3-0F47-B44C-0465FAA4AF51}" type="datetimeFigureOut">
               <a:rPr lang="en-US" smtClean="0"/>
-              <a:t>8/5/20</a:t>
+              <a:t>8/8/20</a:t>
             </a:fld>
             <a:endParaRPr lang="en-US"/>
           </a:p>
@@ -1055,7 +1673,7 @@
           <a:p>
             <a:fld id="{B84125C9-AED3-0F47-B44C-0465FAA4AF51}" type="datetimeFigureOut">
               <a:rPr lang="en-US" smtClean="0"/>
-              <a:t>8/5/20</a:t>
+              <a:t>8/8/20</a:t>
             </a:fld>
             <a:endParaRPr lang="en-US"/>
           </a:p>
@@ -1263,7 +1881,7 @@
           <a:p>
             <a:fld id="{B84125C9-AED3-0F47-B44C-0465FAA4AF51}" type="datetimeFigureOut">
               <a:rPr lang="en-US" smtClean="0"/>
-              <a:t>8/5/20</a:t>
+              <a:t>8/8/20</a:t>
             </a:fld>
             <a:endParaRPr lang="en-US"/>
           </a:p>
@@ -1483,7 +2101,7 @@
           <a:p>
             <a:fld id="{B84125C9-AED3-0F47-B44C-0465FAA4AF51}" type="datetimeFigureOut">
               <a:rPr lang="en-US" smtClean="0"/>
-              <a:t>8/5/20</a:t>
+              <a:t>8/8/20</a:t>
             </a:fld>
             <a:endParaRPr lang="en-US"/>
           </a:p>
@@ -1681,7 +2299,7 @@
           <a:p>
             <a:fld id="{B84125C9-AED3-0F47-B44C-0465FAA4AF51}" type="datetimeFigureOut">
               <a:rPr lang="en-US" smtClean="0"/>
-              <a:t>8/5/20</a:t>
+              <a:t>8/8/20</a:t>
             </a:fld>
             <a:endParaRPr lang="en-US"/>
           </a:p>
@@ -1956,7 +2574,7 @@
           <a:p>
             <a:fld id="{B84125C9-AED3-0F47-B44C-0465FAA4AF51}" type="datetimeFigureOut">
               <a:rPr lang="en-US" smtClean="0"/>
-              <a:t>8/5/20</a:t>
+              <a:t>8/8/20</a:t>
             </a:fld>
             <a:endParaRPr lang="en-US"/>
           </a:p>
@@ -2221,7 +2839,7 @@
           <a:p>
             <a:fld id="{B84125C9-AED3-0F47-B44C-0465FAA4AF51}" type="datetimeFigureOut">
               <a:rPr lang="en-US" smtClean="0"/>
-              <a:t>8/5/20</a:t>
+              <a:t>8/8/20</a:t>
             </a:fld>
             <a:endParaRPr lang="en-US"/>
           </a:p>
@@ -2633,7 +3251,7 @@
           <a:p>
             <a:fld id="{B84125C9-AED3-0F47-B44C-0465FAA4AF51}" type="datetimeFigureOut">
               <a:rPr lang="en-US" smtClean="0"/>
-              <a:t>8/5/20</a:t>
+              <a:t>8/8/20</a:t>
             </a:fld>
             <a:endParaRPr lang="en-US"/>
           </a:p>
@@ -2774,7 +3392,7 @@
           <a:p>
             <a:fld id="{B84125C9-AED3-0F47-B44C-0465FAA4AF51}" type="datetimeFigureOut">
               <a:rPr lang="en-US" smtClean="0"/>
-              <a:t>8/5/20</a:t>
+              <a:t>8/8/20</a:t>
             </a:fld>
             <a:endParaRPr lang="en-US"/>
           </a:p>
@@ -2887,7 +3505,7 @@
           <a:p>
             <a:fld id="{B84125C9-AED3-0F47-B44C-0465FAA4AF51}" type="datetimeFigureOut">
               <a:rPr lang="en-US" smtClean="0"/>
-              <a:t>8/5/20</a:t>
+              <a:t>8/8/20</a:t>
             </a:fld>
             <a:endParaRPr lang="en-US"/>
           </a:p>
@@ -3198,7 +3816,7 @@
           <a:p>
             <a:fld id="{B84125C9-AED3-0F47-B44C-0465FAA4AF51}" type="datetimeFigureOut">
               <a:rPr lang="en-US" smtClean="0"/>
-              <a:t>8/5/20</a:t>
+              <a:t>8/8/20</a:t>
             </a:fld>
             <a:endParaRPr lang="en-US"/>
           </a:p>
@@ -3439,7 +4057,7 @@
           <a:p>
             <a:fld id="{B84125C9-AED3-0F47-B44C-0465FAA4AF51}" type="datetimeFigureOut">
               <a:rPr lang="en-US" smtClean="0"/>
-              <a:t>8/5/20</a:t>
+              <a:t>8/8/20</a:t>
             </a:fld>
             <a:endParaRPr lang="en-US"/>
           </a:p>
@@ -3998,7 +4616,7 @@
           <a:p>
             <a:r>
               <a:rPr lang="en-US" dirty="0"/>
-              <a:t>Python – Introduction &amp; Outline</a:t>
+              <a:t>Homework Assignment #4</a:t>
             </a:r>
           </a:p>
         </p:txBody>
@@ -4066,7 +4684,7 @@
     </p:spTree>
     <p:extLst>
       <p:ext uri="{BB962C8B-B14F-4D97-AF65-F5344CB8AC3E}">
-        <p14:creationId xmlns:p14="http://schemas.microsoft.com/office/powerpoint/2010/main" val="4268128634"/>
+        <p14:creationId xmlns:p14="http://schemas.microsoft.com/office/powerpoint/2010/main" val="1143443951"/>
       </p:ext>
     </p:extLst>
   </p:cSld>
@@ -4116,7 +4734,7 @@
           <a:p>
             <a:r>
               <a:rPr lang="en-US" dirty="0"/>
-              <a:t>Python Basics – Data types</a:t>
+              <a:t>Homework Assignment #5</a:t>
             </a:r>
           </a:p>
         </p:txBody>
@@ -4184,7 +4802,7 @@
     </p:spTree>
     <p:extLst>
       <p:ext uri="{BB962C8B-B14F-4D97-AF65-F5344CB8AC3E}">
-        <p14:creationId xmlns:p14="http://schemas.microsoft.com/office/powerpoint/2010/main" val="736959774"/>
+        <p14:creationId xmlns:p14="http://schemas.microsoft.com/office/powerpoint/2010/main" val="30250005"/>
       </p:ext>
     </p:extLst>
   </p:cSld>
@@ -4234,7 +4852,7 @@
           <a:p>
             <a:r>
               <a:rPr lang="en-US" dirty="0"/>
-              <a:t>Python Basics – Flow control</a:t>
+              <a:t>Python – Introduction &amp; Outline</a:t>
             </a:r>
           </a:p>
         </p:txBody>
@@ -4302,7 +4920,7 @@
     </p:spTree>
     <p:extLst>
       <p:ext uri="{BB962C8B-B14F-4D97-AF65-F5344CB8AC3E}">
-        <p14:creationId xmlns:p14="http://schemas.microsoft.com/office/powerpoint/2010/main" val="107052457"/>
+        <p14:creationId xmlns:p14="http://schemas.microsoft.com/office/powerpoint/2010/main" val="4268128634"/>
       </p:ext>
     </p:extLst>
   </p:cSld>
@@ -4352,15 +4970,7 @@
           <a:p>
             <a:r>
               <a:rPr lang="en-US" dirty="0"/>
-              <a:t>Python – Matrix data types (</a:t>
-            </a:r>
-            <a:r>
-              <a:rPr lang="en-US" dirty="0" err="1"/>
-              <a:t>numpy</a:t>
-            </a:r>
-            <a:r>
-              <a:rPr lang="en-US" dirty="0"/>
-              <a:t>)</a:t>
+              <a:t>Python – First Steps / Basic Concepts</a:t>
             </a:r>
           </a:p>
         </p:txBody>
@@ -4428,7 +5038,7 @@
     </p:spTree>
     <p:extLst>
       <p:ext uri="{BB962C8B-B14F-4D97-AF65-F5344CB8AC3E}">
-        <p14:creationId xmlns:p14="http://schemas.microsoft.com/office/powerpoint/2010/main" val="3014116120"/>
+        <p14:creationId xmlns:p14="http://schemas.microsoft.com/office/powerpoint/2010/main" val="1998397000"/>
       </p:ext>
     </p:extLst>
   </p:cSld>
@@ -4478,7 +5088,7 @@
           <a:p>
             <a:r>
               <a:rPr lang="en-US" dirty="0"/>
-              <a:t>Python – File IO</a:t>
+              <a:t>Python Basics – Data types</a:t>
             </a:r>
           </a:p>
         </p:txBody>
@@ -4546,7 +5156,7 @@
     </p:spTree>
     <p:extLst>
       <p:ext uri="{BB962C8B-B14F-4D97-AF65-F5344CB8AC3E}">
-        <p14:creationId xmlns:p14="http://schemas.microsoft.com/office/powerpoint/2010/main" val="3093321143"/>
+        <p14:creationId xmlns:p14="http://schemas.microsoft.com/office/powerpoint/2010/main" val="736959774"/>
       </p:ext>
     </p:extLst>
   </p:cSld>
@@ -4596,7 +5206,7 @@
           <a:p>
             <a:r>
               <a:rPr lang="en-US" dirty="0"/>
-              <a:t>Python - Plotting</a:t>
+              <a:t>Python Basics – List versus Tuple</a:t>
             </a:r>
           </a:p>
         </p:txBody>
@@ -4664,7 +5274,7 @@
     </p:spTree>
     <p:extLst>
       <p:ext uri="{BB962C8B-B14F-4D97-AF65-F5344CB8AC3E}">
-        <p14:creationId xmlns:p14="http://schemas.microsoft.com/office/powerpoint/2010/main" val="4223368661"/>
+        <p14:creationId xmlns:p14="http://schemas.microsoft.com/office/powerpoint/2010/main" val="4228101668"/>
       </p:ext>
     </p:extLst>
   </p:cSld>
@@ -4714,7 +5324,7 @@
           <a:p>
             <a:r>
               <a:rPr lang="en-US" dirty="0"/>
-              <a:t>Python – OOP 1: classes</a:t>
+              <a:t>Python Basics – Boolean variables and operations</a:t>
             </a:r>
           </a:p>
         </p:txBody>
@@ -4782,7 +5392,7 @@
     </p:spTree>
     <p:extLst>
       <p:ext uri="{BB962C8B-B14F-4D97-AF65-F5344CB8AC3E}">
-        <p14:creationId xmlns:p14="http://schemas.microsoft.com/office/powerpoint/2010/main" val="4220558212"/>
+        <p14:creationId xmlns:p14="http://schemas.microsoft.com/office/powerpoint/2010/main" val="3563377758"/>
       </p:ext>
     </p:extLst>
   </p:cSld>
@@ -4832,7 +5442,7 @@
           <a:p>
             <a:r>
               <a:rPr lang="en-US" dirty="0"/>
-              <a:t>Python – OOP 1: inheritance</a:t>
+              <a:t>Python Basics – List slicing</a:t>
             </a:r>
           </a:p>
         </p:txBody>
@@ -4900,7 +5510,7 @@
     </p:spTree>
     <p:extLst>
       <p:ext uri="{BB962C8B-B14F-4D97-AF65-F5344CB8AC3E}">
-        <p14:creationId xmlns:p14="http://schemas.microsoft.com/office/powerpoint/2010/main" val="3134847154"/>
+        <p14:creationId xmlns:p14="http://schemas.microsoft.com/office/powerpoint/2010/main" val="2991290665"/>
       </p:ext>
     </p:extLst>
   </p:cSld>
@@ -4950,7 +5560,7 @@
           <a:p>
             <a:r>
               <a:rPr lang="en-US" dirty="0"/>
-              <a:t>Python – OOP 1: operator overload</a:t>
+              <a:t>Python Basics – Flow control</a:t>
             </a:r>
           </a:p>
         </p:txBody>
@@ -5018,7 +5628,7 @@
     </p:spTree>
     <p:extLst>
       <p:ext uri="{BB962C8B-B14F-4D97-AF65-F5344CB8AC3E}">
-        <p14:creationId xmlns:p14="http://schemas.microsoft.com/office/powerpoint/2010/main" val="2761363269"/>
+        <p14:creationId xmlns:p14="http://schemas.microsoft.com/office/powerpoint/2010/main" val="107052457"/>
       </p:ext>
     </p:extLst>
   </p:cSld>
@@ -5066,7 +5676,10 @@
           <a:bodyPr/>
           <a:lstStyle/>
           <a:p>
-            <a:endParaRPr lang="en-US"/>
+            <a:r>
+              <a:rPr lang="en-US" dirty="0"/>
+              <a:t>Python Basics – Loops</a:t>
+            </a:r>
           </a:p>
         </p:txBody>
       </p:sp>
@@ -5133,7 +5746,7 @@
     </p:spTree>
     <p:extLst>
       <p:ext uri="{BB962C8B-B14F-4D97-AF65-F5344CB8AC3E}">
-        <p14:creationId xmlns:p14="http://schemas.microsoft.com/office/powerpoint/2010/main" val="1161820629"/>
+        <p14:creationId xmlns:p14="http://schemas.microsoft.com/office/powerpoint/2010/main" val="2000142263"/>
       </p:ext>
     </p:extLst>
   </p:cSld>
@@ -5162,10 +5775,44 @@
       </p:grpSpPr>
       <p:sp>
         <p:nvSpPr>
-          <p:cNvPr id="7" name="Subtitle 6">
-            <a:extLst>
-              <a:ext uri="{FF2B5EF4-FFF2-40B4-BE49-F238E27FC236}">
-                <a16:creationId xmlns:a16="http://schemas.microsoft.com/office/drawing/2014/main" id="{B21F99FE-2B30-814C-BB06-2595F16BD124}"/>
+          <p:cNvPr id="2" name="Title 1">
+            <a:extLst>
+              <a:ext uri="{FF2B5EF4-FFF2-40B4-BE49-F238E27FC236}">
+                <a16:creationId xmlns:a16="http://schemas.microsoft.com/office/drawing/2014/main" id="{98941C72-6BEB-F14C-A889-777F9774A974}"/>
+              </a:ext>
+            </a:extLst>
+          </p:cNvPr>
+          <p:cNvSpPr>
+            <a:spLocks noGrp="1"/>
+          </p:cNvSpPr>
+          <p:nvPr>
+            <p:ph type="ctrTitle"/>
+          </p:nvPr>
+        </p:nvSpPr>
+        <p:spPr/>
+        <p:txBody>
+          <a:bodyPr>
+            <a:normAutofit/>
+          </a:bodyPr>
+          <a:lstStyle/>
+          <a:p>
+            <a:r>
+              <a:rPr lang="en-US" sz="9600" b="1" dirty="0">
+                <a:solidFill>
+                  <a:srgbClr val="FF0000"/>
+                </a:solidFill>
+              </a:rPr>
+              <a:t>WEEK #1</a:t>
+            </a:r>
+          </a:p>
+        </p:txBody>
+      </p:sp>
+      <p:sp>
+        <p:nvSpPr>
+          <p:cNvPr id="3" name="Subtitle 2">
+            <a:extLst>
+              <a:ext uri="{FF2B5EF4-FFF2-40B4-BE49-F238E27FC236}">
+                <a16:creationId xmlns:a16="http://schemas.microsoft.com/office/drawing/2014/main" id="{15D4E4A1-FB5E-B242-B099-0F05192129F6}"/>
               </a:ext>
             </a:extLst>
           </p:cNvPr>
@@ -5181,77 +5828,14 @@
           <a:bodyPr/>
           <a:lstStyle/>
           <a:p>
-            <a:r>
-              <a:rPr lang="en-US" dirty="0"/>
-              <a:t>Outline &amp; Setup</a:t>
-            </a:r>
-          </a:p>
-        </p:txBody>
-      </p:sp>
-      <p:sp>
-        <p:nvSpPr>
-          <p:cNvPr id="5" name="Text Placeholder 4">
-            <a:extLst>
-              <a:ext uri="{FF2B5EF4-FFF2-40B4-BE49-F238E27FC236}">
-                <a16:creationId xmlns:a16="http://schemas.microsoft.com/office/drawing/2014/main" id="{F828C3F3-D358-8D4F-BAC9-9043145A88D1}"/>
-              </a:ext>
-            </a:extLst>
-          </p:cNvPr>
-          <p:cNvSpPr>
-            <a:spLocks noGrp="1"/>
-          </p:cNvSpPr>
-          <p:nvPr>
-            <p:ph type="body" sz="quarter" idx="11"/>
-          </p:nvPr>
-        </p:nvSpPr>
-        <p:spPr/>
-        <p:txBody>
-          <a:bodyPr>
-            <a:normAutofit lnSpcReduction="10000"/>
-          </a:bodyPr>
-          <a:lstStyle/>
-          <a:p>
-            <a:r>
-              <a:rPr lang="en-US" dirty="0"/>
-              <a:t>Peter Mackenzie-Helnwein</a:t>
-            </a:r>
-          </a:p>
-        </p:txBody>
-      </p:sp>
-      <p:sp>
-        <p:nvSpPr>
-          <p:cNvPr id="6" name="Text Placeholder 5">
-            <a:extLst>
-              <a:ext uri="{FF2B5EF4-FFF2-40B4-BE49-F238E27FC236}">
-                <a16:creationId xmlns:a16="http://schemas.microsoft.com/office/drawing/2014/main" id="{860E1C64-9002-3948-A97E-48870344E6E7}"/>
-              </a:ext>
-            </a:extLst>
-          </p:cNvPr>
-          <p:cNvSpPr>
-            <a:spLocks noGrp="1"/>
-          </p:cNvSpPr>
-          <p:nvPr>
-            <p:ph type="body" sz="quarter" idx="12"/>
-          </p:nvPr>
-        </p:nvSpPr>
-        <p:spPr/>
-        <p:txBody>
-          <a:bodyPr>
-            <a:normAutofit fontScale="92500" lnSpcReduction="20000"/>
-          </a:bodyPr>
-          <a:lstStyle/>
-          <a:p>
-            <a:r>
-              <a:rPr lang="en-US" dirty="0"/>
-              <a:t>University of Washington</a:t>
-            </a:r>
+            <a:endParaRPr lang="en-US"/>
           </a:p>
         </p:txBody>
       </p:sp>
     </p:spTree>
     <p:extLst>
       <p:ext uri="{BB962C8B-B14F-4D97-AF65-F5344CB8AC3E}">
-        <p14:creationId xmlns:p14="http://schemas.microsoft.com/office/powerpoint/2010/main" val="1485693724"/>
+        <p14:creationId xmlns:p14="http://schemas.microsoft.com/office/powerpoint/2010/main" val="246953903"/>
       </p:ext>
     </p:extLst>
   </p:cSld>
@@ -5299,7 +5883,10 @@
           <a:bodyPr/>
           <a:lstStyle/>
           <a:p>
-            <a:endParaRPr lang="en-US"/>
+            <a:r>
+              <a:rPr lang="en-US" dirty="0"/>
+              <a:t>Python Basics – WHILE Loop example</a:t>
+            </a:r>
           </a:p>
         </p:txBody>
       </p:sp>
@@ -5366,7 +5953,7 @@
     </p:spTree>
     <p:extLst>
       <p:ext uri="{BB962C8B-B14F-4D97-AF65-F5344CB8AC3E}">
-        <p14:creationId xmlns:p14="http://schemas.microsoft.com/office/powerpoint/2010/main" val="1563871757"/>
+        <p14:creationId xmlns:p14="http://schemas.microsoft.com/office/powerpoint/2010/main" val="3020261289"/>
       </p:ext>
     </p:extLst>
   </p:cSld>
@@ -5414,7 +6001,18 @@
           <a:bodyPr/>
           <a:lstStyle/>
           <a:p>
-            <a:endParaRPr lang="en-US"/>
+            <a:r>
+              <a:rPr lang="en-US" dirty="0"/>
+              <a:t>Python – Matrix data types (</a:t>
+            </a:r>
+            <a:r>
+              <a:rPr lang="en-US" dirty="0" err="1"/>
+              <a:t>numpy</a:t>
+            </a:r>
+            <a:r>
+              <a:rPr lang="en-US" dirty="0"/>
+              <a:t>)</a:t>
+            </a:r>
           </a:p>
         </p:txBody>
       </p:sp>
@@ -5481,7 +6079,7 @@
     </p:spTree>
     <p:extLst>
       <p:ext uri="{BB962C8B-B14F-4D97-AF65-F5344CB8AC3E}">
-        <p14:creationId xmlns:p14="http://schemas.microsoft.com/office/powerpoint/2010/main" val="2896279256"/>
+        <p14:creationId xmlns:p14="http://schemas.microsoft.com/office/powerpoint/2010/main" val="3014116120"/>
       </p:ext>
     </p:extLst>
   </p:cSld>
@@ -5529,7 +6127,10 @@
           <a:bodyPr/>
           <a:lstStyle/>
           <a:p>
-            <a:endParaRPr lang="en-US"/>
+            <a:r>
+              <a:rPr lang="en-US" dirty="0"/>
+              <a:t>Python – File IO for text files</a:t>
+            </a:r>
           </a:p>
         </p:txBody>
       </p:sp>
@@ -5596,7 +6197,7 @@
     </p:spTree>
     <p:extLst>
       <p:ext uri="{BB962C8B-B14F-4D97-AF65-F5344CB8AC3E}">
-        <p14:creationId xmlns:p14="http://schemas.microsoft.com/office/powerpoint/2010/main" val="3222979132"/>
+        <p14:creationId xmlns:p14="http://schemas.microsoft.com/office/powerpoint/2010/main" val="3093321143"/>
       </p:ext>
     </p:extLst>
   </p:cSld>
@@ -5644,7 +6245,10 @@
           <a:bodyPr/>
           <a:lstStyle/>
           <a:p>
-            <a:endParaRPr lang="en-US"/>
+            <a:r>
+              <a:rPr lang="en-US" dirty="0"/>
+              <a:t>Python – File IO – exceptions handling</a:t>
+            </a:r>
           </a:p>
         </p:txBody>
       </p:sp>
@@ -5711,7 +6315,7 @@
     </p:spTree>
     <p:extLst>
       <p:ext uri="{BB962C8B-B14F-4D97-AF65-F5344CB8AC3E}">
-        <p14:creationId xmlns:p14="http://schemas.microsoft.com/office/powerpoint/2010/main" val="3822555114"/>
+        <p14:creationId xmlns:p14="http://schemas.microsoft.com/office/powerpoint/2010/main" val="809789715"/>
       </p:ext>
     </p:extLst>
   </p:cSld>
@@ -5759,7 +6363,10 @@
           <a:bodyPr/>
           <a:lstStyle/>
           <a:p>
-            <a:endParaRPr lang="en-US"/>
+            <a:r>
+              <a:rPr lang="en-US" dirty="0"/>
+              <a:t>Python – File IO using pandas</a:t>
+            </a:r>
           </a:p>
         </p:txBody>
       </p:sp>
@@ -5826,7 +6433,7 @@
     </p:spTree>
     <p:extLst>
       <p:ext uri="{BB962C8B-B14F-4D97-AF65-F5344CB8AC3E}">
-        <p14:creationId xmlns:p14="http://schemas.microsoft.com/office/powerpoint/2010/main" val="2912459459"/>
+        <p14:creationId xmlns:p14="http://schemas.microsoft.com/office/powerpoint/2010/main" val="2939056685"/>
       </p:ext>
     </p:extLst>
   </p:cSld>
@@ -5874,7 +6481,10 @@
           <a:bodyPr/>
           <a:lstStyle/>
           <a:p>
-            <a:endParaRPr lang="en-US"/>
+            <a:r>
+              <a:rPr lang="en-US" dirty="0"/>
+              <a:t>Python - Plotting</a:t>
+            </a:r>
           </a:p>
         </p:txBody>
       </p:sp>
@@ -5941,7 +6551,7 @@
     </p:spTree>
     <p:extLst>
       <p:ext uri="{BB962C8B-B14F-4D97-AF65-F5344CB8AC3E}">
-        <p14:creationId xmlns:p14="http://schemas.microsoft.com/office/powerpoint/2010/main" val="3458516751"/>
+        <p14:creationId xmlns:p14="http://schemas.microsoft.com/office/powerpoint/2010/main" val="4223368661"/>
       </p:ext>
     </p:extLst>
   </p:cSld>
@@ -5989,7 +6599,10 @@
           <a:bodyPr/>
           <a:lstStyle/>
           <a:p>
-            <a:endParaRPr lang="en-US"/>
+            <a:r>
+              <a:rPr lang="en-US" dirty="0"/>
+              <a:t>Python – OOP 1: classes</a:t>
+            </a:r>
           </a:p>
         </p:txBody>
       </p:sp>
@@ -6056,7 +6669,7 @@
     </p:spTree>
     <p:extLst>
       <p:ext uri="{BB962C8B-B14F-4D97-AF65-F5344CB8AC3E}">
-        <p14:creationId xmlns:p14="http://schemas.microsoft.com/office/powerpoint/2010/main" val="3927800354"/>
+        <p14:creationId xmlns:p14="http://schemas.microsoft.com/office/powerpoint/2010/main" val="4220558212"/>
       </p:ext>
     </p:extLst>
   </p:cSld>
@@ -6104,7 +6717,10 @@
           <a:bodyPr/>
           <a:lstStyle/>
           <a:p>
-            <a:endParaRPr lang="en-US"/>
+            <a:r>
+              <a:rPr lang="en-US" dirty="0"/>
+              <a:t>Python – OOP 2: inheritance</a:t>
+            </a:r>
           </a:p>
         </p:txBody>
       </p:sp>
@@ -6171,7 +6787,7 @@
     </p:spTree>
     <p:extLst>
       <p:ext uri="{BB962C8B-B14F-4D97-AF65-F5344CB8AC3E}">
-        <p14:creationId xmlns:p14="http://schemas.microsoft.com/office/powerpoint/2010/main" val="3408692930"/>
+        <p14:creationId xmlns:p14="http://schemas.microsoft.com/office/powerpoint/2010/main" val="3134847154"/>
       </p:ext>
     </p:extLst>
   </p:cSld>
@@ -6219,7 +6835,18 @@
           <a:bodyPr/>
           <a:lstStyle/>
           <a:p>
-            <a:endParaRPr lang="en-US"/>
+            <a:r>
+              <a:rPr lang="en-US" dirty="0"/>
+              <a:t>Python – </a:t>
+            </a:r>
+            <a:r>
+              <a:rPr lang="en-US"/>
+              <a:t>OOP 3: </a:t>
+            </a:r>
+            <a:r>
+              <a:rPr lang="en-US" dirty="0"/>
+              <a:t>operator overload</a:t>
+            </a:r>
           </a:p>
         </p:txBody>
       </p:sp>
@@ -6286,7 +6913,7 @@
     </p:spTree>
     <p:extLst>
       <p:ext uri="{BB962C8B-B14F-4D97-AF65-F5344CB8AC3E}">
-        <p14:creationId xmlns:p14="http://schemas.microsoft.com/office/powerpoint/2010/main" val="891150914"/>
+        <p14:creationId xmlns:p14="http://schemas.microsoft.com/office/powerpoint/2010/main" val="2761363269"/>
       </p:ext>
     </p:extLst>
   </p:cSld>
@@ -6334,7 +6961,10 @@
           <a:bodyPr/>
           <a:lstStyle/>
           <a:p>
-            <a:endParaRPr lang="en-US"/>
+            <a:r>
+              <a:rPr lang="en-US" dirty="0"/>
+              <a:t>Python - Modules</a:t>
+            </a:r>
           </a:p>
         </p:txBody>
       </p:sp>
@@ -6401,7 +7031,7 @@
     </p:spTree>
     <p:extLst>
       <p:ext uri="{BB962C8B-B14F-4D97-AF65-F5344CB8AC3E}">
-        <p14:creationId xmlns:p14="http://schemas.microsoft.com/office/powerpoint/2010/main" val="1230198216"/>
+        <p14:creationId xmlns:p14="http://schemas.microsoft.com/office/powerpoint/2010/main" val="1161820629"/>
       </p:ext>
     </p:extLst>
   </p:cSld>
@@ -6451,13 +7081,7 @@
           <a:p>
             <a:r>
               <a:rPr lang="en-US" dirty="0"/>
-              <a:t>What is a computer?  </a:t>
-            </a:r>
-          </a:p>
-          <a:p>
-            <a:r>
-              <a:rPr lang="en-US" dirty="0"/>
-              <a:t>Programming philosophy</a:t>
+              <a:t>Outline</a:t>
             </a:r>
           </a:p>
         </p:txBody>
@@ -6487,7 +7111,7 @@
           <a:p>
             <a:r>
               <a:rPr lang="en-US" dirty="0"/>
-              <a:t>Frank McKenna</a:t>
+              <a:t>Peter Mackenzie-Helnwein</a:t>
             </a:r>
           </a:p>
         </p:txBody>
@@ -6517,7 +7141,7 @@
           <a:p>
             <a:r>
               <a:rPr lang="en-US" dirty="0"/>
-              <a:t>University of California at Berkeley</a:t>
+              <a:t>University of Washington</a:t>
             </a:r>
           </a:p>
         </p:txBody>
@@ -6525,7 +7149,7 @@
     </p:spTree>
     <p:extLst>
       <p:ext uri="{BB962C8B-B14F-4D97-AF65-F5344CB8AC3E}">
-        <p14:creationId xmlns:p14="http://schemas.microsoft.com/office/powerpoint/2010/main" val="81558599"/>
+        <p14:creationId xmlns:p14="http://schemas.microsoft.com/office/powerpoint/2010/main" val="1485693724"/>
       </p:ext>
     </p:extLst>
   </p:cSld>
@@ -6573,7 +7197,18 @@
           <a:bodyPr/>
           <a:lstStyle/>
           <a:p>
-            <a:endParaRPr lang="en-US"/>
+            <a:r>
+              <a:rPr lang="en-US" dirty="0"/>
+              <a:t>Connecting to </a:t>
+            </a:r>
+            <a:r>
+              <a:rPr lang="en-US" dirty="0" err="1"/>
+              <a:t>DesignSafe</a:t>
+            </a:r>
+            <a:r>
+              <a:rPr lang="en-US" dirty="0"/>
+              <a:t>-CI</a:t>
+            </a:r>
           </a:p>
         </p:txBody>
       </p:sp>
@@ -6640,7 +7275,7 @@
     </p:spTree>
     <p:extLst>
       <p:ext uri="{BB962C8B-B14F-4D97-AF65-F5344CB8AC3E}">
-        <p14:creationId xmlns:p14="http://schemas.microsoft.com/office/powerpoint/2010/main" val="4178150776"/>
+        <p14:creationId xmlns:p14="http://schemas.microsoft.com/office/powerpoint/2010/main" val="2896279256"/>
       </p:ext>
     </p:extLst>
   </p:cSld>
@@ -6669,18 +7304,18 @@
       </p:grpSpPr>
       <p:sp>
         <p:nvSpPr>
-          <p:cNvPr id="2" name="Title 1">
-            <a:extLst>
-              <a:ext uri="{FF2B5EF4-FFF2-40B4-BE49-F238E27FC236}">
-                <a16:creationId xmlns:a16="http://schemas.microsoft.com/office/drawing/2014/main" id="{C9398FCB-269C-244D-A704-88CB82FCC540}"/>
-              </a:ext>
-            </a:extLst>
-          </p:cNvPr>
-          <p:cNvSpPr>
-            <a:spLocks noGrp="1"/>
-          </p:cNvSpPr>
-          <p:nvPr>
-            <p:ph type="title"/>
+          <p:cNvPr id="7" name="Subtitle 6">
+            <a:extLst>
+              <a:ext uri="{FF2B5EF4-FFF2-40B4-BE49-F238E27FC236}">
+                <a16:creationId xmlns:a16="http://schemas.microsoft.com/office/drawing/2014/main" id="{B21F99FE-2B30-814C-BB06-2595F16BD124}"/>
+              </a:ext>
+            </a:extLst>
+          </p:cNvPr>
+          <p:cNvSpPr>
+            <a:spLocks noGrp="1"/>
+          </p:cNvSpPr>
+          <p:nvPr>
+            <p:ph type="subTitle" idx="1"/>
           </p:nvPr>
         </p:nvSpPr>
         <p:spPr/>
@@ -6688,39 +7323,980 @@
           <a:bodyPr/>
           <a:lstStyle/>
           <a:p>
-            <a:endParaRPr lang="en-US"/>
-          </a:p>
-        </p:txBody>
-      </p:sp>
-      <p:sp>
-        <p:nvSpPr>
-          <p:cNvPr id="3" name="Content Placeholder 2">
-            <a:extLst>
-              <a:ext uri="{FF2B5EF4-FFF2-40B4-BE49-F238E27FC236}">
-                <a16:creationId xmlns:a16="http://schemas.microsoft.com/office/drawing/2014/main" id="{9E4DF2C6-357B-6749-8114-017D051B13A5}"/>
-              </a:ext>
-            </a:extLst>
-          </p:cNvPr>
-          <p:cNvSpPr>
-            <a:spLocks noGrp="1"/>
-          </p:cNvSpPr>
-          <p:nvPr>
-            <p:ph idx="1"/>
-          </p:nvPr>
-        </p:nvSpPr>
-        <p:spPr/>
-        <p:txBody>
-          <a:bodyPr/>
-          <a:lstStyle/>
-          <a:p>
-            <a:endParaRPr lang="en-US"/>
+            <a:r>
+              <a:rPr lang="en-US" dirty="0"/>
+              <a:t>Linux command line basics</a:t>
+            </a:r>
+          </a:p>
+        </p:txBody>
+      </p:sp>
+      <p:sp>
+        <p:nvSpPr>
+          <p:cNvPr id="5" name="Text Placeholder 4">
+            <a:extLst>
+              <a:ext uri="{FF2B5EF4-FFF2-40B4-BE49-F238E27FC236}">
+                <a16:creationId xmlns:a16="http://schemas.microsoft.com/office/drawing/2014/main" id="{F828C3F3-D358-8D4F-BAC9-9043145A88D1}"/>
+              </a:ext>
+            </a:extLst>
+          </p:cNvPr>
+          <p:cNvSpPr>
+            <a:spLocks noGrp="1"/>
+          </p:cNvSpPr>
+          <p:nvPr>
+            <p:ph type="body" sz="quarter" idx="11"/>
+          </p:nvPr>
+        </p:nvSpPr>
+        <p:spPr/>
+        <p:txBody>
+          <a:bodyPr>
+            <a:normAutofit lnSpcReduction="10000"/>
+          </a:bodyPr>
+          <a:lstStyle/>
+          <a:p>
+            <a:r>
+              <a:rPr lang="en-US" dirty="0"/>
+              <a:t>Peter Mackenzie-Helnwein</a:t>
+            </a:r>
+          </a:p>
+        </p:txBody>
+      </p:sp>
+      <p:sp>
+        <p:nvSpPr>
+          <p:cNvPr id="6" name="Text Placeholder 5">
+            <a:extLst>
+              <a:ext uri="{FF2B5EF4-FFF2-40B4-BE49-F238E27FC236}">
+                <a16:creationId xmlns:a16="http://schemas.microsoft.com/office/drawing/2014/main" id="{860E1C64-9002-3948-A97E-48870344E6E7}"/>
+              </a:ext>
+            </a:extLst>
+          </p:cNvPr>
+          <p:cNvSpPr>
+            <a:spLocks noGrp="1"/>
+          </p:cNvSpPr>
+          <p:nvPr>
+            <p:ph type="body" sz="quarter" idx="12"/>
+          </p:nvPr>
+        </p:nvSpPr>
+        <p:spPr/>
+        <p:txBody>
+          <a:bodyPr>
+            <a:normAutofit fontScale="92500" lnSpcReduction="20000"/>
+          </a:bodyPr>
+          <a:lstStyle/>
+          <a:p>
+            <a:r>
+              <a:rPr lang="en-US" dirty="0"/>
+              <a:t>University of Washington</a:t>
+            </a:r>
           </a:p>
         </p:txBody>
       </p:sp>
     </p:spTree>
     <p:extLst>
       <p:ext uri="{BB962C8B-B14F-4D97-AF65-F5344CB8AC3E}">
-        <p14:creationId xmlns:p14="http://schemas.microsoft.com/office/powerpoint/2010/main" val="1193405926"/>
+        <p14:creationId xmlns:p14="http://schemas.microsoft.com/office/powerpoint/2010/main" val="3222979132"/>
+      </p:ext>
+    </p:extLst>
+  </p:cSld>
+  <p:clrMapOvr>
+    <a:masterClrMapping/>
+  </p:clrMapOvr>
+</p:sld>
+</file>
+
+<file path=ppt/slides/slide32.xml><?xml version="1.0" encoding="utf-8"?>
+<p:sld xmlns:a="http://schemas.openxmlformats.org/drawingml/2006/main" xmlns:r="http://schemas.openxmlformats.org/officeDocument/2006/relationships" xmlns:p="http://schemas.openxmlformats.org/presentationml/2006/main">
+  <p:cSld>
+    <p:spTree>
+      <p:nvGrpSpPr>
+        <p:cNvPr id="1" name=""/>
+        <p:cNvGrpSpPr/>
+        <p:nvPr/>
+      </p:nvGrpSpPr>
+      <p:grpSpPr>
+        <a:xfrm>
+          <a:off x="0" y="0"/>
+          <a:ext cx="0" cy="0"/>
+          <a:chOff x="0" y="0"/>
+          <a:chExt cx="0" cy="0"/>
+        </a:xfrm>
+      </p:grpSpPr>
+      <p:sp>
+        <p:nvSpPr>
+          <p:cNvPr id="7" name="Subtitle 6">
+            <a:extLst>
+              <a:ext uri="{FF2B5EF4-FFF2-40B4-BE49-F238E27FC236}">
+                <a16:creationId xmlns:a16="http://schemas.microsoft.com/office/drawing/2014/main" id="{B21F99FE-2B30-814C-BB06-2595F16BD124}"/>
+              </a:ext>
+            </a:extLst>
+          </p:cNvPr>
+          <p:cNvSpPr>
+            <a:spLocks noGrp="1"/>
+          </p:cNvSpPr>
+          <p:nvPr>
+            <p:ph type="subTitle" idx="1"/>
+          </p:nvPr>
+        </p:nvSpPr>
+        <p:spPr/>
+        <p:txBody>
+          <a:bodyPr/>
+          <a:lstStyle/>
+          <a:p>
+            <a:endParaRPr lang="en-US"/>
+          </a:p>
+        </p:txBody>
+      </p:sp>
+      <p:sp>
+        <p:nvSpPr>
+          <p:cNvPr id="5" name="Text Placeholder 4">
+            <a:extLst>
+              <a:ext uri="{FF2B5EF4-FFF2-40B4-BE49-F238E27FC236}">
+                <a16:creationId xmlns:a16="http://schemas.microsoft.com/office/drawing/2014/main" id="{F828C3F3-D358-8D4F-BAC9-9043145A88D1}"/>
+              </a:ext>
+            </a:extLst>
+          </p:cNvPr>
+          <p:cNvSpPr>
+            <a:spLocks noGrp="1"/>
+          </p:cNvSpPr>
+          <p:nvPr>
+            <p:ph type="body" sz="quarter" idx="11"/>
+          </p:nvPr>
+        </p:nvSpPr>
+        <p:spPr/>
+        <p:txBody>
+          <a:bodyPr>
+            <a:normAutofit lnSpcReduction="10000"/>
+          </a:bodyPr>
+          <a:lstStyle/>
+          <a:p>
+            <a:r>
+              <a:rPr lang="en-US" dirty="0"/>
+              <a:t>Peter Mackenzie-Helnwein</a:t>
+            </a:r>
+          </a:p>
+        </p:txBody>
+      </p:sp>
+      <p:sp>
+        <p:nvSpPr>
+          <p:cNvPr id="6" name="Text Placeholder 5">
+            <a:extLst>
+              <a:ext uri="{FF2B5EF4-FFF2-40B4-BE49-F238E27FC236}">
+                <a16:creationId xmlns:a16="http://schemas.microsoft.com/office/drawing/2014/main" id="{860E1C64-9002-3948-A97E-48870344E6E7}"/>
+              </a:ext>
+            </a:extLst>
+          </p:cNvPr>
+          <p:cNvSpPr>
+            <a:spLocks noGrp="1"/>
+          </p:cNvSpPr>
+          <p:nvPr>
+            <p:ph type="body" sz="quarter" idx="12"/>
+          </p:nvPr>
+        </p:nvSpPr>
+        <p:spPr/>
+        <p:txBody>
+          <a:bodyPr>
+            <a:normAutofit fontScale="92500" lnSpcReduction="20000"/>
+          </a:bodyPr>
+          <a:lstStyle/>
+          <a:p>
+            <a:r>
+              <a:rPr lang="en-US" dirty="0"/>
+              <a:t>University of Washington</a:t>
+            </a:r>
+          </a:p>
+        </p:txBody>
+      </p:sp>
+    </p:spTree>
+    <p:extLst>
+      <p:ext uri="{BB962C8B-B14F-4D97-AF65-F5344CB8AC3E}">
+        <p14:creationId xmlns:p14="http://schemas.microsoft.com/office/powerpoint/2010/main" val="3822555114"/>
+      </p:ext>
+    </p:extLst>
+  </p:cSld>
+  <p:clrMapOvr>
+    <a:masterClrMapping/>
+  </p:clrMapOvr>
+</p:sld>
+</file>
+
+<file path=ppt/slides/slide33.xml><?xml version="1.0" encoding="utf-8"?>
+<p:sld xmlns:a="http://schemas.openxmlformats.org/drawingml/2006/main" xmlns:r="http://schemas.openxmlformats.org/officeDocument/2006/relationships" xmlns:p="http://schemas.openxmlformats.org/presentationml/2006/main">
+  <p:cSld>
+    <p:spTree>
+      <p:nvGrpSpPr>
+        <p:cNvPr id="1" name=""/>
+        <p:cNvGrpSpPr/>
+        <p:nvPr/>
+      </p:nvGrpSpPr>
+      <p:grpSpPr>
+        <a:xfrm>
+          <a:off x="0" y="0"/>
+          <a:ext cx="0" cy="0"/>
+          <a:chOff x="0" y="0"/>
+          <a:chExt cx="0" cy="0"/>
+        </a:xfrm>
+      </p:grpSpPr>
+      <p:sp>
+        <p:nvSpPr>
+          <p:cNvPr id="2" name="Title 1">
+            <a:extLst>
+              <a:ext uri="{FF2B5EF4-FFF2-40B4-BE49-F238E27FC236}">
+                <a16:creationId xmlns:a16="http://schemas.microsoft.com/office/drawing/2014/main" id="{98941C72-6BEB-F14C-A889-777F9774A974}"/>
+              </a:ext>
+            </a:extLst>
+          </p:cNvPr>
+          <p:cNvSpPr>
+            <a:spLocks noGrp="1"/>
+          </p:cNvSpPr>
+          <p:nvPr>
+            <p:ph type="ctrTitle"/>
+          </p:nvPr>
+        </p:nvSpPr>
+        <p:spPr/>
+        <p:txBody>
+          <a:bodyPr>
+            <a:normAutofit/>
+          </a:bodyPr>
+          <a:lstStyle/>
+          <a:p>
+            <a:r>
+              <a:rPr lang="en-US" sz="9600" b="1" dirty="0">
+                <a:solidFill>
+                  <a:srgbClr val="FF0000"/>
+                </a:solidFill>
+              </a:rPr>
+              <a:t>WEEK #2</a:t>
+            </a:r>
+          </a:p>
+        </p:txBody>
+      </p:sp>
+      <p:sp>
+        <p:nvSpPr>
+          <p:cNvPr id="3" name="Subtitle 2">
+            <a:extLst>
+              <a:ext uri="{FF2B5EF4-FFF2-40B4-BE49-F238E27FC236}">
+                <a16:creationId xmlns:a16="http://schemas.microsoft.com/office/drawing/2014/main" id="{15D4E4A1-FB5E-B242-B099-0F05192129F6}"/>
+              </a:ext>
+            </a:extLst>
+          </p:cNvPr>
+          <p:cNvSpPr>
+            <a:spLocks noGrp="1"/>
+          </p:cNvSpPr>
+          <p:nvPr>
+            <p:ph type="subTitle" idx="1"/>
+          </p:nvPr>
+        </p:nvSpPr>
+        <p:spPr/>
+        <p:txBody>
+          <a:bodyPr/>
+          <a:lstStyle/>
+          <a:p>
+            <a:endParaRPr lang="en-US"/>
+          </a:p>
+        </p:txBody>
+      </p:sp>
+    </p:spTree>
+    <p:extLst>
+      <p:ext uri="{BB962C8B-B14F-4D97-AF65-F5344CB8AC3E}">
+        <p14:creationId xmlns:p14="http://schemas.microsoft.com/office/powerpoint/2010/main" val="3036487936"/>
+      </p:ext>
+    </p:extLst>
+  </p:cSld>
+  <p:clrMapOvr>
+    <a:masterClrMapping/>
+  </p:clrMapOvr>
+</p:sld>
+</file>
+
+<file path=ppt/slides/slide34.xml><?xml version="1.0" encoding="utf-8"?>
+<p:sld xmlns:a="http://schemas.openxmlformats.org/drawingml/2006/main" xmlns:r="http://schemas.openxmlformats.org/officeDocument/2006/relationships" xmlns:p="http://schemas.openxmlformats.org/presentationml/2006/main">
+  <p:cSld>
+    <p:spTree>
+      <p:nvGrpSpPr>
+        <p:cNvPr id="1" name=""/>
+        <p:cNvGrpSpPr/>
+        <p:nvPr/>
+      </p:nvGrpSpPr>
+      <p:grpSpPr>
+        <a:xfrm>
+          <a:off x="0" y="0"/>
+          <a:ext cx="0" cy="0"/>
+          <a:chOff x="0" y="0"/>
+          <a:chExt cx="0" cy="0"/>
+        </a:xfrm>
+      </p:grpSpPr>
+      <p:sp>
+        <p:nvSpPr>
+          <p:cNvPr id="7" name="Subtitle 6">
+            <a:extLst>
+              <a:ext uri="{FF2B5EF4-FFF2-40B4-BE49-F238E27FC236}">
+                <a16:creationId xmlns:a16="http://schemas.microsoft.com/office/drawing/2014/main" id="{B21F99FE-2B30-814C-BB06-2595F16BD124}"/>
+              </a:ext>
+            </a:extLst>
+          </p:cNvPr>
+          <p:cNvSpPr>
+            <a:spLocks noGrp="1"/>
+          </p:cNvSpPr>
+          <p:nvPr>
+            <p:ph type="subTitle" idx="1"/>
+          </p:nvPr>
+        </p:nvSpPr>
+        <p:spPr/>
+        <p:txBody>
+          <a:bodyPr/>
+          <a:lstStyle/>
+          <a:p>
+            <a:r>
+              <a:rPr lang="en-US" dirty="0"/>
+              <a:t>Programming in C</a:t>
+            </a:r>
+          </a:p>
+        </p:txBody>
+      </p:sp>
+      <p:sp>
+        <p:nvSpPr>
+          <p:cNvPr id="5" name="Text Placeholder 4">
+            <a:extLst>
+              <a:ext uri="{FF2B5EF4-FFF2-40B4-BE49-F238E27FC236}">
+                <a16:creationId xmlns:a16="http://schemas.microsoft.com/office/drawing/2014/main" id="{F828C3F3-D358-8D4F-BAC9-9043145A88D1}"/>
+              </a:ext>
+            </a:extLst>
+          </p:cNvPr>
+          <p:cNvSpPr>
+            <a:spLocks noGrp="1"/>
+          </p:cNvSpPr>
+          <p:nvPr>
+            <p:ph type="body" sz="quarter" idx="11"/>
+          </p:nvPr>
+        </p:nvSpPr>
+        <p:spPr/>
+        <p:txBody>
+          <a:bodyPr>
+            <a:normAutofit lnSpcReduction="10000"/>
+          </a:bodyPr>
+          <a:lstStyle/>
+          <a:p>
+            <a:r>
+              <a:rPr lang="en-US" dirty="0"/>
+              <a:t>Frank McKenna</a:t>
+            </a:r>
+          </a:p>
+        </p:txBody>
+      </p:sp>
+      <p:sp>
+        <p:nvSpPr>
+          <p:cNvPr id="6" name="Text Placeholder 5">
+            <a:extLst>
+              <a:ext uri="{FF2B5EF4-FFF2-40B4-BE49-F238E27FC236}">
+                <a16:creationId xmlns:a16="http://schemas.microsoft.com/office/drawing/2014/main" id="{860E1C64-9002-3948-A97E-48870344E6E7}"/>
+              </a:ext>
+            </a:extLst>
+          </p:cNvPr>
+          <p:cNvSpPr>
+            <a:spLocks noGrp="1"/>
+          </p:cNvSpPr>
+          <p:nvPr>
+            <p:ph type="body" sz="quarter" idx="12"/>
+          </p:nvPr>
+        </p:nvSpPr>
+        <p:spPr/>
+        <p:txBody>
+          <a:bodyPr>
+            <a:normAutofit fontScale="92500" lnSpcReduction="20000"/>
+          </a:bodyPr>
+          <a:lstStyle/>
+          <a:p>
+            <a:r>
+              <a:rPr lang="en-US" dirty="0"/>
+              <a:t>University of California at Berkeley</a:t>
+            </a:r>
+          </a:p>
+        </p:txBody>
+      </p:sp>
+    </p:spTree>
+    <p:extLst>
+      <p:ext uri="{BB962C8B-B14F-4D97-AF65-F5344CB8AC3E}">
+        <p14:creationId xmlns:p14="http://schemas.microsoft.com/office/powerpoint/2010/main" val="1338846049"/>
+      </p:ext>
+    </p:extLst>
+  </p:cSld>
+  <p:clrMapOvr>
+    <a:masterClrMapping/>
+  </p:clrMapOvr>
+</p:sld>
+</file>
+
+<file path=ppt/slides/slide35.xml><?xml version="1.0" encoding="utf-8"?>
+<p:sld xmlns:a="http://schemas.openxmlformats.org/drawingml/2006/main" xmlns:r="http://schemas.openxmlformats.org/officeDocument/2006/relationships" xmlns:p="http://schemas.openxmlformats.org/presentationml/2006/main">
+  <p:cSld>
+    <p:spTree>
+      <p:nvGrpSpPr>
+        <p:cNvPr id="1" name=""/>
+        <p:cNvGrpSpPr/>
+        <p:nvPr/>
+      </p:nvGrpSpPr>
+      <p:grpSpPr>
+        <a:xfrm>
+          <a:off x="0" y="0"/>
+          <a:ext cx="0" cy="0"/>
+          <a:chOff x="0" y="0"/>
+          <a:chExt cx="0" cy="0"/>
+        </a:xfrm>
+      </p:grpSpPr>
+      <p:sp>
+        <p:nvSpPr>
+          <p:cNvPr id="7" name="Subtitle 6">
+            <a:extLst>
+              <a:ext uri="{FF2B5EF4-FFF2-40B4-BE49-F238E27FC236}">
+                <a16:creationId xmlns:a16="http://schemas.microsoft.com/office/drawing/2014/main" id="{B21F99FE-2B30-814C-BB06-2595F16BD124}"/>
+              </a:ext>
+            </a:extLst>
+          </p:cNvPr>
+          <p:cNvSpPr>
+            <a:spLocks noGrp="1"/>
+          </p:cNvSpPr>
+          <p:nvPr>
+            <p:ph type="subTitle" idx="1"/>
+          </p:nvPr>
+        </p:nvSpPr>
+        <p:spPr/>
+        <p:txBody>
+          <a:bodyPr/>
+          <a:lstStyle/>
+          <a:p>
+            <a:r>
+              <a:rPr lang="en-US" dirty="0"/>
+              <a:t>Programming in C++ </a:t>
+            </a:r>
+          </a:p>
+        </p:txBody>
+      </p:sp>
+      <p:sp>
+        <p:nvSpPr>
+          <p:cNvPr id="5" name="Text Placeholder 4">
+            <a:extLst>
+              <a:ext uri="{FF2B5EF4-FFF2-40B4-BE49-F238E27FC236}">
+                <a16:creationId xmlns:a16="http://schemas.microsoft.com/office/drawing/2014/main" id="{F828C3F3-D358-8D4F-BAC9-9043145A88D1}"/>
+              </a:ext>
+            </a:extLst>
+          </p:cNvPr>
+          <p:cNvSpPr>
+            <a:spLocks noGrp="1"/>
+          </p:cNvSpPr>
+          <p:nvPr>
+            <p:ph type="body" sz="quarter" idx="11"/>
+          </p:nvPr>
+        </p:nvSpPr>
+        <p:spPr/>
+        <p:txBody>
+          <a:bodyPr>
+            <a:normAutofit lnSpcReduction="10000"/>
+          </a:bodyPr>
+          <a:lstStyle/>
+          <a:p>
+            <a:r>
+              <a:rPr lang="en-US" dirty="0"/>
+              <a:t>Frank McKenna</a:t>
+            </a:r>
+          </a:p>
+        </p:txBody>
+      </p:sp>
+      <p:sp>
+        <p:nvSpPr>
+          <p:cNvPr id="6" name="Text Placeholder 5">
+            <a:extLst>
+              <a:ext uri="{FF2B5EF4-FFF2-40B4-BE49-F238E27FC236}">
+                <a16:creationId xmlns:a16="http://schemas.microsoft.com/office/drawing/2014/main" id="{860E1C64-9002-3948-A97E-48870344E6E7}"/>
+              </a:ext>
+            </a:extLst>
+          </p:cNvPr>
+          <p:cNvSpPr>
+            <a:spLocks noGrp="1"/>
+          </p:cNvSpPr>
+          <p:nvPr>
+            <p:ph type="body" sz="quarter" idx="12"/>
+          </p:nvPr>
+        </p:nvSpPr>
+        <p:spPr/>
+        <p:txBody>
+          <a:bodyPr>
+            <a:normAutofit fontScale="92500" lnSpcReduction="20000"/>
+          </a:bodyPr>
+          <a:lstStyle/>
+          <a:p>
+            <a:r>
+              <a:rPr lang="en-US" dirty="0"/>
+              <a:t>University of California at Berkeley</a:t>
+            </a:r>
+          </a:p>
+        </p:txBody>
+      </p:sp>
+    </p:spTree>
+    <p:extLst>
+      <p:ext uri="{BB962C8B-B14F-4D97-AF65-F5344CB8AC3E}">
+        <p14:creationId xmlns:p14="http://schemas.microsoft.com/office/powerpoint/2010/main" val="2034194260"/>
+      </p:ext>
+    </p:extLst>
+  </p:cSld>
+  <p:clrMapOvr>
+    <a:masterClrMapping/>
+  </p:clrMapOvr>
+</p:sld>
+</file>
+
+<file path=ppt/slides/slide36.xml><?xml version="1.0" encoding="utf-8"?>
+<p:sld xmlns:a="http://schemas.openxmlformats.org/drawingml/2006/main" xmlns:r="http://schemas.openxmlformats.org/officeDocument/2006/relationships" xmlns:p="http://schemas.openxmlformats.org/presentationml/2006/main">
+  <p:cSld>
+    <p:spTree>
+      <p:nvGrpSpPr>
+        <p:cNvPr id="1" name=""/>
+        <p:cNvGrpSpPr/>
+        <p:nvPr/>
+      </p:nvGrpSpPr>
+      <p:grpSpPr>
+        <a:xfrm>
+          <a:off x="0" y="0"/>
+          <a:ext cx="0" cy="0"/>
+          <a:chOff x="0" y="0"/>
+          <a:chExt cx="0" cy="0"/>
+        </a:xfrm>
+      </p:grpSpPr>
+      <p:sp>
+        <p:nvSpPr>
+          <p:cNvPr id="7" name="Subtitle 6">
+            <a:extLst>
+              <a:ext uri="{FF2B5EF4-FFF2-40B4-BE49-F238E27FC236}">
+                <a16:creationId xmlns:a16="http://schemas.microsoft.com/office/drawing/2014/main" id="{B21F99FE-2B30-814C-BB06-2595F16BD124}"/>
+              </a:ext>
+            </a:extLst>
+          </p:cNvPr>
+          <p:cNvSpPr>
+            <a:spLocks noGrp="1"/>
+          </p:cNvSpPr>
+          <p:nvPr>
+            <p:ph type="subTitle" idx="1"/>
+          </p:nvPr>
+        </p:nvSpPr>
+        <p:spPr/>
+        <p:txBody>
+          <a:bodyPr/>
+          <a:lstStyle/>
+          <a:p>
+            <a:r>
+              <a:rPr lang="en-US" dirty="0"/>
+              <a:t>Python - AI</a:t>
+            </a:r>
+          </a:p>
+        </p:txBody>
+      </p:sp>
+      <p:sp>
+        <p:nvSpPr>
+          <p:cNvPr id="5" name="Text Placeholder 4">
+            <a:extLst>
+              <a:ext uri="{FF2B5EF4-FFF2-40B4-BE49-F238E27FC236}">
+                <a16:creationId xmlns:a16="http://schemas.microsoft.com/office/drawing/2014/main" id="{F828C3F3-D358-8D4F-BAC9-9043145A88D1}"/>
+              </a:ext>
+            </a:extLst>
+          </p:cNvPr>
+          <p:cNvSpPr>
+            <a:spLocks noGrp="1"/>
+          </p:cNvSpPr>
+          <p:nvPr>
+            <p:ph type="body" sz="quarter" idx="11"/>
+          </p:nvPr>
+        </p:nvSpPr>
+        <p:spPr/>
+        <p:txBody>
+          <a:bodyPr>
+            <a:normAutofit lnSpcReduction="10000"/>
+          </a:bodyPr>
+          <a:lstStyle/>
+          <a:p>
+            <a:r>
+              <a:rPr lang="en-US" dirty="0"/>
+              <a:t>Charles Wang</a:t>
+            </a:r>
+          </a:p>
+        </p:txBody>
+      </p:sp>
+      <p:sp>
+        <p:nvSpPr>
+          <p:cNvPr id="6" name="Text Placeholder 5">
+            <a:extLst>
+              <a:ext uri="{FF2B5EF4-FFF2-40B4-BE49-F238E27FC236}">
+                <a16:creationId xmlns:a16="http://schemas.microsoft.com/office/drawing/2014/main" id="{860E1C64-9002-3948-A97E-48870344E6E7}"/>
+              </a:ext>
+            </a:extLst>
+          </p:cNvPr>
+          <p:cNvSpPr>
+            <a:spLocks noGrp="1"/>
+          </p:cNvSpPr>
+          <p:nvPr>
+            <p:ph type="body" sz="quarter" idx="12"/>
+          </p:nvPr>
+        </p:nvSpPr>
+        <p:spPr/>
+        <p:txBody>
+          <a:bodyPr>
+            <a:normAutofit fontScale="92500" lnSpcReduction="20000"/>
+          </a:bodyPr>
+          <a:lstStyle/>
+          <a:p>
+            <a:r>
+              <a:rPr lang="en-US" dirty="0"/>
+              <a:t>University of California at Berkeley</a:t>
+            </a:r>
+          </a:p>
+        </p:txBody>
+      </p:sp>
+    </p:spTree>
+    <p:extLst>
+      <p:ext uri="{BB962C8B-B14F-4D97-AF65-F5344CB8AC3E}">
+        <p14:creationId xmlns:p14="http://schemas.microsoft.com/office/powerpoint/2010/main" val="1563871757"/>
+      </p:ext>
+    </p:extLst>
+  </p:cSld>
+  <p:clrMapOvr>
+    <a:masterClrMapping/>
+  </p:clrMapOvr>
+</p:sld>
+</file>
+
+<file path=ppt/slides/slide37.xml><?xml version="1.0" encoding="utf-8"?>
+<p:sld xmlns:a="http://schemas.openxmlformats.org/drawingml/2006/main" xmlns:r="http://schemas.openxmlformats.org/officeDocument/2006/relationships" xmlns:p="http://schemas.openxmlformats.org/presentationml/2006/main">
+  <p:cSld>
+    <p:spTree>
+      <p:nvGrpSpPr>
+        <p:cNvPr id="1" name=""/>
+        <p:cNvGrpSpPr/>
+        <p:nvPr/>
+      </p:nvGrpSpPr>
+      <p:grpSpPr>
+        <a:xfrm>
+          <a:off x="0" y="0"/>
+          <a:ext cx="0" cy="0"/>
+          <a:chOff x="0" y="0"/>
+          <a:chExt cx="0" cy="0"/>
+        </a:xfrm>
+      </p:grpSpPr>
+      <p:sp>
+        <p:nvSpPr>
+          <p:cNvPr id="7" name="Subtitle 6">
+            <a:extLst>
+              <a:ext uri="{FF2B5EF4-FFF2-40B4-BE49-F238E27FC236}">
+                <a16:creationId xmlns:a16="http://schemas.microsoft.com/office/drawing/2014/main" id="{B21F99FE-2B30-814C-BB06-2595F16BD124}"/>
+              </a:ext>
+            </a:extLst>
+          </p:cNvPr>
+          <p:cNvSpPr>
+            <a:spLocks noGrp="1"/>
+          </p:cNvSpPr>
+          <p:nvPr>
+            <p:ph type="subTitle" idx="1"/>
+          </p:nvPr>
+        </p:nvSpPr>
+        <p:spPr/>
+        <p:txBody>
+          <a:bodyPr/>
+          <a:lstStyle/>
+          <a:p>
+            <a:endParaRPr lang="en-US"/>
+          </a:p>
+        </p:txBody>
+      </p:sp>
+      <p:sp>
+        <p:nvSpPr>
+          <p:cNvPr id="5" name="Text Placeholder 4">
+            <a:extLst>
+              <a:ext uri="{FF2B5EF4-FFF2-40B4-BE49-F238E27FC236}">
+                <a16:creationId xmlns:a16="http://schemas.microsoft.com/office/drawing/2014/main" id="{F828C3F3-D358-8D4F-BAC9-9043145A88D1}"/>
+              </a:ext>
+            </a:extLst>
+          </p:cNvPr>
+          <p:cNvSpPr>
+            <a:spLocks noGrp="1"/>
+          </p:cNvSpPr>
+          <p:nvPr>
+            <p:ph type="body" sz="quarter" idx="11"/>
+          </p:nvPr>
+        </p:nvSpPr>
+        <p:spPr/>
+        <p:txBody>
+          <a:bodyPr>
+            <a:normAutofit lnSpcReduction="10000"/>
+          </a:bodyPr>
+          <a:lstStyle/>
+          <a:p>
+            <a:r>
+              <a:rPr lang="en-US" dirty="0"/>
+              <a:t>Frank McKenna</a:t>
+            </a:r>
+          </a:p>
+        </p:txBody>
+      </p:sp>
+      <p:sp>
+        <p:nvSpPr>
+          <p:cNvPr id="6" name="Text Placeholder 5">
+            <a:extLst>
+              <a:ext uri="{FF2B5EF4-FFF2-40B4-BE49-F238E27FC236}">
+                <a16:creationId xmlns:a16="http://schemas.microsoft.com/office/drawing/2014/main" id="{860E1C64-9002-3948-A97E-48870344E6E7}"/>
+              </a:ext>
+            </a:extLst>
+          </p:cNvPr>
+          <p:cNvSpPr>
+            <a:spLocks noGrp="1"/>
+          </p:cNvSpPr>
+          <p:nvPr>
+            <p:ph type="body" sz="quarter" idx="12"/>
+          </p:nvPr>
+        </p:nvSpPr>
+        <p:spPr/>
+        <p:txBody>
+          <a:bodyPr>
+            <a:normAutofit fontScale="92500" lnSpcReduction="20000"/>
+          </a:bodyPr>
+          <a:lstStyle/>
+          <a:p>
+            <a:r>
+              <a:rPr lang="en-US" dirty="0"/>
+              <a:t>University of California at Berkeley</a:t>
+            </a:r>
+          </a:p>
+        </p:txBody>
+      </p:sp>
+    </p:spTree>
+    <p:extLst>
+      <p:ext uri="{BB962C8B-B14F-4D97-AF65-F5344CB8AC3E}">
+        <p14:creationId xmlns:p14="http://schemas.microsoft.com/office/powerpoint/2010/main" val="976656160"/>
+      </p:ext>
+    </p:extLst>
+  </p:cSld>
+  <p:clrMapOvr>
+    <a:masterClrMapping/>
+  </p:clrMapOvr>
+</p:sld>
+</file>
+
+<file path=ppt/slides/slide38.xml><?xml version="1.0" encoding="utf-8"?>
+<p:sld xmlns:a="http://schemas.openxmlformats.org/drawingml/2006/main" xmlns:r="http://schemas.openxmlformats.org/officeDocument/2006/relationships" xmlns:p="http://schemas.openxmlformats.org/presentationml/2006/main">
+  <p:cSld>
+    <p:spTree>
+      <p:nvGrpSpPr>
+        <p:cNvPr id="1" name=""/>
+        <p:cNvGrpSpPr/>
+        <p:nvPr/>
+      </p:nvGrpSpPr>
+      <p:grpSpPr>
+        <a:xfrm>
+          <a:off x="0" y="0"/>
+          <a:ext cx="0" cy="0"/>
+          <a:chOff x="0" y="0"/>
+          <a:chExt cx="0" cy="0"/>
+        </a:xfrm>
+      </p:grpSpPr>
+      <p:sp>
+        <p:nvSpPr>
+          <p:cNvPr id="7" name="Subtitle 6">
+            <a:extLst>
+              <a:ext uri="{FF2B5EF4-FFF2-40B4-BE49-F238E27FC236}">
+                <a16:creationId xmlns:a16="http://schemas.microsoft.com/office/drawing/2014/main" id="{B21F99FE-2B30-814C-BB06-2595F16BD124}"/>
+              </a:ext>
+            </a:extLst>
+          </p:cNvPr>
+          <p:cNvSpPr>
+            <a:spLocks noGrp="1"/>
+          </p:cNvSpPr>
+          <p:nvPr>
+            <p:ph type="subTitle" idx="1"/>
+          </p:nvPr>
+        </p:nvSpPr>
+        <p:spPr/>
+        <p:txBody>
+          <a:bodyPr/>
+          <a:lstStyle/>
+          <a:p>
+            <a:endParaRPr lang="en-US"/>
+          </a:p>
+        </p:txBody>
+      </p:sp>
+      <p:sp>
+        <p:nvSpPr>
+          <p:cNvPr id="5" name="Text Placeholder 4">
+            <a:extLst>
+              <a:ext uri="{FF2B5EF4-FFF2-40B4-BE49-F238E27FC236}">
+                <a16:creationId xmlns:a16="http://schemas.microsoft.com/office/drawing/2014/main" id="{F828C3F3-D358-8D4F-BAC9-9043145A88D1}"/>
+              </a:ext>
+            </a:extLst>
+          </p:cNvPr>
+          <p:cNvSpPr>
+            <a:spLocks noGrp="1"/>
+          </p:cNvSpPr>
+          <p:nvPr>
+            <p:ph type="body" sz="quarter" idx="11"/>
+          </p:nvPr>
+        </p:nvSpPr>
+        <p:spPr/>
+        <p:txBody>
+          <a:bodyPr>
+            <a:normAutofit lnSpcReduction="10000"/>
+          </a:bodyPr>
+          <a:lstStyle/>
+          <a:p>
+            <a:r>
+              <a:rPr lang="en-US" dirty="0"/>
+              <a:t>Frank McKenna</a:t>
+            </a:r>
+          </a:p>
+        </p:txBody>
+      </p:sp>
+      <p:sp>
+        <p:nvSpPr>
+          <p:cNvPr id="6" name="Text Placeholder 5">
+            <a:extLst>
+              <a:ext uri="{FF2B5EF4-FFF2-40B4-BE49-F238E27FC236}">
+                <a16:creationId xmlns:a16="http://schemas.microsoft.com/office/drawing/2014/main" id="{860E1C64-9002-3948-A97E-48870344E6E7}"/>
+              </a:ext>
+            </a:extLst>
+          </p:cNvPr>
+          <p:cNvSpPr>
+            <a:spLocks noGrp="1"/>
+          </p:cNvSpPr>
+          <p:nvPr>
+            <p:ph type="body" sz="quarter" idx="12"/>
+          </p:nvPr>
+        </p:nvSpPr>
+        <p:spPr/>
+        <p:txBody>
+          <a:bodyPr>
+            <a:normAutofit fontScale="92500" lnSpcReduction="20000"/>
+          </a:bodyPr>
+          <a:lstStyle/>
+          <a:p>
+            <a:r>
+              <a:rPr lang="en-US" dirty="0"/>
+              <a:t>University of California at Berkeley</a:t>
+            </a:r>
+          </a:p>
+        </p:txBody>
+      </p:sp>
+    </p:spTree>
+    <p:extLst>
+      <p:ext uri="{BB962C8B-B14F-4D97-AF65-F5344CB8AC3E}">
+        <p14:creationId xmlns:p14="http://schemas.microsoft.com/office/powerpoint/2010/main" val="3668836310"/>
+      </p:ext>
+    </p:extLst>
+  </p:cSld>
+  <p:clrMapOvr>
+    <a:masterClrMapping/>
+  </p:clrMapOvr>
+</p:sld>
+</file>
+
+<file path=ppt/slides/slide39.xml><?xml version="1.0" encoding="utf-8"?>
+<p:sld xmlns:a="http://schemas.openxmlformats.org/drawingml/2006/main" xmlns:r="http://schemas.openxmlformats.org/officeDocument/2006/relationships" xmlns:p="http://schemas.openxmlformats.org/presentationml/2006/main">
+  <p:cSld>
+    <p:spTree>
+      <p:nvGrpSpPr>
+        <p:cNvPr id="1" name=""/>
+        <p:cNvGrpSpPr/>
+        <p:nvPr/>
+      </p:nvGrpSpPr>
+      <p:grpSpPr>
+        <a:xfrm>
+          <a:off x="0" y="0"/>
+          <a:ext cx="0" cy="0"/>
+          <a:chOff x="0" y="0"/>
+          <a:chExt cx="0" cy="0"/>
+        </a:xfrm>
+      </p:grpSpPr>
+      <p:sp>
+        <p:nvSpPr>
+          <p:cNvPr id="7" name="Subtitle 6">
+            <a:extLst>
+              <a:ext uri="{FF2B5EF4-FFF2-40B4-BE49-F238E27FC236}">
+                <a16:creationId xmlns:a16="http://schemas.microsoft.com/office/drawing/2014/main" id="{B21F99FE-2B30-814C-BB06-2595F16BD124}"/>
+              </a:ext>
+            </a:extLst>
+          </p:cNvPr>
+          <p:cNvSpPr>
+            <a:spLocks noGrp="1"/>
+          </p:cNvSpPr>
+          <p:nvPr>
+            <p:ph type="subTitle" idx="1"/>
+          </p:nvPr>
+        </p:nvSpPr>
+        <p:spPr/>
+        <p:txBody>
+          <a:bodyPr/>
+          <a:lstStyle/>
+          <a:p>
+            <a:endParaRPr lang="en-US"/>
+          </a:p>
+        </p:txBody>
+      </p:sp>
+      <p:sp>
+        <p:nvSpPr>
+          <p:cNvPr id="5" name="Text Placeholder 4">
+            <a:extLst>
+              <a:ext uri="{FF2B5EF4-FFF2-40B4-BE49-F238E27FC236}">
+                <a16:creationId xmlns:a16="http://schemas.microsoft.com/office/drawing/2014/main" id="{F828C3F3-D358-8D4F-BAC9-9043145A88D1}"/>
+              </a:ext>
+            </a:extLst>
+          </p:cNvPr>
+          <p:cNvSpPr>
+            <a:spLocks noGrp="1"/>
+          </p:cNvSpPr>
+          <p:nvPr>
+            <p:ph type="body" sz="quarter" idx="11"/>
+          </p:nvPr>
+        </p:nvSpPr>
+        <p:spPr/>
+        <p:txBody>
+          <a:bodyPr>
+            <a:normAutofit lnSpcReduction="10000"/>
+          </a:bodyPr>
+          <a:lstStyle/>
+          <a:p>
+            <a:r>
+              <a:rPr lang="en-US" dirty="0"/>
+              <a:t>Frank McKenna</a:t>
+            </a:r>
+          </a:p>
+        </p:txBody>
+      </p:sp>
+      <p:sp>
+        <p:nvSpPr>
+          <p:cNvPr id="6" name="Text Placeholder 5">
+            <a:extLst>
+              <a:ext uri="{FF2B5EF4-FFF2-40B4-BE49-F238E27FC236}">
+                <a16:creationId xmlns:a16="http://schemas.microsoft.com/office/drawing/2014/main" id="{860E1C64-9002-3948-A97E-48870344E6E7}"/>
+              </a:ext>
+            </a:extLst>
+          </p:cNvPr>
+          <p:cNvSpPr>
+            <a:spLocks noGrp="1"/>
+          </p:cNvSpPr>
+          <p:nvPr>
+            <p:ph type="body" sz="quarter" idx="12"/>
+          </p:nvPr>
+        </p:nvSpPr>
+        <p:spPr/>
+        <p:txBody>
+          <a:bodyPr>
+            <a:normAutofit fontScale="92500" lnSpcReduction="20000"/>
+          </a:bodyPr>
+          <a:lstStyle/>
+          <a:p>
+            <a:r>
+              <a:rPr lang="en-US" dirty="0"/>
+              <a:t>University of California at Berkeley</a:t>
+            </a:r>
+          </a:p>
+        </p:txBody>
+      </p:sp>
+    </p:spTree>
+    <p:extLst>
+      <p:ext uri="{BB962C8B-B14F-4D97-AF65-F5344CB8AC3E}">
+        <p14:creationId xmlns:p14="http://schemas.microsoft.com/office/powerpoint/2010/main" val="3365948851"/>
       </p:ext>
     </p:extLst>
   </p:cSld>
@@ -6770,23 +8346,13 @@
           <a:p>
             <a:r>
               <a:rPr lang="en-US" dirty="0"/>
-              <a:t>Using </a:t>
-            </a:r>
-            <a:r>
-              <a:rPr lang="en-US" dirty="0" err="1"/>
-              <a:t>Jupyter</a:t>
-            </a:r>
-            <a:r>
-              <a:rPr lang="en-US" dirty="0"/>
-              <a:t> Notebooks on </a:t>
-            </a:r>
-            <a:r>
-              <a:rPr lang="en-US" dirty="0" err="1"/>
-              <a:t>Jupyter</a:t>
-            </a:r>
-            <a:r>
-              <a:rPr lang="en-US" dirty="0"/>
-              <a:t> Hub</a:t>
+              <a:t>What is a computer?  </a:t>
+            </a:r>
+          </a:p>
+          <a:p>
+            <a:r>
+              <a:rPr lang="en-US" dirty="0"/>
+              <a:t>Programming philosophy</a:t>
             </a:r>
           </a:p>
         </p:txBody>
@@ -6816,7 +8382,7 @@
           <a:p>
             <a:r>
               <a:rPr lang="en-US" dirty="0"/>
-              <a:t>Peter Mackenzie-Helnwein</a:t>
+              <a:t>Frank McKenna</a:t>
             </a:r>
           </a:p>
         </p:txBody>
@@ -6846,7 +8412,7 @@
           <a:p>
             <a:r>
               <a:rPr lang="en-US" dirty="0"/>
-              <a:t>University of Washington</a:t>
+              <a:t>University of California at Berkeley</a:t>
             </a:r>
           </a:p>
         </p:txBody>
@@ -6854,7 +8420,87 @@
     </p:spTree>
     <p:extLst>
       <p:ext uri="{BB962C8B-B14F-4D97-AF65-F5344CB8AC3E}">
-        <p14:creationId xmlns:p14="http://schemas.microsoft.com/office/powerpoint/2010/main" val="4265313471"/>
+        <p14:creationId xmlns:p14="http://schemas.microsoft.com/office/powerpoint/2010/main" val="81558599"/>
+      </p:ext>
+    </p:extLst>
+  </p:cSld>
+  <p:clrMapOvr>
+    <a:masterClrMapping/>
+  </p:clrMapOvr>
+</p:sld>
+</file>
+
+<file path=ppt/slides/slide40.xml><?xml version="1.0" encoding="utf-8"?>
+<p:sld xmlns:a="http://schemas.openxmlformats.org/drawingml/2006/main" xmlns:r="http://schemas.openxmlformats.org/officeDocument/2006/relationships" xmlns:p="http://schemas.openxmlformats.org/presentationml/2006/main">
+  <p:cSld>
+    <p:spTree>
+      <p:nvGrpSpPr>
+        <p:cNvPr id="1" name=""/>
+        <p:cNvGrpSpPr/>
+        <p:nvPr/>
+      </p:nvGrpSpPr>
+      <p:grpSpPr>
+        <a:xfrm>
+          <a:off x="0" y="0"/>
+          <a:ext cx="0" cy="0"/>
+          <a:chOff x="0" y="0"/>
+          <a:chExt cx="0" cy="0"/>
+        </a:xfrm>
+      </p:grpSpPr>
+      <p:sp>
+        <p:nvSpPr>
+          <p:cNvPr id="2" name="Title 1">
+            <a:extLst>
+              <a:ext uri="{FF2B5EF4-FFF2-40B4-BE49-F238E27FC236}">
+                <a16:creationId xmlns:a16="http://schemas.microsoft.com/office/drawing/2014/main" id="{C9398FCB-269C-244D-A704-88CB82FCC540}"/>
+              </a:ext>
+            </a:extLst>
+          </p:cNvPr>
+          <p:cNvSpPr>
+            <a:spLocks noGrp="1"/>
+          </p:cNvSpPr>
+          <p:nvPr>
+            <p:ph type="title"/>
+          </p:nvPr>
+        </p:nvSpPr>
+        <p:spPr/>
+        <p:txBody>
+          <a:bodyPr/>
+          <a:lstStyle/>
+          <a:p>
+            <a:endParaRPr lang="en-US"/>
+          </a:p>
+        </p:txBody>
+      </p:sp>
+      <p:sp>
+        <p:nvSpPr>
+          <p:cNvPr id="3" name="Content Placeholder 2">
+            <a:extLst>
+              <a:ext uri="{FF2B5EF4-FFF2-40B4-BE49-F238E27FC236}">
+                <a16:creationId xmlns:a16="http://schemas.microsoft.com/office/drawing/2014/main" id="{9E4DF2C6-357B-6749-8114-017D051B13A5}"/>
+              </a:ext>
+            </a:extLst>
+          </p:cNvPr>
+          <p:cNvSpPr>
+            <a:spLocks noGrp="1"/>
+          </p:cNvSpPr>
+          <p:nvPr>
+            <p:ph idx="1"/>
+          </p:nvPr>
+        </p:nvSpPr>
+        <p:spPr/>
+        <p:txBody>
+          <a:bodyPr/>
+          <a:lstStyle/>
+          <a:p>
+            <a:endParaRPr lang="en-US"/>
+          </a:p>
+        </p:txBody>
+      </p:sp>
+    </p:spTree>
+    <p:extLst>
+      <p:ext uri="{BB962C8B-B14F-4D97-AF65-F5344CB8AC3E}">
+        <p14:creationId xmlns:p14="http://schemas.microsoft.com/office/powerpoint/2010/main" val="1193405926"/>
       </p:ext>
     </p:extLst>
   </p:cSld>
@@ -6904,7 +8550,7 @@
           <a:p>
             <a:r>
               <a:rPr lang="en-US" dirty="0"/>
-              <a:t>Homework Assignment #1</a:t>
+              <a:t>Python – getting the files</a:t>
             </a:r>
           </a:p>
         </p:txBody>
@@ -6972,7 +8618,7 @@
     </p:spTree>
     <p:extLst>
       <p:ext uri="{BB962C8B-B14F-4D97-AF65-F5344CB8AC3E}">
-        <p14:creationId xmlns:p14="http://schemas.microsoft.com/office/powerpoint/2010/main" val="2075777911"/>
+        <p14:creationId xmlns:p14="http://schemas.microsoft.com/office/powerpoint/2010/main" val="3017759018"/>
       </p:ext>
     </p:extLst>
   </p:cSld>
@@ -7022,7 +8668,23 @@
           <a:p>
             <a:r>
               <a:rPr lang="en-US" dirty="0"/>
-              <a:t>Homework Assignment #2</a:t>
+              <a:t>Using </a:t>
+            </a:r>
+            <a:r>
+              <a:rPr lang="en-US" dirty="0" err="1"/>
+              <a:t>Jupyter</a:t>
+            </a:r>
+            <a:r>
+              <a:rPr lang="en-US" dirty="0"/>
+              <a:t> Notebooks on </a:t>
+            </a:r>
+            <a:r>
+              <a:rPr lang="en-US" dirty="0" err="1"/>
+              <a:t>Jupyter</a:t>
+            </a:r>
+            <a:r>
+              <a:rPr lang="en-US" dirty="0"/>
+              <a:t> Hub</a:t>
             </a:r>
           </a:p>
         </p:txBody>
@@ -7090,7 +8752,7 @@
     </p:spTree>
     <p:extLst>
       <p:ext uri="{BB962C8B-B14F-4D97-AF65-F5344CB8AC3E}">
-        <p14:creationId xmlns:p14="http://schemas.microsoft.com/office/powerpoint/2010/main" val="2559178044"/>
+        <p14:creationId xmlns:p14="http://schemas.microsoft.com/office/powerpoint/2010/main" val="4265313471"/>
       </p:ext>
     </p:extLst>
   </p:cSld>
@@ -7140,7 +8802,7 @@
           <a:p>
             <a:r>
               <a:rPr lang="en-US" dirty="0"/>
-              <a:t>Homework Assignment #3</a:t>
+              <a:t>Homework Assignment #1</a:t>
             </a:r>
           </a:p>
         </p:txBody>
@@ -7208,7 +8870,7 @@
     </p:spTree>
     <p:extLst>
       <p:ext uri="{BB962C8B-B14F-4D97-AF65-F5344CB8AC3E}">
-        <p14:creationId xmlns:p14="http://schemas.microsoft.com/office/powerpoint/2010/main" val="1324729123"/>
+        <p14:creationId xmlns:p14="http://schemas.microsoft.com/office/powerpoint/2010/main" val="2075777911"/>
       </p:ext>
     </p:extLst>
   </p:cSld>
@@ -7258,7 +8920,7 @@
           <a:p>
             <a:r>
               <a:rPr lang="en-US" dirty="0"/>
-              <a:t>Homework Assignment #4</a:t>
+              <a:t>Homework Assignment #2</a:t>
             </a:r>
           </a:p>
         </p:txBody>
@@ -7326,7 +8988,7 @@
     </p:spTree>
     <p:extLst>
       <p:ext uri="{BB962C8B-B14F-4D97-AF65-F5344CB8AC3E}">
-        <p14:creationId xmlns:p14="http://schemas.microsoft.com/office/powerpoint/2010/main" val="1143443951"/>
+        <p14:creationId xmlns:p14="http://schemas.microsoft.com/office/powerpoint/2010/main" val="2559178044"/>
       </p:ext>
     </p:extLst>
   </p:cSld>
@@ -7376,7 +9038,7 @@
           <a:p>
             <a:r>
               <a:rPr lang="en-US" dirty="0"/>
-              <a:t>Homework Assignment #5</a:t>
+              <a:t>Homework Assignment #3</a:t>
             </a:r>
           </a:p>
         </p:txBody>
@@ -7444,7 +9106,7 @@
     </p:spTree>
     <p:extLst>
       <p:ext uri="{BB962C8B-B14F-4D97-AF65-F5344CB8AC3E}">
-        <p14:creationId xmlns:p14="http://schemas.microsoft.com/office/powerpoint/2010/main" val="30250005"/>
+        <p14:creationId xmlns:p14="http://schemas.microsoft.com/office/powerpoint/2010/main" val="1324729123"/>
       </p:ext>
     </p:extLst>
   </p:cSld>
@@ -7747,4 +9409,299 @@
     </a:ext>
   </a:extLst>
 </a:theme>
+</file>
+
+<file path=ppt/theme/theme2.xml><?xml version="1.0" encoding="utf-8"?>
+<a:theme xmlns:a="http://schemas.openxmlformats.org/drawingml/2006/main" name="Office Theme">
+  <a:themeElements>
+    <a:clrScheme name="Office">
+      <a:dk1>
+        <a:sysClr val="windowText" lastClr="000000"/>
+      </a:dk1>
+      <a:lt1>
+        <a:sysClr val="window" lastClr="FFFFFF"/>
+      </a:lt1>
+      <a:dk2>
+        <a:srgbClr val="44546A"/>
+      </a:dk2>
+      <a:lt2>
+        <a:srgbClr val="E7E6E6"/>
+      </a:lt2>
+      <a:accent1>
+        <a:srgbClr val="4472C4"/>
+      </a:accent1>
+      <a:accent2>
+        <a:srgbClr val="ED7D31"/>
+      </a:accent2>
+      <a:accent3>
+        <a:srgbClr val="A5A5A5"/>
+      </a:accent3>
+      <a:accent4>
+        <a:srgbClr val="FFC000"/>
+      </a:accent4>
+      <a:accent5>
+        <a:srgbClr val="5B9BD5"/>
+      </a:accent5>
+      <a:accent6>
+        <a:srgbClr val="70AD47"/>
+      </a:accent6>
+      <a:hlink>
+        <a:srgbClr val="0563C1"/>
+      </a:hlink>
+      <a:folHlink>
+        <a:srgbClr val="954F72"/>
+      </a:folHlink>
+    </a:clrScheme>
+    <a:fontScheme name="Office">
+      <a:majorFont>
+        <a:latin typeface="Calibri Light" panose="020F0302020204030204"/>
+        <a:ea typeface=""/>
+        <a:cs typeface=""/>
+        <a:font script="Jpan" typeface="游ゴシック Light"/>
+        <a:font script="Hang" typeface="맑은 고딕"/>
+        <a:font script="Hans" typeface="等线 Light"/>
+        <a:font script="Hant" typeface="新細明體"/>
+        <a:font script="Arab" typeface="Times New Roman"/>
+        <a:font script="Hebr" typeface="Times New Roman"/>
+        <a:font script="Thai" typeface="Angsana New"/>
+        <a:font script="Ethi" typeface="Nyala"/>
+        <a:font script="Beng" typeface="Vrinda"/>
+        <a:font script="Gujr" typeface="Shruti"/>
+        <a:font script="Khmr" typeface="MoolBoran"/>
+        <a:font script="Knda" typeface="Tunga"/>
+        <a:font script="Guru" typeface="Raavi"/>
+        <a:font script="Cans" typeface="Euphemia"/>
+        <a:font script="Cher" typeface="Plantagenet Cherokee"/>
+        <a:font script="Yiii" typeface="Microsoft Yi Baiti"/>
+        <a:font script="Tibt" typeface="Microsoft Himalaya"/>
+        <a:font script="Thaa" typeface="MV Boli"/>
+        <a:font script="Deva" typeface="Mangal"/>
+        <a:font script="Telu" typeface="Gautami"/>
+        <a:font script="Taml" typeface="Latha"/>
+        <a:font script="Syrc" typeface="Estrangelo Edessa"/>
+        <a:font script="Orya" typeface="Kalinga"/>
+        <a:font script="Mlym" typeface="Kartika"/>
+        <a:font script="Laoo" typeface="DokChampa"/>
+        <a:font script="Sinh" typeface="Iskoola Pota"/>
+        <a:font script="Mong" typeface="Mongolian Baiti"/>
+        <a:font script="Viet" typeface="Times New Roman"/>
+        <a:font script="Uigh" typeface="Microsoft Uighur"/>
+        <a:font script="Geor" typeface="Sylfaen"/>
+        <a:font script="Armn" typeface="Arial"/>
+        <a:font script="Bugi" typeface="Leelawadee UI"/>
+        <a:font script="Bopo" typeface="Microsoft JhengHei"/>
+        <a:font script="Java" typeface="Javanese Text"/>
+        <a:font script="Lisu" typeface="Segoe UI"/>
+        <a:font script="Mymr" typeface="Myanmar Text"/>
+        <a:font script="Nkoo" typeface="Ebrima"/>
+        <a:font script="Olck" typeface="Nirmala UI"/>
+        <a:font script="Osma" typeface="Ebrima"/>
+        <a:font script="Phag" typeface="Phagspa"/>
+        <a:font script="Syrn" typeface="Estrangelo Edessa"/>
+        <a:font script="Syrj" typeface="Estrangelo Edessa"/>
+        <a:font script="Syre" typeface="Estrangelo Edessa"/>
+        <a:font script="Sora" typeface="Nirmala UI"/>
+        <a:font script="Tale" typeface="Microsoft Tai Le"/>
+        <a:font script="Talu" typeface="Microsoft New Tai Lue"/>
+        <a:font script="Tfng" typeface="Ebrima"/>
+      </a:majorFont>
+      <a:minorFont>
+        <a:latin typeface="Calibri" panose="020F0502020204030204"/>
+        <a:ea typeface=""/>
+        <a:cs typeface=""/>
+        <a:font script="Jpan" typeface="游ゴシック"/>
+        <a:font script="Hang" typeface="맑은 고딕"/>
+        <a:font script="Hans" typeface="等线"/>
+        <a:font script="Hant" typeface="新細明體"/>
+        <a:font script="Arab" typeface="Arial"/>
+        <a:font script="Hebr" typeface="Arial"/>
+        <a:font script="Thai" typeface="Cordia New"/>
+        <a:font script="Ethi" typeface="Nyala"/>
+        <a:font script="Beng" typeface="Vrinda"/>
+        <a:font script="Gujr" typeface="Shruti"/>
+        <a:font script="Khmr" typeface="DaunPenh"/>
+        <a:font script="Knda" typeface="Tunga"/>
+        <a:font script="Guru" typeface="Raavi"/>
+        <a:font script="Cans" typeface="Euphemia"/>
+        <a:font script="Cher" typeface="Plantagenet Cherokee"/>
+        <a:font script="Yiii" typeface="Microsoft Yi Baiti"/>
+        <a:font script="Tibt" typeface="Microsoft Himalaya"/>
+        <a:font script="Thaa" typeface="MV Boli"/>
+        <a:font script="Deva" typeface="Mangal"/>
+        <a:font script="Telu" typeface="Gautami"/>
+        <a:font script="Taml" typeface="Latha"/>
+        <a:font script="Syrc" typeface="Estrangelo Edessa"/>
+        <a:font script="Orya" typeface="Kalinga"/>
+        <a:font script="Mlym" typeface="Kartika"/>
+        <a:font script="Laoo" typeface="DokChampa"/>
+        <a:font script="Sinh" typeface="Iskoola Pota"/>
+        <a:font script="Mong" typeface="Mongolian Baiti"/>
+        <a:font script="Viet" typeface="Arial"/>
+        <a:font script="Uigh" typeface="Microsoft Uighur"/>
+        <a:font script="Geor" typeface="Sylfaen"/>
+        <a:font script="Armn" typeface="Arial"/>
+        <a:font script="Bugi" typeface="Leelawadee UI"/>
+        <a:font script="Bopo" typeface="Microsoft JhengHei"/>
+        <a:font script="Java" typeface="Javanese Text"/>
+        <a:font script="Lisu" typeface="Segoe UI"/>
+        <a:font script="Mymr" typeface="Myanmar Text"/>
+        <a:font script="Nkoo" typeface="Ebrima"/>
+        <a:font script="Olck" typeface="Nirmala UI"/>
+        <a:font script="Osma" typeface="Ebrima"/>
+        <a:font script="Phag" typeface="Phagspa"/>
+        <a:font script="Syrn" typeface="Estrangelo Edessa"/>
+        <a:font script="Syrj" typeface="Estrangelo Edessa"/>
+        <a:font script="Syre" typeface="Estrangelo Edessa"/>
+        <a:font script="Sora" typeface="Nirmala UI"/>
+        <a:font script="Tale" typeface="Microsoft Tai Le"/>
+        <a:font script="Talu" typeface="Microsoft New Tai Lue"/>
+        <a:font script="Tfng" typeface="Ebrima"/>
+      </a:minorFont>
+    </a:fontScheme>
+    <a:fmtScheme name="Office">
+      <a:fillStyleLst>
+        <a:solidFill>
+          <a:schemeClr val="phClr"/>
+        </a:solidFill>
+        <a:gradFill rotWithShape="1">
+          <a:gsLst>
+            <a:gs pos="0">
+              <a:schemeClr val="phClr">
+                <a:lumMod val="110000"/>
+                <a:satMod val="105000"/>
+                <a:tint val="67000"/>
+              </a:schemeClr>
+            </a:gs>
+            <a:gs pos="50000">
+              <a:schemeClr val="phClr">
+                <a:lumMod val="105000"/>
+                <a:satMod val="103000"/>
+                <a:tint val="73000"/>
+              </a:schemeClr>
+            </a:gs>
+            <a:gs pos="100000">
+              <a:schemeClr val="phClr">
+                <a:lumMod val="105000"/>
+                <a:satMod val="109000"/>
+                <a:tint val="81000"/>
+              </a:schemeClr>
+            </a:gs>
+          </a:gsLst>
+          <a:lin ang="5400000" scaled="0"/>
+        </a:gradFill>
+        <a:gradFill rotWithShape="1">
+          <a:gsLst>
+            <a:gs pos="0">
+              <a:schemeClr val="phClr">
+                <a:satMod val="103000"/>
+                <a:lumMod val="102000"/>
+                <a:tint val="94000"/>
+              </a:schemeClr>
+            </a:gs>
+            <a:gs pos="50000">
+              <a:schemeClr val="phClr">
+                <a:satMod val="110000"/>
+                <a:lumMod val="100000"/>
+                <a:shade val="100000"/>
+              </a:schemeClr>
+            </a:gs>
+            <a:gs pos="100000">
+              <a:schemeClr val="phClr">
+                <a:lumMod val="99000"/>
+                <a:satMod val="120000"/>
+                <a:shade val="78000"/>
+              </a:schemeClr>
+            </a:gs>
+          </a:gsLst>
+          <a:lin ang="5400000" scaled="0"/>
+        </a:gradFill>
+      </a:fillStyleLst>
+      <a:lnStyleLst>
+        <a:ln w="6350" cap="flat" cmpd="sng" algn="ctr">
+          <a:solidFill>
+            <a:schemeClr val="phClr"/>
+          </a:solidFill>
+          <a:prstDash val="solid"/>
+          <a:miter lim="800000"/>
+        </a:ln>
+        <a:ln w="12700" cap="flat" cmpd="sng" algn="ctr">
+          <a:solidFill>
+            <a:schemeClr val="phClr"/>
+          </a:solidFill>
+          <a:prstDash val="solid"/>
+          <a:miter lim="800000"/>
+        </a:ln>
+        <a:ln w="19050" cap="flat" cmpd="sng" algn="ctr">
+          <a:solidFill>
+            <a:schemeClr val="phClr"/>
+          </a:solidFill>
+          <a:prstDash val="solid"/>
+          <a:miter lim="800000"/>
+        </a:ln>
+      </a:lnStyleLst>
+      <a:effectStyleLst>
+        <a:effectStyle>
+          <a:effectLst/>
+        </a:effectStyle>
+        <a:effectStyle>
+          <a:effectLst/>
+        </a:effectStyle>
+        <a:effectStyle>
+          <a:effectLst>
+            <a:outerShdw blurRad="57150" dist="19050" dir="5400000" algn="ctr" rotWithShape="0">
+              <a:srgbClr val="000000">
+                <a:alpha val="63000"/>
+              </a:srgbClr>
+            </a:outerShdw>
+          </a:effectLst>
+        </a:effectStyle>
+      </a:effectStyleLst>
+      <a:bgFillStyleLst>
+        <a:solidFill>
+          <a:schemeClr val="phClr"/>
+        </a:solidFill>
+        <a:solidFill>
+          <a:schemeClr val="phClr">
+            <a:tint val="95000"/>
+            <a:satMod val="170000"/>
+          </a:schemeClr>
+        </a:solidFill>
+        <a:gradFill rotWithShape="1">
+          <a:gsLst>
+            <a:gs pos="0">
+              <a:schemeClr val="phClr">
+                <a:tint val="93000"/>
+                <a:satMod val="150000"/>
+                <a:shade val="98000"/>
+                <a:lumMod val="102000"/>
+              </a:schemeClr>
+            </a:gs>
+            <a:gs pos="50000">
+              <a:schemeClr val="phClr">
+                <a:tint val="98000"/>
+                <a:satMod val="130000"/>
+                <a:shade val="90000"/>
+                <a:lumMod val="103000"/>
+              </a:schemeClr>
+            </a:gs>
+            <a:gs pos="100000">
+              <a:schemeClr val="phClr">
+                <a:shade val="63000"/>
+                <a:satMod val="120000"/>
+              </a:schemeClr>
+            </a:gs>
+          </a:gsLst>
+          <a:lin ang="5400000" scaled="0"/>
+        </a:gradFill>
+      </a:bgFillStyleLst>
+    </a:fmtScheme>
+  </a:themeElements>
+  <a:objectDefaults/>
+  <a:extraClrSchemeLst/>
+  <a:extLst>
+    <a:ext uri="{05A4C25C-085E-4340-85A3-A5531E510DB2}">
+      <thm15:themeFamily xmlns:thm15="http://schemas.microsoft.com/office/thememl/2012/main" name="Office Theme" id="{62F939B6-93AF-4DB8-9C6B-D6C7DFDC589F}" vid="{4A3C46E8-61CC-4603-A589-7422A47A8E4A}"/>
+    </a:ext>
+  </a:extLst>
+</a:theme>
 </file>
</xml_diff>

<commit_message>
fmk - fixing setup page
</commit_message>
<xml_diff>
--- a/presentations/SimCenter Bootcamp Python.pptx
+++ b/presentations/SimCenter Bootcamp Python.pptx
@@ -134,6 +134,11 @@
       </a:defRPr>
     </a:lvl9pPr>
   </p:defaultTextStyle>
+  <p:extLst>
+    <p:ext uri="{EFAFB233-063F-42B5-8137-9DF3F51BA10A}">
+      <p15:sldGuideLst xmlns:p15="http://schemas.microsoft.com/office/powerpoint/2012/main"/>
+    </p:ext>
+  </p:extLst>
 </p:presentation>
 </file>
 
@@ -557,7 +562,7 @@
         <p:spPr>
           <a:xfrm>
             <a:off x="1470991" y="1182137"/>
-            <a:ext cx="8676861" cy="1569660"/>
+            <a:ext cx="8676861" cy="830997"/>
           </a:xfrm>
           <a:prstGeom prst="rect">
             <a:avLst/>
@@ -597,31 +602,7 @@
                 <a:ea typeface="+mn-ea"/>
                 <a:cs typeface="+mn-cs"/>
               </a:rPr>
-              <a:t>NHERI </a:t>
-            </a:r>
-            <a:r>
-              <a:rPr lang="en-US" sz="4800" b="1" i="0" kern="1200" dirty="0" err="1">
-                <a:solidFill>
-                  <a:schemeClr val="tx1"/>
-                </a:solidFill>
-                <a:effectLst/>
-                <a:latin typeface="+mj-lt"/>
-                <a:ea typeface="+mn-ea"/>
-                <a:cs typeface="+mn-cs"/>
-              </a:rPr>
-              <a:t>SimCenter</a:t>
-            </a:r>
-            <a:r>
-              <a:rPr lang="en-US" sz="4800" b="1" i="0" kern="1200" dirty="0">
-                <a:solidFill>
-                  <a:schemeClr val="tx1"/>
-                </a:solidFill>
-                <a:effectLst/>
-                <a:latin typeface="+mj-lt"/>
-                <a:ea typeface="+mn-ea"/>
-                <a:cs typeface="+mn-cs"/>
-              </a:rPr>
-              <a:t> 2020 Programming Bootcamp</a:t>
+              <a:t>2020 Programming Bootcamp</a:t>
             </a:r>
             <a:endParaRPr lang="en-US" sz="4800" dirty="0">
               <a:latin typeface="+mj-lt"/>
@@ -857,7 +838,7 @@
           <a:p>
             <a:fld id="{B84125C9-AED3-0F47-B44C-0465FAA4AF51}" type="datetimeFigureOut">
               <a:rPr lang="en-US" smtClean="0"/>
-              <a:t>8/5/20</a:t>
+              <a:t>8/9/20</a:t>
             </a:fld>
             <a:endParaRPr lang="en-US"/>
           </a:p>
@@ -1055,7 +1036,7 @@
           <a:p>
             <a:fld id="{B84125C9-AED3-0F47-B44C-0465FAA4AF51}" type="datetimeFigureOut">
               <a:rPr lang="en-US" smtClean="0"/>
-              <a:t>8/5/20</a:t>
+              <a:t>8/9/20</a:t>
             </a:fld>
             <a:endParaRPr lang="en-US"/>
           </a:p>
@@ -1263,7 +1244,7 @@
           <a:p>
             <a:fld id="{B84125C9-AED3-0F47-B44C-0465FAA4AF51}" type="datetimeFigureOut">
               <a:rPr lang="en-US" smtClean="0"/>
-              <a:t>8/5/20</a:t>
+              <a:t>8/9/20</a:t>
             </a:fld>
             <a:endParaRPr lang="en-US"/>
           </a:p>
@@ -1483,7 +1464,7 @@
           <a:p>
             <a:fld id="{B84125C9-AED3-0F47-B44C-0465FAA4AF51}" type="datetimeFigureOut">
               <a:rPr lang="en-US" smtClean="0"/>
-              <a:t>8/5/20</a:t>
+              <a:t>8/9/20</a:t>
             </a:fld>
             <a:endParaRPr lang="en-US"/>
           </a:p>
@@ -1681,7 +1662,7 @@
           <a:p>
             <a:fld id="{B84125C9-AED3-0F47-B44C-0465FAA4AF51}" type="datetimeFigureOut">
               <a:rPr lang="en-US" smtClean="0"/>
-              <a:t>8/5/20</a:t>
+              <a:t>8/9/20</a:t>
             </a:fld>
             <a:endParaRPr lang="en-US"/>
           </a:p>
@@ -1956,7 +1937,7 @@
           <a:p>
             <a:fld id="{B84125C9-AED3-0F47-B44C-0465FAA4AF51}" type="datetimeFigureOut">
               <a:rPr lang="en-US" smtClean="0"/>
-              <a:t>8/5/20</a:t>
+              <a:t>8/9/20</a:t>
             </a:fld>
             <a:endParaRPr lang="en-US"/>
           </a:p>
@@ -2221,7 +2202,7 @@
           <a:p>
             <a:fld id="{B84125C9-AED3-0F47-B44C-0465FAA4AF51}" type="datetimeFigureOut">
               <a:rPr lang="en-US" smtClean="0"/>
-              <a:t>8/5/20</a:t>
+              <a:t>8/9/20</a:t>
             </a:fld>
             <a:endParaRPr lang="en-US"/>
           </a:p>
@@ -2633,7 +2614,7 @@
           <a:p>
             <a:fld id="{B84125C9-AED3-0F47-B44C-0465FAA4AF51}" type="datetimeFigureOut">
               <a:rPr lang="en-US" smtClean="0"/>
-              <a:t>8/5/20</a:t>
+              <a:t>8/9/20</a:t>
             </a:fld>
             <a:endParaRPr lang="en-US"/>
           </a:p>
@@ -2774,7 +2755,7 @@
           <a:p>
             <a:fld id="{B84125C9-AED3-0F47-B44C-0465FAA4AF51}" type="datetimeFigureOut">
               <a:rPr lang="en-US" smtClean="0"/>
-              <a:t>8/5/20</a:t>
+              <a:t>8/9/20</a:t>
             </a:fld>
             <a:endParaRPr lang="en-US"/>
           </a:p>
@@ -2887,7 +2868,7 @@
           <a:p>
             <a:fld id="{B84125C9-AED3-0F47-B44C-0465FAA4AF51}" type="datetimeFigureOut">
               <a:rPr lang="en-US" smtClean="0"/>
-              <a:t>8/5/20</a:t>
+              <a:t>8/9/20</a:t>
             </a:fld>
             <a:endParaRPr lang="en-US"/>
           </a:p>
@@ -3198,7 +3179,7 @@
           <a:p>
             <a:fld id="{B84125C9-AED3-0F47-B44C-0465FAA4AF51}" type="datetimeFigureOut">
               <a:rPr lang="en-US" smtClean="0"/>
-              <a:t>8/5/20</a:t>
+              <a:t>8/9/20</a:t>
             </a:fld>
             <a:endParaRPr lang="en-US"/>
           </a:p>
@@ -3439,7 +3420,7 @@
           <a:p>
             <a:fld id="{B84125C9-AED3-0F47-B44C-0465FAA4AF51}" type="datetimeFigureOut">
               <a:rPr lang="en-US" smtClean="0"/>
-              <a:t>8/5/20</a:t>
+              <a:t>8/9/20</a:t>
             </a:fld>
             <a:endParaRPr lang="en-US"/>
           </a:p>

</xml_diff>

<commit_message>
changes to notebook after live presentation on day 1
</commit_message>
<xml_diff>
--- a/presentations/SimCenter Bootcamp Python.pptx
+++ b/presentations/SimCenter Bootcamp Python.pptx
@@ -6,36 +6,37 @@
   </p:sldMasterIdLst>
   <p:sldIdLst>
     <p:sldId id="258" r:id="rId2"/>
-    <p:sldId id="256" r:id="rId3"/>
-    <p:sldId id="279" r:id="rId4"/>
-    <p:sldId id="277" r:id="rId5"/>
-    <p:sldId id="259" r:id="rId6"/>
-    <p:sldId id="283" r:id="rId7"/>
-    <p:sldId id="284" r:id="rId8"/>
-    <p:sldId id="281" r:id="rId9"/>
-    <p:sldId id="282" r:id="rId10"/>
-    <p:sldId id="263" r:id="rId11"/>
-    <p:sldId id="278" r:id="rId12"/>
-    <p:sldId id="280" r:id="rId13"/>
-    <p:sldId id="260" r:id="rId14"/>
-    <p:sldId id="261" r:id="rId15"/>
-    <p:sldId id="262" r:id="rId16"/>
-    <p:sldId id="264" r:id="rId17"/>
-    <p:sldId id="285" r:id="rId18"/>
-    <p:sldId id="286" r:id="rId19"/>
-    <p:sldId id="265" r:id="rId20"/>
-    <p:sldId id="266" r:id="rId21"/>
-    <p:sldId id="267" r:id="rId22"/>
-    <p:sldId id="268" r:id="rId23"/>
-    <p:sldId id="269" r:id="rId24"/>
-    <p:sldId id="270" r:id="rId25"/>
-    <p:sldId id="271" r:id="rId26"/>
-    <p:sldId id="272" r:id="rId27"/>
-    <p:sldId id="273" r:id="rId28"/>
-    <p:sldId id="274" r:id="rId29"/>
-    <p:sldId id="275" r:id="rId30"/>
-    <p:sldId id="276" r:id="rId31"/>
-    <p:sldId id="257" r:id="rId32"/>
+    <p:sldId id="287" r:id="rId3"/>
+    <p:sldId id="256" r:id="rId4"/>
+    <p:sldId id="279" r:id="rId5"/>
+    <p:sldId id="277" r:id="rId6"/>
+    <p:sldId id="259" r:id="rId7"/>
+    <p:sldId id="283" r:id="rId8"/>
+    <p:sldId id="284" r:id="rId9"/>
+    <p:sldId id="281" r:id="rId10"/>
+    <p:sldId id="282" r:id="rId11"/>
+    <p:sldId id="263" r:id="rId12"/>
+    <p:sldId id="278" r:id="rId13"/>
+    <p:sldId id="280" r:id="rId14"/>
+    <p:sldId id="260" r:id="rId15"/>
+    <p:sldId id="261" r:id="rId16"/>
+    <p:sldId id="262" r:id="rId17"/>
+    <p:sldId id="264" r:id="rId18"/>
+    <p:sldId id="285" r:id="rId19"/>
+    <p:sldId id="286" r:id="rId20"/>
+    <p:sldId id="265" r:id="rId21"/>
+    <p:sldId id="266" r:id="rId22"/>
+    <p:sldId id="267" r:id="rId23"/>
+    <p:sldId id="268" r:id="rId24"/>
+    <p:sldId id="269" r:id="rId25"/>
+    <p:sldId id="270" r:id="rId26"/>
+    <p:sldId id="271" r:id="rId27"/>
+    <p:sldId id="272" r:id="rId28"/>
+    <p:sldId id="273" r:id="rId29"/>
+    <p:sldId id="274" r:id="rId30"/>
+    <p:sldId id="275" r:id="rId31"/>
+    <p:sldId id="276" r:id="rId32"/>
+    <p:sldId id="257" r:id="rId33"/>
   </p:sldIdLst>
   <p:sldSz cx="12192000" cy="6858000"/>
   <p:notesSz cx="6858000" cy="9144000"/>
@@ -838,7 +839,7 @@
           <a:p>
             <a:fld id="{B84125C9-AED3-0F47-B44C-0465FAA4AF51}" type="datetimeFigureOut">
               <a:rPr lang="en-US" smtClean="0"/>
-              <a:t>8/9/20</a:t>
+              <a:t>8/10/20</a:t>
             </a:fld>
             <a:endParaRPr lang="en-US"/>
           </a:p>
@@ -1036,7 +1037,7 @@
           <a:p>
             <a:fld id="{B84125C9-AED3-0F47-B44C-0465FAA4AF51}" type="datetimeFigureOut">
               <a:rPr lang="en-US" smtClean="0"/>
-              <a:t>8/9/20</a:t>
+              <a:t>8/10/20</a:t>
             </a:fld>
             <a:endParaRPr lang="en-US"/>
           </a:p>
@@ -1244,7 +1245,7 @@
           <a:p>
             <a:fld id="{B84125C9-AED3-0F47-B44C-0465FAA4AF51}" type="datetimeFigureOut">
               <a:rPr lang="en-US" smtClean="0"/>
-              <a:t>8/9/20</a:t>
+              <a:t>8/10/20</a:t>
             </a:fld>
             <a:endParaRPr lang="en-US"/>
           </a:p>
@@ -1464,7 +1465,7 @@
           <a:p>
             <a:fld id="{B84125C9-AED3-0F47-B44C-0465FAA4AF51}" type="datetimeFigureOut">
               <a:rPr lang="en-US" smtClean="0"/>
-              <a:t>8/9/20</a:t>
+              <a:t>8/10/20</a:t>
             </a:fld>
             <a:endParaRPr lang="en-US"/>
           </a:p>
@@ -1662,7 +1663,7 @@
           <a:p>
             <a:fld id="{B84125C9-AED3-0F47-B44C-0465FAA4AF51}" type="datetimeFigureOut">
               <a:rPr lang="en-US" smtClean="0"/>
-              <a:t>8/9/20</a:t>
+              <a:t>8/10/20</a:t>
             </a:fld>
             <a:endParaRPr lang="en-US"/>
           </a:p>
@@ -1937,7 +1938,7 @@
           <a:p>
             <a:fld id="{B84125C9-AED3-0F47-B44C-0465FAA4AF51}" type="datetimeFigureOut">
               <a:rPr lang="en-US" smtClean="0"/>
-              <a:t>8/9/20</a:t>
+              <a:t>8/10/20</a:t>
             </a:fld>
             <a:endParaRPr lang="en-US"/>
           </a:p>
@@ -2202,7 +2203,7 @@
           <a:p>
             <a:fld id="{B84125C9-AED3-0F47-B44C-0465FAA4AF51}" type="datetimeFigureOut">
               <a:rPr lang="en-US" smtClean="0"/>
-              <a:t>8/9/20</a:t>
+              <a:t>8/10/20</a:t>
             </a:fld>
             <a:endParaRPr lang="en-US"/>
           </a:p>
@@ -2614,7 +2615,7 @@
           <a:p>
             <a:fld id="{B84125C9-AED3-0F47-B44C-0465FAA4AF51}" type="datetimeFigureOut">
               <a:rPr lang="en-US" smtClean="0"/>
-              <a:t>8/9/20</a:t>
+              <a:t>8/10/20</a:t>
             </a:fld>
             <a:endParaRPr lang="en-US"/>
           </a:p>
@@ -2755,7 +2756,7 @@
           <a:p>
             <a:fld id="{B84125C9-AED3-0F47-B44C-0465FAA4AF51}" type="datetimeFigureOut">
               <a:rPr lang="en-US" smtClean="0"/>
-              <a:t>8/9/20</a:t>
+              <a:t>8/10/20</a:t>
             </a:fld>
             <a:endParaRPr lang="en-US"/>
           </a:p>
@@ -2868,7 +2869,7 @@
           <a:p>
             <a:fld id="{B84125C9-AED3-0F47-B44C-0465FAA4AF51}" type="datetimeFigureOut">
               <a:rPr lang="en-US" smtClean="0"/>
-              <a:t>8/9/20</a:t>
+              <a:t>8/10/20</a:t>
             </a:fld>
             <a:endParaRPr lang="en-US"/>
           </a:p>
@@ -3179,7 +3180,7 @@
           <a:p>
             <a:fld id="{B84125C9-AED3-0F47-B44C-0465FAA4AF51}" type="datetimeFigureOut">
               <a:rPr lang="en-US" smtClean="0"/>
-              <a:t>8/9/20</a:t>
+              <a:t>8/10/20</a:t>
             </a:fld>
             <a:endParaRPr lang="en-US"/>
           </a:p>
@@ -3420,7 +3421,7 @@
           <a:p>
             <a:fld id="{B84125C9-AED3-0F47-B44C-0465FAA4AF51}" type="datetimeFigureOut">
               <a:rPr lang="en-US" smtClean="0"/>
-              <a:t>8/9/20</a:t>
+              <a:t>8/10/20</a:t>
             </a:fld>
             <a:endParaRPr lang="en-US"/>
           </a:p>
@@ -3854,15 +3855,37 @@
             <p:ph type="subTitle" idx="1"/>
           </p:nvPr>
         </p:nvSpPr>
-        <p:spPr/>
-        <p:txBody>
-          <a:bodyPr/>
-          <a:lstStyle/>
-          <a:p>
-            <a:r>
-              <a:rPr lang="en-US" dirty="0"/>
-              <a:t>Welcome Message</a:t>
-            </a:r>
+        <p:spPr>
+          <a:xfrm>
+            <a:off x="1211915" y="2049517"/>
+            <a:ext cx="9768168" cy="2003189"/>
+          </a:xfrm>
+        </p:spPr>
+        <p:txBody>
+          <a:bodyPr/>
+          <a:lstStyle/>
+          <a:p>
+            <a:r>
+              <a:rPr lang="en-US" sz="4000" dirty="0">
+                <a:solidFill>
+                  <a:srgbClr val="FF0000"/>
+                </a:solidFill>
+              </a:rPr>
+              <a:t>PLEASE MAKE SURE TO COMPLETE THE SETUP AHEAD OF THE FIRST SESSION</a:t>
+            </a:r>
+          </a:p>
+          <a:p>
+            <a:r>
+              <a:rPr lang="en-US" dirty="0">
+                <a:hlinkClick r:id="rId2"/>
+              </a:rPr>
+              <a:t>https://nheri-simcenter.github.io/SimCenterBootcamp2020/</a:t>
+            </a:r>
+            <a:endParaRPr lang="en-US" dirty="0">
+              <a:solidFill>
+                <a:srgbClr val="FF0000"/>
+              </a:solidFill>
+            </a:endParaRPr>
           </a:p>
         </p:txBody>
       </p:sp>
@@ -3882,17 +3905,26 @@
             <p:ph type="body" sz="quarter" idx="11"/>
           </p:nvPr>
         </p:nvSpPr>
-        <p:spPr/>
+        <p:spPr>
+          <a:xfrm>
+            <a:off x="2706484" y="4208520"/>
+            <a:ext cx="6779029" cy="419322"/>
+          </a:xfrm>
+        </p:spPr>
         <p:txBody>
           <a:bodyPr>
-            <a:normAutofit lnSpcReduction="10000"/>
+            <a:noAutofit/>
           </a:bodyPr>
           <a:lstStyle/>
           <a:p>
             <a:r>
-              <a:rPr lang="en-US" dirty="0"/>
+              <a:rPr lang="en-US" b="1" dirty="0"/>
               <a:t>Frank McKenna</a:t>
             </a:r>
+            <a:r>
+              <a:rPr lang="en-US" dirty="0"/>
+              <a:t>, University of California at Berkeley</a:t>
+            </a:r>
           </a:p>
         </p:txBody>
       </p:sp>
@@ -3912,16 +3944,25 @@
             <p:ph type="body" sz="quarter" idx="12"/>
           </p:nvPr>
         </p:nvSpPr>
-        <p:spPr/>
+        <p:spPr>
+          <a:xfrm>
+            <a:off x="2632911" y="4627842"/>
+            <a:ext cx="6926174" cy="355589"/>
+          </a:xfrm>
+        </p:spPr>
         <p:txBody>
           <a:bodyPr>
-            <a:normAutofit fontScale="92500" lnSpcReduction="20000"/>
+            <a:noAutofit/>
           </a:bodyPr>
           <a:lstStyle/>
           <a:p>
             <a:r>
-              <a:rPr lang="en-US" dirty="0"/>
-              <a:t>University of California at Berkeley</a:t>
+              <a:rPr lang="en-US" b="1" dirty="0"/>
+              <a:t>Peter Mackenzie-Helnwein</a:t>
+            </a:r>
+            <a:r>
+              <a:rPr lang="en-US" dirty="0"/>
+              <a:t>, University of Washington</a:t>
             </a:r>
           </a:p>
         </p:txBody>
@@ -3979,7 +4020,7 @@
           <a:p>
             <a:r>
               <a:rPr lang="en-US" dirty="0"/>
-              <a:t>Python – Introduction &amp; Outline</a:t>
+              <a:t>Homework Assignment #5</a:t>
             </a:r>
           </a:p>
         </p:txBody>
@@ -4047,7 +4088,7 @@
     </p:spTree>
     <p:extLst>
       <p:ext uri="{BB962C8B-B14F-4D97-AF65-F5344CB8AC3E}">
-        <p14:creationId xmlns:p14="http://schemas.microsoft.com/office/powerpoint/2010/main" val="4268128634"/>
+        <p14:creationId xmlns:p14="http://schemas.microsoft.com/office/powerpoint/2010/main" val="30250005"/>
       </p:ext>
     </p:extLst>
   </p:cSld>
@@ -4097,7 +4138,7 @@
           <a:p>
             <a:r>
               <a:rPr lang="en-US" dirty="0"/>
-              <a:t>Python Basics – Data types</a:t>
+              <a:t>Python – Introduction &amp; Outline</a:t>
             </a:r>
           </a:p>
         </p:txBody>
@@ -4165,7 +4206,7 @@
     </p:spTree>
     <p:extLst>
       <p:ext uri="{BB962C8B-B14F-4D97-AF65-F5344CB8AC3E}">
-        <p14:creationId xmlns:p14="http://schemas.microsoft.com/office/powerpoint/2010/main" val="736959774"/>
+        <p14:creationId xmlns:p14="http://schemas.microsoft.com/office/powerpoint/2010/main" val="4268128634"/>
       </p:ext>
     </p:extLst>
   </p:cSld>
@@ -4215,7 +4256,7 @@
           <a:p>
             <a:r>
               <a:rPr lang="en-US" dirty="0"/>
-              <a:t>Python Basics – Flow control</a:t>
+              <a:t>Python Basics – Data types</a:t>
             </a:r>
           </a:p>
         </p:txBody>
@@ -4283,7 +4324,7 @@
     </p:spTree>
     <p:extLst>
       <p:ext uri="{BB962C8B-B14F-4D97-AF65-F5344CB8AC3E}">
-        <p14:creationId xmlns:p14="http://schemas.microsoft.com/office/powerpoint/2010/main" val="107052457"/>
+        <p14:creationId xmlns:p14="http://schemas.microsoft.com/office/powerpoint/2010/main" val="736959774"/>
       </p:ext>
     </p:extLst>
   </p:cSld>
@@ -4333,15 +4374,7 @@
           <a:p>
             <a:r>
               <a:rPr lang="en-US" dirty="0"/>
-              <a:t>Python – Matrix data types (</a:t>
-            </a:r>
-            <a:r>
-              <a:rPr lang="en-US" dirty="0" err="1"/>
-              <a:t>numpy</a:t>
-            </a:r>
-            <a:r>
-              <a:rPr lang="en-US" dirty="0"/>
-              <a:t>)</a:t>
+              <a:t>Python Basics – Flow control</a:t>
             </a:r>
           </a:p>
         </p:txBody>
@@ -4409,7 +4442,7 @@
     </p:spTree>
     <p:extLst>
       <p:ext uri="{BB962C8B-B14F-4D97-AF65-F5344CB8AC3E}">
-        <p14:creationId xmlns:p14="http://schemas.microsoft.com/office/powerpoint/2010/main" val="3014116120"/>
+        <p14:creationId xmlns:p14="http://schemas.microsoft.com/office/powerpoint/2010/main" val="107052457"/>
       </p:ext>
     </p:extLst>
   </p:cSld>
@@ -4459,7 +4492,15 @@
           <a:p>
             <a:r>
               <a:rPr lang="en-US" dirty="0"/>
-              <a:t>Python – File IO</a:t>
+              <a:t>Python – Matrix data types (</a:t>
+            </a:r>
+            <a:r>
+              <a:rPr lang="en-US" dirty="0" err="1"/>
+              <a:t>numpy</a:t>
+            </a:r>
+            <a:r>
+              <a:rPr lang="en-US" dirty="0"/>
+              <a:t>)</a:t>
             </a:r>
           </a:p>
         </p:txBody>
@@ -4527,7 +4568,7 @@
     </p:spTree>
     <p:extLst>
       <p:ext uri="{BB962C8B-B14F-4D97-AF65-F5344CB8AC3E}">
-        <p14:creationId xmlns:p14="http://schemas.microsoft.com/office/powerpoint/2010/main" val="3093321143"/>
+        <p14:creationId xmlns:p14="http://schemas.microsoft.com/office/powerpoint/2010/main" val="3014116120"/>
       </p:ext>
     </p:extLst>
   </p:cSld>
@@ -4577,7 +4618,7 @@
           <a:p>
             <a:r>
               <a:rPr lang="en-US" dirty="0"/>
-              <a:t>Python - Plotting</a:t>
+              <a:t>Python – File IO</a:t>
             </a:r>
           </a:p>
         </p:txBody>
@@ -4645,7 +4686,7 @@
     </p:spTree>
     <p:extLst>
       <p:ext uri="{BB962C8B-B14F-4D97-AF65-F5344CB8AC3E}">
-        <p14:creationId xmlns:p14="http://schemas.microsoft.com/office/powerpoint/2010/main" val="4223368661"/>
+        <p14:creationId xmlns:p14="http://schemas.microsoft.com/office/powerpoint/2010/main" val="3093321143"/>
       </p:ext>
     </p:extLst>
   </p:cSld>
@@ -4695,7 +4736,7 @@
           <a:p>
             <a:r>
               <a:rPr lang="en-US" dirty="0"/>
-              <a:t>Python – OOP 1: classes</a:t>
+              <a:t>Python - Plotting</a:t>
             </a:r>
           </a:p>
         </p:txBody>
@@ -4763,7 +4804,7 @@
     </p:spTree>
     <p:extLst>
       <p:ext uri="{BB962C8B-B14F-4D97-AF65-F5344CB8AC3E}">
-        <p14:creationId xmlns:p14="http://schemas.microsoft.com/office/powerpoint/2010/main" val="4220558212"/>
+        <p14:creationId xmlns:p14="http://schemas.microsoft.com/office/powerpoint/2010/main" val="4223368661"/>
       </p:ext>
     </p:extLst>
   </p:cSld>
@@ -4813,7 +4854,7 @@
           <a:p>
             <a:r>
               <a:rPr lang="en-US" dirty="0"/>
-              <a:t>Python – OOP 1: inheritance</a:t>
+              <a:t>Python – OOP 1: classes</a:t>
             </a:r>
           </a:p>
         </p:txBody>
@@ -4881,7 +4922,7 @@
     </p:spTree>
     <p:extLst>
       <p:ext uri="{BB962C8B-B14F-4D97-AF65-F5344CB8AC3E}">
-        <p14:creationId xmlns:p14="http://schemas.microsoft.com/office/powerpoint/2010/main" val="3134847154"/>
+        <p14:creationId xmlns:p14="http://schemas.microsoft.com/office/powerpoint/2010/main" val="4220558212"/>
       </p:ext>
     </p:extLst>
   </p:cSld>
@@ -4931,7 +4972,7 @@
           <a:p>
             <a:r>
               <a:rPr lang="en-US" dirty="0"/>
-              <a:t>Python – OOP 1: operator overload</a:t>
+              <a:t>Python – OOP 1: inheritance</a:t>
             </a:r>
           </a:p>
         </p:txBody>
@@ -4999,7 +5040,7 @@
     </p:spTree>
     <p:extLst>
       <p:ext uri="{BB962C8B-B14F-4D97-AF65-F5344CB8AC3E}">
-        <p14:creationId xmlns:p14="http://schemas.microsoft.com/office/powerpoint/2010/main" val="2761363269"/>
+        <p14:creationId xmlns:p14="http://schemas.microsoft.com/office/powerpoint/2010/main" val="3134847154"/>
       </p:ext>
     </p:extLst>
   </p:cSld>
@@ -5047,7 +5088,10 @@
           <a:bodyPr/>
           <a:lstStyle/>
           <a:p>
-            <a:endParaRPr lang="en-US"/>
+            <a:r>
+              <a:rPr lang="en-US" dirty="0"/>
+              <a:t>Python – OOP 1: operator overload</a:t>
+            </a:r>
           </a:p>
         </p:txBody>
       </p:sp>
@@ -5114,7 +5158,7 @@
     </p:spTree>
     <p:extLst>
       <p:ext uri="{BB962C8B-B14F-4D97-AF65-F5344CB8AC3E}">
-        <p14:creationId xmlns:p14="http://schemas.microsoft.com/office/powerpoint/2010/main" val="1161820629"/>
+        <p14:creationId xmlns:p14="http://schemas.microsoft.com/office/powerpoint/2010/main" val="2761363269"/>
       </p:ext>
     </p:extLst>
   </p:cSld>
@@ -5164,7 +5208,7 @@
           <a:p>
             <a:r>
               <a:rPr lang="en-US" dirty="0"/>
-              <a:t>Outline &amp; Setup</a:t>
+              <a:t>Welcome Message</a:t>
             </a:r>
           </a:p>
         </p:txBody>
@@ -5194,7 +5238,7 @@
           <a:p>
             <a:r>
               <a:rPr lang="en-US" dirty="0"/>
-              <a:t>Peter Mackenzie-Helnwein</a:t>
+              <a:t>Frank McKenna</a:t>
             </a:r>
           </a:p>
         </p:txBody>
@@ -5224,7 +5268,7 @@
           <a:p>
             <a:r>
               <a:rPr lang="en-US" dirty="0"/>
-              <a:t>University of Washington</a:t>
+              <a:t>University of California at Berkeley</a:t>
             </a:r>
           </a:p>
         </p:txBody>
@@ -5232,7 +5276,7 @@
     </p:spTree>
     <p:extLst>
       <p:ext uri="{BB962C8B-B14F-4D97-AF65-F5344CB8AC3E}">
-        <p14:creationId xmlns:p14="http://schemas.microsoft.com/office/powerpoint/2010/main" val="1485693724"/>
+        <p14:creationId xmlns:p14="http://schemas.microsoft.com/office/powerpoint/2010/main" val="3798488741"/>
       </p:ext>
     </p:extLst>
   </p:cSld>
@@ -5347,7 +5391,7 @@
     </p:spTree>
     <p:extLst>
       <p:ext uri="{BB962C8B-B14F-4D97-AF65-F5344CB8AC3E}">
-        <p14:creationId xmlns:p14="http://schemas.microsoft.com/office/powerpoint/2010/main" val="1563871757"/>
+        <p14:creationId xmlns:p14="http://schemas.microsoft.com/office/powerpoint/2010/main" val="1161820629"/>
       </p:ext>
     </p:extLst>
   </p:cSld>
@@ -5462,7 +5506,7 @@
     </p:spTree>
     <p:extLst>
       <p:ext uri="{BB962C8B-B14F-4D97-AF65-F5344CB8AC3E}">
-        <p14:creationId xmlns:p14="http://schemas.microsoft.com/office/powerpoint/2010/main" val="2896279256"/>
+        <p14:creationId xmlns:p14="http://schemas.microsoft.com/office/powerpoint/2010/main" val="1563871757"/>
       </p:ext>
     </p:extLst>
   </p:cSld>
@@ -5577,7 +5621,7 @@
     </p:spTree>
     <p:extLst>
       <p:ext uri="{BB962C8B-B14F-4D97-AF65-F5344CB8AC3E}">
-        <p14:creationId xmlns:p14="http://schemas.microsoft.com/office/powerpoint/2010/main" val="3222979132"/>
+        <p14:creationId xmlns:p14="http://schemas.microsoft.com/office/powerpoint/2010/main" val="2896279256"/>
       </p:ext>
     </p:extLst>
   </p:cSld>
@@ -5692,7 +5736,7 @@
     </p:spTree>
     <p:extLst>
       <p:ext uri="{BB962C8B-B14F-4D97-AF65-F5344CB8AC3E}">
-        <p14:creationId xmlns:p14="http://schemas.microsoft.com/office/powerpoint/2010/main" val="3822555114"/>
+        <p14:creationId xmlns:p14="http://schemas.microsoft.com/office/powerpoint/2010/main" val="3222979132"/>
       </p:ext>
     </p:extLst>
   </p:cSld>
@@ -5807,7 +5851,7 @@
     </p:spTree>
     <p:extLst>
       <p:ext uri="{BB962C8B-B14F-4D97-AF65-F5344CB8AC3E}">
-        <p14:creationId xmlns:p14="http://schemas.microsoft.com/office/powerpoint/2010/main" val="2912459459"/>
+        <p14:creationId xmlns:p14="http://schemas.microsoft.com/office/powerpoint/2010/main" val="3822555114"/>
       </p:ext>
     </p:extLst>
   </p:cSld>
@@ -5922,7 +5966,7 @@
     </p:spTree>
     <p:extLst>
       <p:ext uri="{BB962C8B-B14F-4D97-AF65-F5344CB8AC3E}">
-        <p14:creationId xmlns:p14="http://schemas.microsoft.com/office/powerpoint/2010/main" val="3458516751"/>
+        <p14:creationId xmlns:p14="http://schemas.microsoft.com/office/powerpoint/2010/main" val="2912459459"/>
       </p:ext>
     </p:extLst>
   </p:cSld>
@@ -6037,7 +6081,7 @@
     </p:spTree>
     <p:extLst>
       <p:ext uri="{BB962C8B-B14F-4D97-AF65-F5344CB8AC3E}">
-        <p14:creationId xmlns:p14="http://schemas.microsoft.com/office/powerpoint/2010/main" val="3927800354"/>
+        <p14:creationId xmlns:p14="http://schemas.microsoft.com/office/powerpoint/2010/main" val="3458516751"/>
       </p:ext>
     </p:extLst>
   </p:cSld>
@@ -6152,7 +6196,7 @@
     </p:spTree>
     <p:extLst>
       <p:ext uri="{BB962C8B-B14F-4D97-AF65-F5344CB8AC3E}">
-        <p14:creationId xmlns:p14="http://schemas.microsoft.com/office/powerpoint/2010/main" val="3408692930"/>
+        <p14:creationId xmlns:p14="http://schemas.microsoft.com/office/powerpoint/2010/main" val="3927800354"/>
       </p:ext>
     </p:extLst>
   </p:cSld>
@@ -6267,7 +6311,7 @@
     </p:spTree>
     <p:extLst>
       <p:ext uri="{BB962C8B-B14F-4D97-AF65-F5344CB8AC3E}">
-        <p14:creationId xmlns:p14="http://schemas.microsoft.com/office/powerpoint/2010/main" val="891150914"/>
+        <p14:creationId xmlns:p14="http://schemas.microsoft.com/office/powerpoint/2010/main" val="3408692930"/>
       </p:ext>
     </p:extLst>
   </p:cSld>
@@ -6382,7 +6426,7 @@
     </p:spTree>
     <p:extLst>
       <p:ext uri="{BB962C8B-B14F-4D97-AF65-F5344CB8AC3E}">
-        <p14:creationId xmlns:p14="http://schemas.microsoft.com/office/powerpoint/2010/main" val="1230198216"/>
+        <p14:creationId xmlns:p14="http://schemas.microsoft.com/office/powerpoint/2010/main" val="891150914"/>
       </p:ext>
     </p:extLst>
   </p:cSld>
@@ -6432,13 +6476,7 @@
           <a:p>
             <a:r>
               <a:rPr lang="en-US" dirty="0"/>
-              <a:t>What is a computer?  </a:t>
-            </a:r>
-          </a:p>
-          <a:p>
-            <a:r>
-              <a:rPr lang="en-US" dirty="0"/>
-              <a:t>Programming philosophy</a:t>
+              <a:t>Outline &amp; Setup</a:t>
             </a:r>
           </a:p>
         </p:txBody>
@@ -6468,7 +6506,7 @@
           <a:p>
             <a:r>
               <a:rPr lang="en-US" dirty="0"/>
-              <a:t>Frank McKenna</a:t>
+              <a:t>Peter Mackenzie-Helnwein</a:t>
             </a:r>
           </a:p>
         </p:txBody>
@@ -6498,7 +6536,7 @@
           <a:p>
             <a:r>
               <a:rPr lang="en-US" dirty="0"/>
-              <a:t>University of California at Berkeley</a:t>
+              <a:t>University of Washington</a:t>
             </a:r>
           </a:p>
         </p:txBody>
@@ -6506,7 +6544,7 @@
     </p:spTree>
     <p:extLst>
       <p:ext uri="{BB962C8B-B14F-4D97-AF65-F5344CB8AC3E}">
-        <p14:creationId xmlns:p14="http://schemas.microsoft.com/office/powerpoint/2010/main" val="81558599"/>
+        <p14:creationId xmlns:p14="http://schemas.microsoft.com/office/powerpoint/2010/main" val="1485693724"/>
       </p:ext>
     </p:extLst>
   </p:cSld>
@@ -6621,6 +6659,121 @@
     </p:spTree>
     <p:extLst>
       <p:ext uri="{BB962C8B-B14F-4D97-AF65-F5344CB8AC3E}">
+        <p14:creationId xmlns:p14="http://schemas.microsoft.com/office/powerpoint/2010/main" val="1230198216"/>
+      </p:ext>
+    </p:extLst>
+  </p:cSld>
+  <p:clrMapOvr>
+    <a:masterClrMapping/>
+  </p:clrMapOvr>
+</p:sld>
+</file>
+
+<file path=ppt/slides/slide31.xml><?xml version="1.0" encoding="utf-8"?>
+<p:sld xmlns:a="http://schemas.openxmlformats.org/drawingml/2006/main" xmlns:r="http://schemas.openxmlformats.org/officeDocument/2006/relationships" xmlns:p="http://schemas.openxmlformats.org/presentationml/2006/main">
+  <p:cSld>
+    <p:spTree>
+      <p:nvGrpSpPr>
+        <p:cNvPr id="1" name=""/>
+        <p:cNvGrpSpPr/>
+        <p:nvPr/>
+      </p:nvGrpSpPr>
+      <p:grpSpPr>
+        <a:xfrm>
+          <a:off x="0" y="0"/>
+          <a:ext cx="0" cy="0"/>
+          <a:chOff x="0" y="0"/>
+          <a:chExt cx="0" cy="0"/>
+        </a:xfrm>
+      </p:grpSpPr>
+      <p:sp>
+        <p:nvSpPr>
+          <p:cNvPr id="7" name="Subtitle 6">
+            <a:extLst>
+              <a:ext uri="{FF2B5EF4-FFF2-40B4-BE49-F238E27FC236}">
+                <a16:creationId xmlns:a16="http://schemas.microsoft.com/office/drawing/2014/main" id="{B21F99FE-2B30-814C-BB06-2595F16BD124}"/>
+              </a:ext>
+            </a:extLst>
+          </p:cNvPr>
+          <p:cNvSpPr>
+            <a:spLocks noGrp="1"/>
+          </p:cNvSpPr>
+          <p:nvPr>
+            <p:ph type="subTitle" idx="1"/>
+          </p:nvPr>
+        </p:nvSpPr>
+        <p:spPr/>
+        <p:txBody>
+          <a:bodyPr/>
+          <a:lstStyle/>
+          <a:p>
+            <a:endParaRPr lang="en-US"/>
+          </a:p>
+        </p:txBody>
+      </p:sp>
+      <p:sp>
+        <p:nvSpPr>
+          <p:cNvPr id="5" name="Text Placeholder 4">
+            <a:extLst>
+              <a:ext uri="{FF2B5EF4-FFF2-40B4-BE49-F238E27FC236}">
+                <a16:creationId xmlns:a16="http://schemas.microsoft.com/office/drawing/2014/main" id="{F828C3F3-D358-8D4F-BAC9-9043145A88D1}"/>
+              </a:ext>
+            </a:extLst>
+          </p:cNvPr>
+          <p:cNvSpPr>
+            <a:spLocks noGrp="1"/>
+          </p:cNvSpPr>
+          <p:nvPr>
+            <p:ph type="body" sz="quarter" idx="11"/>
+          </p:nvPr>
+        </p:nvSpPr>
+        <p:spPr/>
+        <p:txBody>
+          <a:bodyPr>
+            <a:normAutofit lnSpcReduction="10000"/>
+          </a:bodyPr>
+          <a:lstStyle/>
+          <a:p>
+            <a:r>
+              <a:rPr lang="en-US" dirty="0"/>
+              <a:t>Peter Mackenzie-Helnwein</a:t>
+            </a:r>
+          </a:p>
+        </p:txBody>
+      </p:sp>
+      <p:sp>
+        <p:nvSpPr>
+          <p:cNvPr id="6" name="Text Placeholder 5">
+            <a:extLst>
+              <a:ext uri="{FF2B5EF4-FFF2-40B4-BE49-F238E27FC236}">
+                <a16:creationId xmlns:a16="http://schemas.microsoft.com/office/drawing/2014/main" id="{860E1C64-9002-3948-A97E-48870344E6E7}"/>
+              </a:ext>
+            </a:extLst>
+          </p:cNvPr>
+          <p:cNvSpPr>
+            <a:spLocks noGrp="1"/>
+          </p:cNvSpPr>
+          <p:nvPr>
+            <p:ph type="body" sz="quarter" idx="12"/>
+          </p:nvPr>
+        </p:nvSpPr>
+        <p:spPr/>
+        <p:txBody>
+          <a:bodyPr>
+            <a:normAutofit fontScale="92500" lnSpcReduction="20000"/>
+          </a:bodyPr>
+          <a:lstStyle/>
+          <a:p>
+            <a:r>
+              <a:rPr lang="en-US" dirty="0"/>
+              <a:t>University of Washington</a:t>
+            </a:r>
+          </a:p>
+        </p:txBody>
+      </p:sp>
+    </p:spTree>
+    <p:extLst>
+      <p:ext uri="{BB962C8B-B14F-4D97-AF65-F5344CB8AC3E}">
         <p14:creationId xmlns:p14="http://schemas.microsoft.com/office/powerpoint/2010/main" val="4178150776"/>
       </p:ext>
     </p:extLst>
@@ -6631,7 +6784,7 @@
 </p:sld>
 </file>
 
-<file path=ppt/slides/slide31.xml><?xml version="1.0" encoding="utf-8"?>
+<file path=ppt/slides/slide32.xml><?xml version="1.0" encoding="utf-8"?>
 <p:sld xmlns:a="http://schemas.openxmlformats.org/drawingml/2006/main" xmlns:r="http://schemas.openxmlformats.org/officeDocument/2006/relationships" xmlns:p="http://schemas.openxmlformats.org/presentationml/2006/main">
   <p:cSld>
     <p:spTree>
@@ -6751,23 +6904,13 @@
           <a:p>
             <a:r>
               <a:rPr lang="en-US" dirty="0"/>
-              <a:t>Using </a:t>
-            </a:r>
-            <a:r>
-              <a:rPr lang="en-US" dirty="0" err="1"/>
-              <a:t>Jupyter</a:t>
-            </a:r>
-            <a:r>
-              <a:rPr lang="en-US" dirty="0"/>
-              <a:t> Notebooks on </a:t>
-            </a:r>
-            <a:r>
-              <a:rPr lang="en-US" dirty="0" err="1"/>
-              <a:t>Jupyter</a:t>
-            </a:r>
-            <a:r>
-              <a:rPr lang="en-US" dirty="0"/>
-              <a:t> Hub</a:t>
+              <a:t>What is a computer?  </a:t>
+            </a:r>
+          </a:p>
+          <a:p>
+            <a:r>
+              <a:rPr lang="en-US" dirty="0"/>
+              <a:t>Programming philosophy</a:t>
             </a:r>
           </a:p>
         </p:txBody>
@@ -6797,7 +6940,7 @@
           <a:p>
             <a:r>
               <a:rPr lang="en-US" dirty="0"/>
-              <a:t>Peter Mackenzie-Helnwein</a:t>
+              <a:t>Frank McKenna</a:t>
             </a:r>
           </a:p>
         </p:txBody>
@@ -6827,7 +6970,7 @@
           <a:p>
             <a:r>
               <a:rPr lang="en-US" dirty="0"/>
-              <a:t>University of Washington</a:t>
+              <a:t>University of California at Berkeley</a:t>
             </a:r>
           </a:p>
         </p:txBody>
@@ -6835,7 +6978,7 @@
     </p:spTree>
     <p:extLst>
       <p:ext uri="{BB962C8B-B14F-4D97-AF65-F5344CB8AC3E}">
-        <p14:creationId xmlns:p14="http://schemas.microsoft.com/office/powerpoint/2010/main" val="4265313471"/>
+        <p14:creationId xmlns:p14="http://schemas.microsoft.com/office/powerpoint/2010/main" val="81558599"/>
       </p:ext>
     </p:extLst>
   </p:cSld>
@@ -6885,7 +7028,23 @@
           <a:p>
             <a:r>
               <a:rPr lang="en-US" dirty="0"/>
-              <a:t>Homework Assignment #1</a:t>
+              <a:t>Using </a:t>
+            </a:r>
+            <a:r>
+              <a:rPr lang="en-US" dirty="0" err="1"/>
+              <a:t>Jupyter</a:t>
+            </a:r>
+            <a:r>
+              <a:rPr lang="en-US" dirty="0"/>
+              <a:t> Notebooks on </a:t>
+            </a:r>
+            <a:r>
+              <a:rPr lang="en-US" dirty="0" err="1"/>
+              <a:t>Jupyter</a:t>
+            </a:r>
+            <a:r>
+              <a:rPr lang="en-US" dirty="0"/>
+              <a:t> Hub</a:t>
             </a:r>
           </a:p>
         </p:txBody>
@@ -6953,7 +7112,7 @@
     </p:spTree>
     <p:extLst>
       <p:ext uri="{BB962C8B-B14F-4D97-AF65-F5344CB8AC3E}">
-        <p14:creationId xmlns:p14="http://schemas.microsoft.com/office/powerpoint/2010/main" val="2075777911"/>
+        <p14:creationId xmlns:p14="http://schemas.microsoft.com/office/powerpoint/2010/main" val="4265313471"/>
       </p:ext>
     </p:extLst>
   </p:cSld>
@@ -7003,7 +7162,7 @@
           <a:p>
             <a:r>
               <a:rPr lang="en-US" dirty="0"/>
-              <a:t>Homework Assignment #2</a:t>
+              <a:t>Homework Assignment #1</a:t>
             </a:r>
           </a:p>
         </p:txBody>
@@ -7071,7 +7230,7 @@
     </p:spTree>
     <p:extLst>
       <p:ext uri="{BB962C8B-B14F-4D97-AF65-F5344CB8AC3E}">
-        <p14:creationId xmlns:p14="http://schemas.microsoft.com/office/powerpoint/2010/main" val="2559178044"/>
+        <p14:creationId xmlns:p14="http://schemas.microsoft.com/office/powerpoint/2010/main" val="2075777911"/>
       </p:ext>
     </p:extLst>
   </p:cSld>
@@ -7121,7 +7280,7 @@
           <a:p>
             <a:r>
               <a:rPr lang="en-US" dirty="0"/>
-              <a:t>Homework Assignment #3</a:t>
+              <a:t>Homework Assignment #2</a:t>
             </a:r>
           </a:p>
         </p:txBody>
@@ -7189,7 +7348,7 @@
     </p:spTree>
     <p:extLst>
       <p:ext uri="{BB962C8B-B14F-4D97-AF65-F5344CB8AC3E}">
-        <p14:creationId xmlns:p14="http://schemas.microsoft.com/office/powerpoint/2010/main" val="1324729123"/>
+        <p14:creationId xmlns:p14="http://schemas.microsoft.com/office/powerpoint/2010/main" val="2559178044"/>
       </p:ext>
     </p:extLst>
   </p:cSld>
@@ -7239,7 +7398,7 @@
           <a:p>
             <a:r>
               <a:rPr lang="en-US" dirty="0"/>
-              <a:t>Homework Assignment #4</a:t>
+              <a:t>Homework Assignment #3</a:t>
             </a:r>
           </a:p>
         </p:txBody>
@@ -7307,7 +7466,7 @@
     </p:spTree>
     <p:extLst>
       <p:ext uri="{BB962C8B-B14F-4D97-AF65-F5344CB8AC3E}">
-        <p14:creationId xmlns:p14="http://schemas.microsoft.com/office/powerpoint/2010/main" val="1143443951"/>
+        <p14:creationId xmlns:p14="http://schemas.microsoft.com/office/powerpoint/2010/main" val="1324729123"/>
       </p:ext>
     </p:extLst>
   </p:cSld>
@@ -7357,7 +7516,7 @@
           <a:p>
             <a:r>
               <a:rPr lang="en-US" dirty="0"/>
-              <a:t>Homework Assignment #5</a:t>
+              <a:t>Homework Assignment #4</a:t>
             </a:r>
           </a:p>
         </p:txBody>
@@ -7425,7 +7584,7 @@
     </p:spTree>
     <p:extLst>
       <p:ext uri="{BB962C8B-B14F-4D97-AF65-F5344CB8AC3E}">
-        <p14:creationId xmlns:p14="http://schemas.microsoft.com/office/powerpoint/2010/main" val="30250005"/>
+        <p14:creationId xmlns:p14="http://schemas.microsoft.com/office/powerpoint/2010/main" val="1143443951"/>
       </p:ext>
     </p:extLst>
   </p:cSld>

</xml_diff>

<commit_message>
Adding web scrabbing video clips
</commit_message>
<xml_diff>
--- a/presentations/SimCenter Bootcamp Python.pptx
+++ b/presentations/SimCenter Bootcamp Python.pptx
@@ -24,19 +24,21 @@
     <p:sldId id="264" r:id="rId18"/>
     <p:sldId id="285" r:id="rId19"/>
     <p:sldId id="286" r:id="rId20"/>
-    <p:sldId id="265" r:id="rId21"/>
-    <p:sldId id="266" r:id="rId22"/>
-    <p:sldId id="267" r:id="rId23"/>
-    <p:sldId id="268" r:id="rId24"/>
-    <p:sldId id="269" r:id="rId25"/>
-    <p:sldId id="270" r:id="rId26"/>
-    <p:sldId id="271" r:id="rId27"/>
-    <p:sldId id="272" r:id="rId28"/>
-    <p:sldId id="273" r:id="rId29"/>
-    <p:sldId id="274" r:id="rId30"/>
-    <p:sldId id="275" r:id="rId31"/>
-    <p:sldId id="276" r:id="rId32"/>
-    <p:sldId id="257" r:id="rId33"/>
+    <p:sldId id="288" r:id="rId21"/>
+    <p:sldId id="289" r:id="rId22"/>
+    <p:sldId id="266" r:id="rId23"/>
+    <p:sldId id="267" r:id="rId24"/>
+    <p:sldId id="290" r:id="rId25"/>
+    <p:sldId id="268" r:id="rId26"/>
+    <p:sldId id="269" r:id="rId27"/>
+    <p:sldId id="270" r:id="rId28"/>
+    <p:sldId id="271" r:id="rId29"/>
+    <p:sldId id="272" r:id="rId30"/>
+    <p:sldId id="273" r:id="rId31"/>
+    <p:sldId id="274" r:id="rId32"/>
+    <p:sldId id="275" r:id="rId33"/>
+    <p:sldId id="276" r:id="rId34"/>
+    <p:sldId id="257" r:id="rId35"/>
   </p:sldIdLst>
   <p:sldSz cx="12192000" cy="6858000"/>
   <p:notesSz cx="6858000" cy="9144000"/>
@@ -839,7 +841,7 @@
           <a:p>
             <a:fld id="{B84125C9-AED3-0F47-B44C-0465FAA4AF51}" type="datetimeFigureOut">
               <a:rPr lang="en-US" smtClean="0"/>
-              <a:t>8/10/20</a:t>
+              <a:t>8/15/20</a:t>
             </a:fld>
             <a:endParaRPr lang="en-US"/>
           </a:p>
@@ -1037,7 +1039,7 @@
           <a:p>
             <a:fld id="{B84125C9-AED3-0F47-B44C-0465FAA4AF51}" type="datetimeFigureOut">
               <a:rPr lang="en-US" smtClean="0"/>
-              <a:t>8/10/20</a:t>
+              <a:t>8/15/20</a:t>
             </a:fld>
             <a:endParaRPr lang="en-US"/>
           </a:p>
@@ -1245,7 +1247,7 @@
           <a:p>
             <a:fld id="{B84125C9-AED3-0F47-B44C-0465FAA4AF51}" type="datetimeFigureOut">
               <a:rPr lang="en-US" smtClean="0"/>
-              <a:t>8/10/20</a:t>
+              <a:t>8/15/20</a:t>
             </a:fld>
             <a:endParaRPr lang="en-US"/>
           </a:p>
@@ -1465,7 +1467,7 @@
           <a:p>
             <a:fld id="{B84125C9-AED3-0F47-B44C-0465FAA4AF51}" type="datetimeFigureOut">
               <a:rPr lang="en-US" smtClean="0"/>
-              <a:t>8/10/20</a:t>
+              <a:t>8/15/20</a:t>
             </a:fld>
             <a:endParaRPr lang="en-US"/>
           </a:p>
@@ -1663,7 +1665,7 @@
           <a:p>
             <a:fld id="{B84125C9-AED3-0F47-B44C-0465FAA4AF51}" type="datetimeFigureOut">
               <a:rPr lang="en-US" smtClean="0"/>
-              <a:t>8/10/20</a:t>
+              <a:t>8/15/20</a:t>
             </a:fld>
             <a:endParaRPr lang="en-US"/>
           </a:p>
@@ -1938,7 +1940,7 @@
           <a:p>
             <a:fld id="{B84125C9-AED3-0F47-B44C-0465FAA4AF51}" type="datetimeFigureOut">
               <a:rPr lang="en-US" smtClean="0"/>
-              <a:t>8/10/20</a:t>
+              <a:t>8/15/20</a:t>
             </a:fld>
             <a:endParaRPr lang="en-US"/>
           </a:p>
@@ -2203,7 +2205,7 @@
           <a:p>
             <a:fld id="{B84125C9-AED3-0F47-B44C-0465FAA4AF51}" type="datetimeFigureOut">
               <a:rPr lang="en-US" smtClean="0"/>
-              <a:t>8/10/20</a:t>
+              <a:t>8/15/20</a:t>
             </a:fld>
             <a:endParaRPr lang="en-US"/>
           </a:p>
@@ -2615,7 +2617,7 @@
           <a:p>
             <a:fld id="{B84125C9-AED3-0F47-B44C-0465FAA4AF51}" type="datetimeFigureOut">
               <a:rPr lang="en-US" smtClean="0"/>
-              <a:t>8/10/20</a:t>
+              <a:t>8/15/20</a:t>
             </a:fld>
             <a:endParaRPr lang="en-US"/>
           </a:p>
@@ -2756,7 +2758,7 @@
           <a:p>
             <a:fld id="{B84125C9-AED3-0F47-B44C-0465FAA4AF51}" type="datetimeFigureOut">
               <a:rPr lang="en-US" smtClean="0"/>
-              <a:t>8/10/20</a:t>
+              <a:t>8/15/20</a:t>
             </a:fld>
             <a:endParaRPr lang="en-US"/>
           </a:p>
@@ -2869,7 +2871,7 @@
           <a:p>
             <a:fld id="{B84125C9-AED3-0F47-B44C-0465FAA4AF51}" type="datetimeFigureOut">
               <a:rPr lang="en-US" smtClean="0"/>
-              <a:t>8/10/20</a:t>
+              <a:t>8/15/20</a:t>
             </a:fld>
             <a:endParaRPr lang="en-US"/>
           </a:p>
@@ -3180,7 +3182,7 @@
           <a:p>
             <a:fld id="{B84125C9-AED3-0F47-B44C-0465FAA4AF51}" type="datetimeFigureOut">
               <a:rPr lang="en-US" smtClean="0"/>
-              <a:t>8/10/20</a:t>
+              <a:t>8/15/20</a:t>
             </a:fld>
             <a:endParaRPr lang="en-US"/>
           </a:p>
@@ -3421,7 +3423,7 @@
           <a:p>
             <a:fld id="{B84125C9-AED3-0F47-B44C-0465FAA4AF51}" type="datetimeFigureOut">
               <a:rPr lang="en-US" smtClean="0"/>
-              <a:t>8/10/20</a:t>
+              <a:t>8/15/20</a:t>
             </a:fld>
             <a:endParaRPr lang="en-US"/>
           </a:p>
@@ -5324,7 +5326,10 @@
           <a:bodyPr/>
           <a:lstStyle/>
           <a:p>
-            <a:endParaRPr lang="en-US"/>
+            <a:r>
+              <a:rPr lang="en-US" dirty="0"/>
+              <a:t>Python – OOP 2: Inheritance</a:t>
+            </a:r>
           </a:p>
         </p:txBody>
       </p:sp>
@@ -5391,7 +5396,7 @@
     </p:spTree>
     <p:extLst>
       <p:ext uri="{BB962C8B-B14F-4D97-AF65-F5344CB8AC3E}">
-        <p14:creationId xmlns:p14="http://schemas.microsoft.com/office/powerpoint/2010/main" val="1161820629"/>
+        <p14:creationId xmlns:p14="http://schemas.microsoft.com/office/powerpoint/2010/main" val="1464284939"/>
       </p:ext>
     </p:extLst>
   </p:cSld>
@@ -5439,7 +5444,10 @@
           <a:bodyPr/>
           <a:lstStyle/>
           <a:p>
-            <a:endParaRPr lang="en-US"/>
+            <a:r>
+              <a:rPr lang="en-US" dirty="0"/>
+              <a:t>Python – OOP 3: Operator Overloading</a:t>
+            </a:r>
           </a:p>
         </p:txBody>
       </p:sp>
@@ -5506,7 +5514,7 @@
     </p:spTree>
     <p:extLst>
       <p:ext uri="{BB962C8B-B14F-4D97-AF65-F5344CB8AC3E}">
-        <p14:creationId xmlns:p14="http://schemas.microsoft.com/office/powerpoint/2010/main" val="1563871757"/>
+        <p14:creationId xmlns:p14="http://schemas.microsoft.com/office/powerpoint/2010/main" val="81184429"/>
       </p:ext>
     </p:extLst>
   </p:cSld>
@@ -5554,7 +5562,10 @@
           <a:bodyPr/>
           <a:lstStyle/>
           <a:p>
-            <a:endParaRPr lang="en-US"/>
+            <a:r>
+              <a:rPr lang="en-US" dirty="0"/>
+              <a:t>Python - Modules</a:t>
+            </a:r>
           </a:p>
         </p:txBody>
       </p:sp>
@@ -5621,7 +5632,7 @@
     </p:spTree>
     <p:extLst>
       <p:ext uri="{BB962C8B-B14F-4D97-AF65-F5344CB8AC3E}">
-        <p14:creationId xmlns:p14="http://schemas.microsoft.com/office/powerpoint/2010/main" val="2896279256"/>
+        <p14:creationId xmlns:p14="http://schemas.microsoft.com/office/powerpoint/2010/main" val="1563871757"/>
       </p:ext>
     </p:extLst>
   </p:cSld>
@@ -5669,7 +5680,18 @@
           <a:bodyPr/>
           <a:lstStyle/>
           <a:p>
-            <a:endParaRPr lang="en-US"/>
+            <a:r>
+              <a:rPr lang="en-US" dirty="0"/>
+              <a:t>Web </a:t>
+            </a:r>
+            <a:r>
+              <a:rPr lang="en-US" dirty="0" err="1"/>
+              <a:t>Scrabbing</a:t>
+            </a:r>
+            <a:r>
+              <a:rPr lang="en-US" dirty="0"/>
+              <a:t> </a:t>
+            </a:r>
           </a:p>
         </p:txBody>
       </p:sp>
@@ -5692,13 +5714,21 @@
         <p:spPr/>
         <p:txBody>
           <a:bodyPr>
-            <a:normAutofit lnSpcReduction="10000"/>
+            <a:normAutofit fontScale="92500"/>
           </a:bodyPr>
           <a:lstStyle/>
           <a:p>
             <a:r>
               <a:rPr lang="en-US" dirty="0"/>
-              <a:t>Peter Mackenzie-Helnwein</a:t>
+              <a:t>Wael </a:t>
+            </a:r>
+            <a:r>
+              <a:rPr lang="en-US" dirty="0" err="1"/>
+              <a:t>Elhaddad</a:t>
+            </a:r>
+            <a:r>
+              <a:rPr lang="en-US" dirty="0"/>
+              <a:t>, University of California at Berkeley</a:t>
             </a:r>
           </a:p>
         </p:txBody>
@@ -5722,13 +5752,13 @@
         <p:spPr/>
         <p:txBody>
           <a:bodyPr>
-            <a:normAutofit fontScale="92500" lnSpcReduction="20000"/>
+            <a:normAutofit fontScale="85000" lnSpcReduction="10000"/>
           </a:bodyPr>
           <a:lstStyle/>
           <a:p>
             <a:r>
               <a:rPr lang="en-US" dirty="0"/>
-              <a:t>University of Washington</a:t>
+              <a:t>Peter Mackenzie-Helnwein, University of Washington</a:t>
             </a:r>
           </a:p>
         </p:txBody>
@@ -5736,7 +5766,7 @@
     </p:spTree>
     <p:extLst>
       <p:ext uri="{BB962C8B-B14F-4D97-AF65-F5344CB8AC3E}">
-        <p14:creationId xmlns:p14="http://schemas.microsoft.com/office/powerpoint/2010/main" val="3222979132"/>
+        <p14:creationId xmlns:p14="http://schemas.microsoft.com/office/powerpoint/2010/main" val="2896279256"/>
       </p:ext>
     </p:extLst>
   </p:cSld>
@@ -5784,7 +5814,51 @@
           <a:bodyPr/>
           <a:lstStyle/>
           <a:p>
-            <a:endParaRPr lang="en-US"/>
+            <a:r>
+              <a:rPr lang="en-US" dirty="0"/>
+              <a:t>Web </a:t>
+            </a:r>
+            <a:r>
+              <a:rPr lang="en-US" dirty="0" err="1"/>
+              <a:t>Scrabbing</a:t>
+            </a:r>
+            <a:endParaRPr lang="en-US" dirty="0"/>
+          </a:p>
+          <a:p>
+            <a:r>
+              <a:rPr lang="en-US" dirty="0">
+                <a:solidFill>
+                  <a:srgbClr val="FF0000"/>
+                </a:solidFill>
+              </a:rPr>
+              <a:t>WATCH</a:t>
+            </a:r>
+            <a:r>
+              <a:rPr lang="en-US" dirty="0"/>
+              <a:t> </a:t>
+            </a:r>
+            <a:r>
+              <a:rPr lang="en-US" dirty="0">
+                <a:hlinkClick r:id="rId2"/>
+              </a:rPr>
+              <a:t>https://youtu.be/VH-slcnmTJc</a:t>
+            </a:r>
+            <a:r>
+              <a:rPr lang="en-US" dirty="0"/>
+              <a:t> </a:t>
+            </a:r>
+            <a:r>
+              <a:rPr lang="en-US" dirty="0">
+                <a:solidFill>
+                  <a:srgbClr val="FF0000"/>
+                </a:solidFill>
+              </a:rPr>
+              <a:t>FOR 30 MINUTES</a:t>
+            </a:r>
+            <a:r>
+              <a:rPr lang="en-US" dirty="0"/>
+              <a:t> </a:t>
+            </a:r>
           </a:p>
         </p:txBody>
       </p:sp>
@@ -5807,13 +5881,21 @@
         <p:spPr/>
         <p:txBody>
           <a:bodyPr>
-            <a:normAutofit lnSpcReduction="10000"/>
+            <a:normAutofit fontScale="92500"/>
           </a:bodyPr>
           <a:lstStyle/>
           <a:p>
             <a:r>
-              <a:rPr lang="en-US" dirty="0"/>
-              <a:t>Peter Mackenzie-Helnwein</a:t>
+              <a:rPr lang="en-US" b="1" dirty="0"/>
+              <a:t>Wael </a:t>
+            </a:r>
+            <a:r>
+              <a:rPr lang="en-US" b="1" dirty="0" err="1"/>
+              <a:t>Elhaddad</a:t>
+            </a:r>
+            <a:r>
+              <a:rPr lang="en-US" dirty="0"/>
+              <a:t>, University of California at Berkeley</a:t>
             </a:r>
           </a:p>
         </p:txBody>
@@ -5841,17 +5923,14 @@
           </a:bodyPr>
           <a:lstStyle/>
           <a:p>
-            <a:r>
-              <a:rPr lang="en-US" dirty="0"/>
-              <a:t>University of Washington</a:t>
-            </a:r>
+            <a:endParaRPr lang="en-US" dirty="0"/>
           </a:p>
         </p:txBody>
       </p:sp>
     </p:spTree>
     <p:extLst>
       <p:ext uri="{BB962C8B-B14F-4D97-AF65-F5344CB8AC3E}">
-        <p14:creationId xmlns:p14="http://schemas.microsoft.com/office/powerpoint/2010/main" val="3822555114"/>
+        <p14:creationId xmlns:p14="http://schemas.microsoft.com/office/powerpoint/2010/main" val="2451253306"/>
       </p:ext>
     </p:extLst>
   </p:cSld>
@@ -5966,7 +6045,7 @@
     </p:spTree>
     <p:extLst>
       <p:ext uri="{BB962C8B-B14F-4D97-AF65-F5344CB8AC3E}">
-        <p14:creationId xmlns:p14="http://schemas.microsoft.com/office/powerpoint/2010/main" val="2912459459"/>
+        <p14:creationId xmlns:p14="http://schemas.microsoft.com/office/powerpoint/2010/main" val="3222979132"/>
       </p:ext>
     </p:extLst>
   </p:cSld>
@@ -6081,7 +6160,7 @@
     </p:spTree>
     <p:extLst>
       <p:ext uri="{BB962C8B-B14F-4D97-AF65-F5344CB8AC3E}">
-        <p14:creationId xmlns:p14="http://schemas.microsoft.com/office/powerpoint/2010/main" val="3458516751"/>
+        <p14:creationId xmlns:p14="http://schemas.microsoft.com/office/powerpoint/2010/main" val="3822555114"/>
       </p:ext>
     </p:extLst>
   </p:cSld>
@@ -6196,7 +6275,7 @@
     </p:spTree>
     <p:extLst>
       <p:ext uri="{BB962C8B-B14F-4D97-AF65-F5344CB8AC3E}">
-        <p14:creationId xmlns:p14="http://schemas.microsoft.com/office/powerpoint/2010/main" val="3927800354"/>
+        <p14:creationId xmlns:p14="http://schemas.microsoft.com/office/powerpoint/2010/main" val="2912459459"/>
       </p:ext>
     </p:extLst>
   </p:cSld>
@@ -6311,7 +6390,7 @@
     </p:spTree>
     <p:extLst>
       <p:ext uri="{BB962C8B-B14F-4D97-AF65-F5344CB8AC3E}">
-        <p14:creationId xmlns:p14="http://schemas.microsoft.com/office/powerpoint/2010/main" val="3408692930"/>
+        <p14:creationId xmlns:p14="http://schemas.microsoft.com/office/powerpoint/2010/main" val="3458516751"/>
       </p:ext>
     </p:extLst>
   </p:cSld>
@@ -6426,7 +6505,7 @@
     </p:spTree>
     <p:extLst>
       <p:ext uri="{BB962C8B-B14F-4D97-AF65-F5344CB8AC3E}">
-        <p14:creationId xmlns:p14="http://schemas.microsoft.com/office/powerpoint/2010/main" val="891150914"/>
+        <p14:creationId xmlns:p14="http://schemas.microsoft.com/office/powerpoint/2010/main" val="3927800354"/>
       </p:ext>
     </p:extLst>
   </p:cSld>
@@ -6659,7 +6738,7 @@
     </p:spTree>
     <p:extLst>
       <p:ext uri="{BB962C8B-B14F-4D97-AF65-F5344CB8AC3E}">
-        <p14:creationId xmlns:p14="http://schemas.microsoft.com/office/powerpoint/2010/main" val="1230198216"/>
+        <p14:creationId xmlns:p14="http://schemas.microsoft.com/office/powerpoint/2010/main" val="3408692930"/>
       </p:ext>
     </p:extLst>
   </p:cSld>
@@ -6774,6 +6853,236 @@
     </p:spTree>
     <p:extLst>
       <p:ext uri="{BB962C8B-B14F-4D97-AF65-F5344CB8AC3E}">
+        <p14:creationId xmlns:p14="http://schemas.microsoft.com/office/powerpoint/2010/main" val="891150914"/>
+      </p:ext>
+    </p:extLst>
+  </p:cSld>
+  <p:clrMapOvr>
+    <a:masterClrMapping/>
+  </p:clrMapOvr>
+</p:sld>
+</file>
+
+<file path=ppt/slides/slide32.xml><?xml version="1.0" encoding="utf-8"?>
+<p:sld xmlns:a="http://schemas.openxmlformats.org/drawingml/2006/main" xmlns:r="http://schemas.openxmlformats.org/officeDocument/2006/relationships" xmlns:p="http://schemas.openxmlformats.org/presentationml/2006/main">
+  <p:cSld>
+    <p:spTree>
+      <p:nvGrpSpPr>
+        <p:cNvPr id="1" name=""/>
+        <p:cNvGrpSpPr/>
+        <p:nvPr/>
+      </p:nvGrpSpPr>
+      <p:grpSpPr>
+        <a:xfrm>
+          <a:off x="0" y="0"/>
+          <a:ext cx="0" cy="0"/>
+          <a:chOff x="0" y="0"/>
+          <a:chExt cx="0" cy="0"/>
+        </a:xfrm>
+      </p:grpSpPr>
+      <p:sp>
+        <p:nvSpPr>
+          <p:cNvPr id="7" name="Subtitle 6">
+            <a:extLst>
+              <a:ext uri="{FF2B5EF4-FFF2-40B4-BE49-F238E27FC236}">
+                <a16:creationId xmlns:a16="http://schemas.microsoft.com/office/drawing/2014/main" id="{B21F99FE-2B30-814C-BB06-2595F16BD124}"/>
+              </a:ext>
+            </a:extLst>
+          </p:cNvPr>
+          <p:cNvSpPr>
+            <a:spLocks noGrp="1"/>
+          </p:cNvSpPr>
+          <p:nvPr>
+            <p:ph type="subTitle" idx="1"/>
+          </p:nvPr>
+        </p:nvSpPr>
+        <p:spPr/>
+        <p:txBody>
+          <a:bodyPr/>
+          <a:lstStyle/>
+          <a:p>
+            <a:endParaRPr lang="en-US"/>
+          </a:p>
+        </p:txBody>
+      </p:sp>
+      <p:sp>
+        <p:nvSpPr>
+          <p:cNvPr id="5" name="Text Placeholder 4">
+            <a:extLst>
+              <a:ext uri="{FF2B5EF4-FFF2-40B4-BE49-F238E27FC236}">
+                <a16:creationId xmlns:a16="http://schemas.microsoft.com/office/drawing/2014/main" id="{F828C3F3-D358-8D4F-BAC9-9043145A88D1}"/>
+              </a:ext>
+            </a:extLst>
+          </p:cNvPr>
+          <p:cNvSpPr>
+            <a:spLocks noGrp="1"/>
+          </p:cNvSpPr>
+          <p:nvPr>
+            <p:ph type="body" sz="quarter" idx="11"/>
+          </p:nvPr>
+        </p:nvSpPr>
+        <p:spPr/>
+        <p:txBody>
+          <a:bodyPr>
+            <a:normAutofit lnSpcReduction="10000"/>
+          </a:bodyPr>
+          <a:lstStyle/>
+          <a:p>
+            <a:r>
+              <a:rPr lang="en-US" dirty="0"/>
+              <a:t>Peter Mackenzie-Helnwein</a:t>
+            </a:r>
+          </a:p>
+        </p:txBody>
+      </p:sp>
+      <p:sp>
+        <p:nvSpPr>
+          <p:cNvPr id="6" name="Text Placeholder 5">
+            <a:extLst>
+              <a:ext uri="{FF2B5EF4-FFF2-40B4-BE49-F238E27FC236}">
+                <a16:creationId xmlns:a16="http://schemas.microsoft.com/office/drawing/2014/main" id="{860E1C64-9002-3948-A97E-48870344E6E7}"/>
+              </a:ext>
+            </a:extLst>
+          </p:cNvPr>
+          <p:cNvSpPr>
+            <a:spLocks noGrp="1"/>
+          </p:cNvSpPr>
+          <p:nvPr>
+            <p:ph type="body" sz="quarter" idx="12"/>
+          </p:nvPr>
+        </p:nvSpPr>
+        <p:spPr/>
+        <p:txBody>
+          <a:bodyPr>
+            <a:normAutofit fontScale="92500" lnSpcReduction="20000"/>
+          </a:bodyPr>
+          <a:lstStyle/>
+          <a:p>
+            <a:r>
+              <a:rPr lang="en-US" dirty="0"/>
+              <a:t>University of Washington</a:t>
+            </a:r>
+          </a:p>
+        </p:txBody>
+      </p:sp>
+    </p:spTree>
+    <p:extLst>
+      <p:ext uri="{BB962C8B-B14F-4D97-AF65-F5344CB8AC3E}">
+        <p14:creationId xmlns:p14="http://schemas.microsoft.com/office/powerpoint/2010/main" val="1230198216"/>
+      </p:ext>
+    </p:extLst>
+  </p:cSld>
+  <p:clrMapOvr>
+    <a:masterClrMapping/>
+  </p:clrMapOvr>
+</p:sld>
+</file>
+
+<file path=ppt/slides/slide33.xml><?xml version="1.0" encoding="utf-8"?>
+<p:sld xmlns:a="http://schemas.openxmlformats.org/drawingml/2006/main" xmlns:r="http://schemas.openxmlformats.org/officeDocument/2006/relationships" xmlns:p="http://schemas.openxmlformats.org/presentationml/2006/main">
+  <p:cSld>
+    <p:spTree>
+      <p:nvGrpSpPr>
+        <p:cNvPr id="1" name=""/>
+        <p:cNvGrpSpPr/>
+        <p:nvPr/>
+      </p:nvGrpSpPr>
+      <p:grpSpPr>
+        <a:xfrm>
+          <a:off x="0" y="0"/>
+          <a:ext cx="0" cy="0"/>
+          <a:chOff x="0" y="0"/>
+          <a:chExt cx="0" cy="0"/>
+        </a:xfrm>
+      </p:grpSpPr>
+      <p:sp>
+        <p:nvSpPr>
+          <p:cNvPr id="7" name="Subtitle 6">
+            <a:extLst>
+              <a:ext uri="{FF2B5EF4-FFF2-40B4-BE49-F238E27FC236}">
+                <a16:creationId xmlns:a16="http://schemas.microsoft.com/office/drawing/2014/main" id="{B21F99FE-2B30-814C-BB06-2595F16BD124}"/>
+              </a:ext>
+            </a:extLst>
+          </p:cNvPr>
+          <p:cNvSpPr>
+            <a:spLocks noGrp="1"/>
+          </p:cNvSpPr>
+          <p:nvPr>
+            <p:ph type="subTitle" idx="1"/>
+          </p:nvPr>
+        </p:nvSpPr>
+        <p:spPr/>
+        <p:txBody>
+          <a:bodyPr/>
+          <a:lstStyle/>
+          <a:p>
+            <a:endParaRPr lang="en-US"/>
+          </a:p>
+        </p:txBody>
+      </p:sp>
+      <p:sp>
+        <p:nvSpPr>
+          <p:cNvPr id="5" name="Text Placeholder 4">
+            <a:extLst>
+              <a:ext uri="{FF2B5EF4-FFF2-40B4-BE49-F238E27FC236}">
+                <a16:creationId xmlns:a16="http://schemas.microsoft.com/office/drawing/2014/main" id="{F828C3F3-D358-8D4F-BAC9-9043145A88D1}"/>
+              </a:ext>
+            </a:extLst>
+          </p:cNvPr>
+          <p:cNvSpPr>
+            <a:spLocks noGrp="1"/>
+          </p:cNvSpPr>
+          <p:nvPr>
+            <p:ph type="body" sz="quarter" idx="11"/>
+          </p:nvPr>
+        </p:nvSpPr>
+        <p:spPr/>
+        <p:txBody>
+          <a:bodyPr>
+            <a:normAutofit lnSpcReduction="10000"/>
+          </a:bodyPr>
+          <a:lstStyle/>
+          <a:p>
+            <a:r>
+              <a:rPr lang="en-US" dirty="0"/>
+              <a:t>Peter Mackenzie-Helnwein</a:t>
+            </a:r>
+          </a:p>
+        </p:txBody>
+      </p:sp>
+      <p:sp>
+        <p:nvSpPr>
+          <p:cNvPr id="6" name="Text Placeholder 5">
+            <a:extLst>
+              <a:ext uri="{FF2B5EF4-FFF2-40B4-BE49-F238E27FC236}">
+                <a16:creationId xmlns:a16="http://schemas.microsoft.com/office/drawing/2014/main" id="{860E1C64-9002-3948-A97E-48870344E6E7}"/>
+              </a:ext>
+            </a:extLst>
+          </p:cNvPr>
+          <p:cNvSpPr>
+            <a:spLocks noGrp="1"/>
+          </p:cNvSpPr>
+          <p:nvPr>
+            <p:ph type="body" sz="quarter" idx="12"/>
+          </p:nvPr>
+        </p:nvSpPr>
+        <p:spPr/>
+        <p:txBody>
+          <a:bodyPr>
+            <a:normAutofit fontScale="92500" lnSpcReduction="20000"/>
+          </a:bodyPr>
+          <a:lstStyle/>
+          <a:p>
+            <a:r>
+              <a:rPr lang="en-US" dirty="0"/>
+              <a:t>University of Washington</a:t>
+            </a:r>
+          </a:p>
+        </p:txBody>
+      </p:sp>
+    </p:spTree>
+    <p:extLst>
+      <p:ext uri="{BB962C8B-B14F-4D97-AF65-F5344CB8AC3E}">
         <p14:creationId xmlns:p14="http://schemas.microsoft.com/office/powerpoint/2010/main" val="4178150776"/>
       </p:ext>
     </p:extLst>
@@ -6784,7 +7093,7 @@
 </p:sld>
 </file>
 
-<file path=ppt/slides/slide32.xml><?xml version="1.0" encoding="utf-8"?>
+<file path=ppt/slides/slide34.xml><?xml version="1.0" encoding="utf-8"?>
 <p:sld xmlns:a="http://schemas.openxmlformats.org/drawingml/2006/main" xmlns:r="http://schemas.openxmlformats.org/officeDocument/2006/relationships" xmlns:p="http://schemas.openxmlformats.org/presentationml/2006/main">
   <p:cSld>
     <p:spTree>

</xml_diff>

<commit_message>
Wrapping up WEEK 1 videos
</commit_message>
<xml_diff>
--- a/presentations/SimCenter Bootcamp Python.pptx
+++ b/presentations/SimCenter Bootcamp Python.pptx
@@ -32,13 +32,14 @@
     <p:sldId id="268" r:id="rId26"/>
     <p:sldId id="269" r:id="rId27"/>
     <p:sldId id="270" r:id="rId28"/>
-    <p:sldId id="271" r:id="rId29"/>
-    <p:sldId id="272" r:id="rId30"/>
-    <p:sldId id="273" r:id="rId31"/>
-    <p:sldId id="274" r:id="rId32"/>
-    <p:sldId id="275" r:id="rId33"/>
-    <p:sldId id="276" r:id="rId34"/>
-    <p:sldId id="257" r:id="rId35"/>
+    <p:sldId id="291" r:id="rId29"/>
+    <p:sldId id="271" r:id="rId30"/>
+    <p:sldId id="272" r:id="rId31"/>
+    <p:sldId id="273" r:id="rId32"/>
+    <p:sldId id="274" r:id="rId33"/>
+    <p:sldId id="275" r:id="rId34"/>
+    <p:sldId id="276" r:id="rId35"/>
+    <p:sldId id="257" r:id="rId36"/>
   </p:sldIdLst>
   <p:sldSz cx="12192000" cy="6858000"/>
   <p:notesSz cx="6858000" cy="9144000"/>
@@ -6208,7 +6209,10 @@
           <a:bodyPr/>
           <a:lstStyle/>
           <a:p>
-            <a:endParaRPr lang="en-US"/>
+            <a:r>
+              <a:rPr lang="en-US" dirty="0"/>
+              <a:t>Introduction to Programming in C</a:t>
+            </a:r>
           </a:p>
         </p:txBody>
       </p:sp>
@@ -6237,7 +6241,7 @@
           <a:p>
             <a:r>
               <a:rPr lang="en-US" dirty="0"/>
-              <a:t>Peter Mackenzie-Helnwein</a:t>
+              <a:t>Frank McKenna</a:t>
             </a:r>
           </a:p>
         </p:txBody>
@@ -6267,7 +6271,7 @@
           <a:p>
             <a:r>
               <a:rPr lang="en-US" dirty="0"/>
-              <a:t>University of Washington</a:t>
+              <a:t>University of California at Berkeley</a:t>
             </a:r>
           </a:p>
         </p:txBody>
@@ -6323,7 +6327,15 @@
           <a:bodyPr/>
           <a:lstStyle/>
           <a:p>
-            <a:endParaRPr lang="en-US"/>
+            <a:r>
+              <a:rPr lang="en-US" dirty="0"/>
+              <a:t>Programming in C </a:t>
+            </a:r>
+            <a:r>
+              <a:rPr lang="en-US"/>
+              <a:t>- Pointers</a:t>
+            </a:r>
+            <a:endParaRPr lang="en-US" dirty="0"/>
           </a:p>
         </p:txBody>
       </p:sp>
@@ -6352,7 +6364,7 @@
           <a:p>
             <a:r>
               <a:rPr lang="en-US" dirty="0"/>
-              <a:t>Peter Mackenzie-Helnwein</a:t>
+              <a:t>Frank McKenna</a:t>
             </a:r>
           </a:p>
         </p:txBody>
@@ -6382,7 +6394,7 @@
           <a:p>
             <a:r>
               <a:rPr lang="en-US" dirty="0"/>
-              <a:t>University of Washington</a:t>
+              <a:t>University of California at Berkeley</a:t>
             </a:r>
           </a:p>
         </p:txBody>
@@ -6390,7 +6402,7 @@
     </p:spTree>
     <p:extLst>
       <p:ext uri="{BB962C8B-B14F-4D97-AF65-F5344CB8AC3E}">
-        <p14:creationId xmlns:p14="http://schemas.microsoft.com/office/powerpoint/2010/main" val="3458516751"/>
+        <p14:creationId xmlns:p14="http://schemas.microsoft.com/office/powerpoint/2010/main" val="2727555736"/>
       </p:ext>
     </p:extLst>
   </p:cSld>
@@ -6505,7 +6517,7 @@
     </p:spTree>
     <p:extLst>
       <p:ext uri="{BB962C8B-B14F-4D97-AF65-F5344CB8AC3E}">
-        <p14:creationId xmlns:p14="http://schemas.microsoft.com/office/powerpoint/2010/main" val="3927800354"/>
+        <p14:creationId xmlns:p14="http://schemas.microsoft.com/office/powerpoint/2010/main" val="3458516751"/>
       </p:ext>
     </p:extLst>
   </p:cSld>
@@ -6738,7 +6750,7 @@
     </p:spTree>
     <p:extLst>
       <p:ext uri="{BB962C8B-B14F-4D97-AF65-F5344CB8AC3E}">
-        <p14:creationId xmlns:p14="http://schemas.microsoft.com/office/powerpoint/2010/main" val="3408692930"/>
+        <p14:creationId xmlns:p14="http://schemas.microsoft.com/office/powerpoint/2010/main" val="3927800354"/>
       </p:ext>
     </p:extLst>
   </p:cSld>
@@ -6853,7 +6865,7 @@
     </p:spTree>
     <p:extLst>
       <p:ext uri="{BB962C8B-B14F-4D97-AF65-F5344CB8AC3E}">
-        <p14:creationId xmlns:p14="http://schemas.microsoft.com/office/powerpoint/2010/main" val="891150914"/>
+        <p14:creationId xmlns:p14="http://schemas.microsoft.com/office/powerpoint/2010/main" val="3408692930"/>
       </p:ext>
     </p:extLst>
   </p:cSld>
@@ -6968,7 +6980,7 @@
     </p:spTree>
     <p:extLst>
       <p:ext uri="{BB962C8B-B14F-4D97-AF65-F5344CB8AC3E}">
-        <p14:creationId xmlns:p14="http://schemas.microsoft.com/office/powerpoint/2010/main" val="1230198216"/>
+        <p14:creationId xmlns:p14="http://schemas.microsoft.com/office/powerpoint/2010/main" val="891150914"/>
       </p:ext>
     </p:extLst>
   </p:cSld>
@@ -7083,6 +7095,121 @@
     </p:spTree>
     <p:extLst>
       <p:ext uri="{BB962C8B-B14F-4D97-AF65-F5344CB8AC3E}">
+        <p14:creationId xmlns:p14="http://schemas.microsoft.com/office/powerpoint/2010/main" val="1230198216"/>
+      </p:ext>
+    </p:extLst>
+  </p:cSld>
+  <p:clrMapOvr>
+    <a:masterClrMapping/>
+  </p:clrMapOvr>
+</p:sld>
+</file>
+
+<file path=ppt/slides/slide34.xml><?xml version="1.0" encoding="utf-8"?>
+<p:sld xmlns:a="http://schemas.openxmlformats.org/drawingml/2006/main" xmlns:r="http://schemas.openxmlformats.org/officeDocument/2006/relationships" xmlns:p="http://schemas.openxmlformats.org/presentationml/2006/main">
+  <p:cSld>
+    <p:spTree>
+      <p:nvGrpSpPr>
+        <p:cNvPr id="1" name=""/>
+        <p:cNvGrpSpPr/>
+        <p:nvPr/>
+      </p:nvGrpSpPr>
+      <p:grpSpPr>
+        <a:xfrm>
+          <a:off x="0" y="0"/>
+          <a:ext cx="0" cy="0"/>
+          <a:chOff x="0" y="0"/>
+          <a:chExt cx="0" cy="0"/>
+        </a:xfrm>
+      </p:grpSpPr>
+      <p:sp>
+        <p:nvSpPr>
+          <p:cNvPr id="7" name="Subtitle 6">
+            <a:extLst>
+              <a:ext uri="{FF2B5EF4-FFF2-40B4-BE49-F238E27FC236}">
+                <a16:creationId xmlns:a16="http://schemas.microsoft.com/office/drawing/2014/main" id="{B21F99FE-2B30-814C-BB06-2595F16BD124}"/>
+              </a:ext>
+            </a:extLst>
+          </p:cNvPr>
+          <p:cNvSpPr>
+            <a:spLocks noGrp="1"/>
+          </p:cNvSpPr>
+          <p:nvPr>
+            <p:ph type="subTitle" idx="1"/>
+          </p:nvPr>
+        </p:nvSpPr>
+        <p:spPr/>
+        <p:txBody>
+          <a:bodyPr/>
+          <a:lstStyle/>
+          <a:p>
+            <a:endParaRPr lang="en-US"/>
+          </a:p>
+        </p:txBody>
+      </p:sp>
+      <p:sp>
+        <p:nvSpPr>
+          <p:cNvPr id="5" name="Text Placeholder 4">
+            <a:extLst>
+              <a:ext uri="{FF2B5EF4-FFF2-40B4-BE49-F238E27FC236}">
+                <a16:creationId xmlns:a16="http://schemas.microsoft.com/office/drawing/2014/main" id="{F828C3F3-D358-8D4F-BAC9-9043145A88D1}"/>
+              </a:ext>
+            </a:extLst>
+          </p:cNvPr>
+          <p:cNvSpPr>
+            <a:spLocks noGrp="1"/>
+          </p:cNvSpPr>
+          <p:nvPr>
+            <p:ph type="body" sz="quarter" idx="11"/>
+          </p:nvPr>
+        </p:nvSpPr>
+        <p:spPr/>
+        <p:txBody>
+          <a:bodyPr>
+            <a:normAutofit lnSpcReduction="10000"/>
+          </a:bodyPr>
+          <a:lstStyle/>
+          <a:p>
+            <a:r>
+              <a:rPr lang="en-US" dirty="0"/>
+              <a:t>Peter Mackenzie-Helnwein</a:t>
+            </a:r>
+          </a:p>
+        </p:txBody>
+      </p:sp>
+      <p:sp>
+        <p:nvSpPr>
+          <p:cNvPr id="6" name="Text Placeholder 5">
+            <a:extLst>
+              <a:ext uri="{FF2B5EF4-FFF2-40B4-BE49-F238E27FC236}">
+                <a16:creationId xmlns:a16="http://schemas.microsoft.com/office/drawing/2014/main" id="{860E1C64-9002-3948-A97E-48870344E6E7}"/>
+              </a:ext>
+            </a:extLst>
+          </p:cNvPr>
+          <p:cNvSpPr>
+            <a:spLocks noGrp="1"/>
+          </p:cNvSpPr>
+          <p:nvPr>
+            <p:ph type="body" sz="quarter" idx="12"/>
+          </p:nvPr>
+        </p:nvSpPr>
+        <p:spPr/>
+        <p:txBody>
+          <a:bodyPr>
+            <a:normAutofit fontScale="92500" lnSpcReduction="20000"/>
+          </a:bodyPr>
+          <a:lstStyle/>
+          <a:p>
+            <a:r>
+              <a:rPr lang="en-US" dirty="0"/>
+              <a:t>University of Washington</a:t>
+            </a:r>
+          </a:p>
+        </p:txBody>
+      </p:sp>
+    </p:spTree>
+    <p:extLst>
+      <p:ext uri="{BB962C8B-B14F-4D97-AF65-F5344CB8AC3E}">
         <p14:creationId xmlns:p14="http://schemas.microsoft.com/office/powerpoint/2010/main" val="4178150776"/>
       </p:ext>
     </p:extLst>
@@ -7093,7 +7220,7 @@
 </p:sld>
 </file>
 
-<file path=ppt/slides/slide34.xml><?xml version="1.0" encoding="utf-8"?>
+<file path=ppt/slides/slide35.xml><?xml version="1.0" encoding="utf-8"?>
 <p:sld xmlns:a="http://schemas.openxmlformats.org/drawingml/2006/main" xmlns:r="http://schemas.openxmlformats.org/officeDocument/2006/relationships" xmlns:p="http://schemas.openxmlformats.org/presentationml/2006/main">
   <p:cSld>
     <p:spTree>

</xml_diff>

<commit_message>
Adding video links from Day 6 (Monday of week 2)
</commit_message>
<xml_diff>
--- a/presentations/SimCenter Bootcamp Python.pptx
+++ b/presentations/SimCenter Bootcamp Python.pptx
@@ -33,13 +33,15 @@
     <p:sldId id="269" r:id="rId27"/>
     <p:sldId id="270" r:id="rId28"/>
     <p:sldId id="291" r:id="rId29"/>
-    <p:sldId id="271" r:id="rId30"/>
-    <p:sldId id="272" r:id="rId31"/>
-    <p:sldId id="273" r:id="rId32"/>
-    <p:sldId id="274" r:id="rId33"/>
-    <p:sldId id="275" r:id="rId34"/>
-    <p:sldId id="276" r:id="rId35"/>
-    <p:sldId id="257" r:id="rId36"/>
+    <p:sldId id="292" r:id="rId30"/>
+    <p:sldId id="293" r:id="rId31"/>
+    <p:sldId id="271" r:id="rId32"/>
+    <p:sldId id="272" r:id="rId33"/>
+    <p:sldId id="273" r:id="rId34"/>
+    <p:sldId id="274" r:id="rId35"/>
+    <p:sldId id="275" r:id="rId36"/>
+    <p:sldId id="276" r:id="rId37"/>
+    <p:sldId id="257" r:id="rId38"/>
   </p:sldIdLst>
   <p:sldSz cx="12192000" cy="6858000"/>
   <p:notesSz cx="6858000" cy="9144000"/>
@@ -842,7 +844,7 @@
           <a:p>
             <a:fld id="{B84125C9-AED3-0F47-B44C-0465FAA4AF51}" type="datetimeFigureOut">
               <a:rPr lang="en-US" smtClean="0"/>
-              <a:t>8/15/20</a:t>
+              <a:t>8/17/20</a:t>
             </a:fld>
             <a:endParaRPr lang="en-US"/>
           </a:p>
@@ -1040,7 +1042,7 @@
           <a:p>
             <a:fld id="{B84125C9-AED3-0F47-B44C-0465FAA4AF51}" type="datetimeFigureOut">
               <a:rPr lang="en-US" smtClean="0"/>
-              <a:t>8/15/20</a:t>
+              <a:t>8/17/20</a:t>
             </a:fld>
             <a:endParaRPr lang="en-US"/>
           </a:p>
@@ -1248,7 +1250,7 @@
           <a:p>
             <a:fld id="{B84125C9-AED3-0F47-B44C-0465FAA4AF51}" type="datetimeFigureOut">
               <a:rPr lang="en-US" smtClean="0"/>
-              <a:t>8/15/20</a:t>
+              <a:t>8/17/20</a:t>
             </a:fld>
             <a:endParaRPr lang="en-US"/>
           </a:p>
@@ -1468,7 +1470,7 @@
           <a:p>
             <a:fld id="{B84125C9-AED3-0F47-B44C-0465FAA4AF51}" type="datetimeFigureOut">
               <a:rPr lang="en-US" smtClean="0"/>
-              <a:t>8/15/20</a:t>
+              <a:t>8/17/20</a:t>
             </a:fld>
             <a:endParaRPr lang="en-US"/>
           </a:p>
@@ -1666,7 +1668,7 @@
           <a:p>
             <a:fld id="{B84125C9-AED3-0F47-B44C-0465FAA4AF51}" type="datetimeFigureOut">
               <a:rPr lang="en-US" smtClean="0"/>
-              <a:t>8/15/20</a:t>
+              <a:t>8/17/20</a:t>
             </a:fld>
             <a:endParaRPr lang="en-US"/>
           </a:p>
@@ -1941,7 +1943,7 @@
           <a:p>
             <a:fld id="{B84125C9-AED3-0F47-B44C-0465FAA4AF51}" type="datetimeFigureOut">
               <a:rPr lang="en-US" smtClean="0"/>
-              <a:t>8/15/20</a:t>
+              <a:t>8/17/20</a:t>
             </a:fld>
             <a:endParaRPr lang="en-US"/>
           </a:p>
@@ -2206,7 +2208,7 @@
           <a:p>
             <a:fld id="{B84125C9-AED3-0F47-B44C-0465FAA4AF51}" type="datetimeFigureOut">
               <a:rPr lang="en-US" smtClean="0"/>
-              <a:t>8/15/20</a:t>
+              <a:t>8/17/20</a:t>
             </a:fld>
             <a:endParaRPr lang="en-US"/>
           </a:p>
@@ -2618,7 +2620,7 @@
           <a:p>
             <a:fld id="{B84125C9-AED3-0F47-B44C-0465FAA4AF51}" type="datetimeFigureOut">
               <a:rPr lang="en-US" smtClean="0"/>
-              <a:t>8/15/20</a:t>
+              <a:t>8/17/20</a:t>
             </a:fld>
             <a:endParaRPr lang="en-US"/>
           </a:p>
@@ -2759,7 +2761,7 @@
           <a:p>
             <a:fld id="{B84125C9-AED3-0F47-B44C-0465FAA4AF51}" type="datetimeFigureOut">
               <a:rPr lang="en-US" smtClean="0"/>
-              <a:t>8/15/20</a:t>
+              <a:t>8/17/20</a:t>
             </a:fld>
             <a:endParaRPr lang="en-US"/>
           </a:p>
@@ -2872,7 +2874,7 @@
           <a:p>
             <a:fld id="{B84125C9-AED3-0F47-B44C-0465FAA4AF51}" type="datetimeFigureOut">
               <a:rPr lang="en-US" smtClean="0"/>
-              <a:t>8/15/20</a:t>
+              <a:t>8/17/20</a:t>
             </a:fld>
             <a:endParaRPr lang="en-US"/>
           </a:p>
@@ -3183,7 +3185,7 @@
           <a:p>
             <a:fld id="{B84125C9-AED3-0F47-B44C-0465FAA4AF51}" type="datetimeFigureOut">
               <a:rPr lang="en-US" smtClean="0"/>
-              <a:t>8/15/20</a:t>
+              <a:t>8/17/20</a:t>
             </a:fld>
             <a:endParaRPr lang="en-US"/>
           </a:p>
@@ -3424,7 +3426,7 @@
           <a:p>
             <a:fld id="{B84125C9-AED3-0F47-B44C-0465FAA4AF51}" type="datetimeFigureOut">
               <a:rPr lang="en-US" smtClean="0"/>
-              <a:t>8/15/20</a:t>
+              <a:t>8/17/20</a:t>
             </a:fld>
             <a:endParaRPr lang="en-US"/>
           </a:p>
@@ -6450,7 +6452,10 @@
           <a:bodyPr/>
           <a:lstStyle/>
           <a:p>
-            <a:endParaRPr lang="en-US"/>
+            <a:r>
+              <a:rPr lang="en-US" dirty="0"/>
+              <a:t>Parallel Programming using MPI in C</a:t>
+            </a:r>
           </a:p>
         </p:txBody>
       </p:sp>
@@ -6479,7 +6484,7 @@
           <a:p>
             <a:r>
               <a:rPr lang="en-US" dirty="0"/>
-              <a:t>Peter Mackenzie-Helnwein</a:t>
+              <a:t>Frank McKenna</a:t>
             </a:r>
           </a:p>
         </p:txBody>
@@ -6509,7 +6514,7 @@
           <a:p>
             <a:r>
               <a:rPr lang="en-US" dirty="0"/>
-              <a:t>University of Washington</a:t>
+              <a:t>University of California at Berkeley</a:t>
             </a:r>
           </a:p>
         </p:txBody>
@@ -6517,7 +6522,7 @@
     </p:spTree>
     <p:extLst>
       <p:ext uri="{BB962C8B-B14F-4D97-AF65-F5344CB8AC3E}">
-        <p14:creationId xmlns:p14="http://schemas.microsoft.com/office/powerpoint/2010/main" val="3458516751"/>
+        <p14:creationId xmlns:p14="http://schemas.microsoft.com/office/powerpoint/2010/main" val="4201734205"/>
       </p:ext>
     </p:extLst>
   </p:cSld>
@@ -6683,7 +6688,18 @@
           <a:bodyPr/>
           <a:lstStyle/>
           <a:p>
-            <a:endParaRPr lang="en-US"/>
+            <a:r>
+              <a:rPr lang="en-US" dirty="0"/>
+              <a:t>Parallel Programming using </a:t>
+            </a:r>
+            <a:r>
+              <a:rPr lang="en-US" dirty="0" err="1"/>
+              <a:t>openMP</a:t>
+            </a:r>
+            <a:r>
+              <a:rPr lang="en-US" dirty="0"/>
+              <a:t> in C</a:t>
+            </a:r>
           </a:p>
         </p:txBody>
       </p:sp>
@@ -6712,7 +6728,7 @@
           <a:p>
             <a:r>
               <a:rPr lang="en-US" dirty="0"/>
-              <a:t>Peter Mackenzie-Helnwein</a:t>
+              <a:t>Frank McKenna</a:t>
             </a:r>
           </a:p>
         </p:txBody>
@@ -6742,7 +6758,7 @@
           <a:p>
             <a:r>
               <a:rPr lang="en-US" dirty="0"/>
-              <a:t>University of Washington</a:t>
+              <a:t>University of California at Berkeley</a:t>
             </a:r>
           </a:p>
         </p:txBody>
@@ -6750,7 +6766,7 @@
     </p:spTree>
     <p:extLst>
       <p:ext uri="{BB962C8B-B14F-4D97-AF65-F5344CB8AC3E}">
-        <p14:creationId xmlns:p14="http://schemas.microsoft.com/office/powerpoint/2010/main" val="3927800354"/>
+        <p14:creationId xmlns:p14="http://schemas.microsoft.com/office/powerpoint/2010/main" val="2593357856"/>
       </p:ext>
     </p:extLst>
   </p:cSld>
@@ -6865,7 +6881,7 @@
     </p:spTree>
     <p:extLst>
       <p:ext uri="{BB962C8B-B14F-4D97-AF65-F5344CB8AC3E}">
-        <p14:creationId xmlns:p14="http://schemas.microsoft.com/office/powerpoint/2010/main" val="3408692930"/>
+        <p14:creationId xmlns:p14="http://schemas.microsoft.com/office/powerpoint/2010/main" val="3458516751"/>
       </p:ext>
     </p:extLst>
   </p:cSld>
@@ -6980,7 +6996,7 @@
     </p:spTree>
     <p:extLst>
       <p:ext uri="{BB962C8B-B14F-4D97-AF65-F5344CB8AC3E}">
-        <p14:creationId xmlns:p14="http://schemas.microsoft.com/office/powerpoint/2010/main" val="891150914"/>
+        <p14:creationId xmlns:p14="http://schemas.microsoft.com/office/powerpoint/2010/main" val="3927800354"/>
       </p:ext>
     </p:extLst>
   </p:cSld>
@@ -7095,7 +7111,7 @@
     </p:spTree>
     <p:extLst>
       <p:ext uri="{BB962C8B-B14F-4D97-AF65-F5344CB8AC3E}">
-        <p14:creationId xmlns:p14="http://schemas.microsoft.com/office/powerpoint/2010/main" val="1230198216"/>
+        <p14:creationId xmlns:p14="http://schemas.microsoft.com/office/powerpoint/2010/main" val="3408692930"/>
       </p:ext>
     </p:extLst>
   </p:cSld>
@@ -7210,6 +7226,236 @@
     </p:spTree>
     <p:extLst>
       <p:ext uri="{BB962C8B-B14F-4D97-AF65-F5344CB8AC3E}">
+        <p14:creationId xmlns:p14="http://schemas.microsoft.com/office/powerpoint/2010/main" val="891150914"/>
+      </p:ext>
+    </p:extLst>
+  </p:cSld>
+  <p:clrMapOvr>
+    <a:masterClrMapping/>
+  </p:clrMapOvr>
+</p:sld>
+</file>
+
+<file path=ppt/slides/slide35.xml><?xml version="1.0" encoding="utf-8"?>
+<p:sld xmlns:a="http://schemas.openxmlformats.org/drawingml/2006/main" xmlns:r="http://schemas.openxmlformats.org/officeDocument/2006/relationships" xmlns:p="http://schemas.openxmlformats.org/presentationml/2006/main">
+  <p:cSld>
+    <p:spTree>
+      <p:nvGrpSpPr>
+        <p:cNvPr id="1" name=""/>
+        <p:cNvGrpSpPr/>
+        <p:nvPr/>
+      </p:nvGrpSpPr>
+      <p:grpSpPr>
+        <a:xfrm>
+          <a:off x="0" y="0"/>
+          <a:ext cx="0" cy="0"/>
+          <a:chOff x="0" y="0"/>
+          <a:chExt cx="0" cy="0"/>
+        </a:xfrm>
+      </p:grpSpPr>
+      <p:sp>
+        <p:nvSpPr>
+          <p:cNvPr id="7" name="Subtitle 6">
+            <a:extLst>
+              <a:ext uri="{FF2B5EF4-FFF2-40B4-BE49-F238E27FC236}">
+                <a16:creationId xmlns:a16="http://schemas.microsoft.com/office/drawing/2014/main" id="{B21F99FE-2B30-814C-BB06-2595F16BD124}"/>
+              </a:ext>
+            </a:extLst>
+          </p:cNvPr>
+          <p:cNvSpPr>
+            <a:spLocks noGrp="1"/>
+          </p:cNvSpPr>
+          <p:nvPr>
+            <p:ph type="subTitle" idx="1"/>
+          </p:nvPr>
+        </p:nvSpPr>
+        <p:spPr/>
+        <p:txBody>
+          <a:bodyPr/>
+          <a:lstStyle/>
+          <a:p>
+            <a:endParaRPr lang="en-US"/>
+          </a:p>
+        </p:txBody>
+      </p:sp>
+      <p:sp>
+        <p:nvSpPr>
+          <p:cNvPr id="5" name="Text Placeholder 4">
+            <a:extLst>
+              <a:ext uri="{FF2B5EF4-FFF2-40B4-BE49-F238E27FC236}">
+                <a16:creationId xmlns:a16="http://schemas.microsoft.com/office/drawing/2014/main" id="{F828C3F3-D358-8D4F-BAC9-9043145A88D1}"/>
+              </a:ext>
+            </a:extLst>
+          </p:cNvPr>
+          <p:cNvSpPr>
+            <a:spLocks noGrp="1"/>
+          </p:cNvSpPr>
+          <p:nvPr>
+            <p:ph type="body" sz="quarter" idx="11"/>
+          </p:nvPr>
+        </p:nvSpPr>
+        <p:spPr/>
+        <p:txBody>
+          <a:bodyPr>
+            <a:normAutofit lnSpcReduction="10000"/>
+          </a:bodyPr>
+          <a:lstStyle/>
+          <a:p>
+            <a:r>
+              <a:rPr lang="en-US" dirty="0"/>
+              <a:t>Peter Mackenzie-Helnwein</a:t>
+            </a:r>
+          </a:p>
+        </p:txBody>
+      </p:sp>
+      <p:sp>
+        <p:nvSpPr>
+          <p:cNvPr id="6" name="Text Placeholder 5">
+            <a:extLst>
+              <a:ext uri="{FF2B5EF4-FFF2-40B4-BE49-F238E27FC236}">
+                <a16:creationId xmlns:a16="http://schemas.microsoft.com/office/drawing/2014/main" id="{860E1C64-9002-3948-A97E-48870344E6E7}"/>
+              </a:ext>
+            </a:extLst>
+          </p:cNvPr>
+          <p:cNvSpPr>
+            <a:spLocks noGrp="1"/>
+          </p:cNvSpPr>
+          <p:nvPr>
+            <p:ph type="body" sz="quarter" idx="12"/>
+          </p:nvPr>
+        </p:nvSpPr>
+        <p:spPr/>
+        <p:txBody>
+          <a:bodyPr>
+            <a:normAutofit fontScale="92500" lnSpcReduction="20000"/>
+          </a:bodyPr>
+          <a:lstStyle/>
+          <a:p>
+            <a:r>
+              <a:rPr lang="en-US" dirty="0"/>
+              <a:t>University of Washington</a:t>
+            </a:r>
+          </a:p>
+        </p:txBody>
+      </p:sp>
+    </p:spTree>
+    <p:extLst>
+      <p:ext uri="{BB962C8B-B14F-4D97-AF65-F5344CB8AC3E}">
+        <p14:creationId xmlns:p14="http://schemas.microsoft.com/office/powerpoint/2010/main" val="1230198216"/>
+      </p:ext>
+    </p:extLst>
+  </p:cSld>
+  <p:clrMapOvr>
+    <a:masterClrMapping/>
+  </p:clrMapOvr>
+</p:sld>
+</file>
+
+<file path=ppt/slides/slide36.xml><?xml version="1.0" encoding="utf-8"?>
+<p:sld xmlns:a="http://schemas.openxmlformats.org/drawingml/2006/main" xmlns:r="http://schemas.openxmlformats.org/officeDocument/2006/relationships" xmlns:p="http://schemas.openxmlformats.org/presentationml/2006/main">
+  <p:cSld>
+    <p:spTree>
+      <p:nvGrpSpPr>
+        <p:cNvPr id="1" name=""/>
+        <p:cNvGrpSpPr/>
+        <p:nvPr/>
+      </p:nvGrpSpPr>
+      <p:grpSpPr>
+        <a:xfrm>
+          <a:off x="0" y="0"/>
+          <a:ext cx="0" cy="0"/>
+          <a:chOff x="0" y="0"/>
+          <a:chExt cx="0" cy="0"/>
+        </a:xfrm>
+      </p:grpSpPr>
+      <p:sp>
+        <p:nvSpPr>
+          <p:cNvPr id="7" name="Subtitle 6">
+            <a:extLst>
+              <a:ext uri="{FF2B5EF4-FFF2-40B4-BE49-F238E27FC236}">
+                <a16:creationId xmlns:a16="http://schemas.microsoft.com/office/drawing/2014/main" id="{B21F99FE-2B30-814C-BB06-2595F16BD124}"/>
+              </a:ext>
+            </a:extLst>
+          </p:cNvPr>
+          <p:cNvSpPr>
+            <a:spLocks noGrp="1"/>
+          </p:cNvSpPr>
+          <p:nvPr>
+            <p:ph type="subTitle" idx="1"/>
+          </p:nvPr>
+        </p:nvSpPr>
+        <p:spPr/>
+        <p:txBody>
+          <a:bodyPr/>
+          <a:lstStyle/>
+          <a:p>
+            <a:endParaRPr lang="en-US"/>
+          </a:p>
+        </p:txBody>
+      </p:sp>
+      <p:sp>
+        <p:nvSpPr>
+          <p:cNvPr id="5" name="Text Placeholder 4">
+            <a:extLst>
+              <a:ext uri="{FF2B5EF4-FFF2-40B4-BE49-F238E27FC236}">
+                <a16:creationId xmlns:a16="http://schemas.microsoft.com/office/drawing/2014/main" id="{F828C3F3-D358-8D4F-BAC9-9043145A88D1}"/>
+              </a:ext>
+            </a:extLst>
+          </p:cNvPr>
+          <p:cNvSpPr>
+            <a:spLocks noGrp="1"/>
+          </p:cNvSpPr>
+          <p:nvPr>
+            <p:ph type="body" sz="quarter" idx="11"/>
+          </p:nvPr>
+        </p:nvSpPr>
+        <p:spPr/>
+        <p:txBody>
+          <a:bodyPr>
+            <a:normAutofit lnSpcReduction="10000"/>
+          </a:bodyPr>
+          <a:lstStyle/>
+          <a:p>
+            <a:r>
+              <a:rPr lang="en-US" dirty="0"/>
+              <a:t>Peter Mackenzie-Helnwein</a:t>
+            </a:r>
+          </a:p>
+        </p:txBody>
+      </p:sp>
+      <p:sp>
+        <p:nvSpPr>
+          <p:cNvPr id="6" name="Text Placeholder 5">
+            <a:extLst>
+              <a:ext uri="{FF2B5EF4-FFF2-40B4-BE49-F238E27FC236}">
+                <a16:creationId xmlns:a16="http://schemas.microsoft.com/office/drawing/2014/main" id="{860E1C64-9002-3948-A97E-48870344E6E7}"/>
+              </a:ext>
+            </a:extLst>
+          </p:cNvPr>
+          <p:cNvSpPr>
+            <a:spLocks noGrp="1"/>
+          </p:cNvSpPr>
+          <p:nvPr>
+            <p:ph type="body" sz="quarter" idx="12"/>
+          </p:nvPr>
+        </p:nvSpPr>
+        <p:spPr/>
+        <p:txBody>
+          <a:bodyPr>
+            <a:normAutofit fontScale="92500" lnSpcReduction="20000"/>
+          </a:bodyPr>
+          <a:lstStyle/>
+          <a:p>
+            <a:r>
+              <a:rPr lang="en-US" dirty="0"/>
+              <a:t>University of Washington</a:t>
+            </a:r>
+          </a:p>
+        </p:txBody>
+      </p:sp>
+    </p:spTree>
+    <p:extLst>
+      <p:ext uri="{BB962C8B-B14F-4D97-AF65-F5344CB8AC3E}">
         <p14:creationId xmlns:p14="http://schemas.microsoft.com/office/powerpoint/2010/main" val="4178150776"/>
       </p:ext>
     </p:extLst>
@@ -7220,7 +7466,7 @@
 </p:sld>
 </file>
 
-<file path=ppt/slides/slide35.xml><?xml version="1.0" encoding="utf-8"?>
+<file path=ppt/slides/slide37.xml><?xml version="1.0" encoding="utf-8"?>
 <p:sld xmlns:a="http://schemas.openxmlformats.org/drawingml/2006/main" xmlns:r="http://schemas.openxmlformats.org/officeDocument/2006/relationships" xmlns:p="http://schemas.openxmlformats.org/presentationml/2006/main">
   <p:cSld>
     <p:spTree>

</xml_diff>

<commit_message>
Updated docs to include Day 7 (Tuesday of week 2)
</commit_message>
<xml_diff>
--- a/presentations/SimCenter Bootcamp Python.pptx
+++ b/presentations/SimCenter Bootcamp Python.pptx
@@ -35,12 +35,12 @@
     <p:sldId id="291" r:id="rId29"/>
     <p:sldId id="292" r:id="rId30"/>
     <p:sldId id="293" r:id="rId31"/>
-    <p:sldId id="271" r:id="rId32"/>
-    <p:sldId id="272" r:id="rId33"/>
-    <p:sldId id="273" r:id="rId34"/>
-    <p:sldId id="274" r:id="rId35"/>
-    <p:sldId id="275" r:id="rId36"/>
-    <p:sldId id="276" r:id="rId37"/>
+    <p:sldId id="294" r:id="rId32"/>
+    <p:sldId id="295" r:id="rId33"/>
+    <p:sldId id="296" r:id="rId34"/>
+    <p:sldId id="297" r:id="rId35"/>
+    <p:sldId id="298" r:id="rId36"/>
+    <p:sldId id="299" r:id="rId37"/>
     <p:sldId id="257" r:id="rId38"/>
   </p:sldIdLst>
   <p:sldSz cx="12192000" cy="6858000"/>
@@ -844,7 +844,7 @@
           <a:p>
             <a:fld id="{B84125C9-AED3-0F47-B44C-0465FAA4AF51}" type="datetimeFigureOut">
               <a:rPr lang="en-US" smtClean="0"/>
-              <a:t>8/17/20</a:t>
+              <a:t>8/19/20</a:t>
             </a:fld>
             <a:endParaRPr lang="en-US"/>
           </a:p>
@@ -1042,7 +1042,7 @@
           <a:p>
             <a:fld id="{B84125C9-AED3-0F47-B44C-0465FAA4AF51}" type="datetimeFigureOut">
               <a:rPr lang="en-US" smtClean="0"/>
-              <a:t>8/17/20</a:t>
+              <a:t>8/19/20</a:t>
             </a:fld>
             <a:endParaRPr lang="en-US"/>
           </a:p>
@@ -1250,7 +1250,7 @@
           <a:p>
             <a:fld id="{B84125C9-AED3-0F47-B44C-0465FAA4AF51}" type="datetimeFigureOut">
               <a:rPr lang="en-US" smtClean="0"/>
-              <a:t>8/17/20</a:t>
+              <a:t>8/19/20</a:t>
             </a:fld>
             <a:endParaRPr lang="en-US"/>
           </a:p>
@@ -1470,7 +1470,7 @@
           <a:p>
             <a:fld id="{B84125C9-AED3-0F47-B44C-0465FAA4AF51}" type="datetimeFigureOut">
               <a:rPr lang="en-US" smtClean="0"/>
-              <a:t>8/17/20</a:t>
+              <a:t>8/19/20</a:t>
             </a:fld>
             <a:endParaRPr lang="en-US"/>
           </a:p>
@@ -1668,7 +1668,7 @@
           <a:p>
             <a:fld id="{B84125C9-AED3-0F47-B44C-0465FAA4AF51}" type="datetimeFigureOut">
               <a:rPr lang="en-US" smtClean="0"/>
-              <a:t>8/17/20</a:t>
+              <a:t>8/19/20</a:t>
             </a:fld>
             <a:endParaRPr lang="en-US"/>
           </a:p>
@@ -1943,7 +1943,7 @@
           <a:p>
             <a:fld id="{B84125C9-AED3-0F47-B44C-0465FAA4AF51}" type="datetimeFigureOut">
               <a:rPr lang="en-US" smtClean="0"/>
-              <a:t>8/17/20</a:t>
+              <a:t>8/19/20</a:t>
             </a:fld>
             <a:endParaRPr lang="en-US"/>
           </a:p>
@@ -2208,7 +2208,7 @@
           <a:p>
             <a:fld id="{B84125C9-AED3-0F47-B44C-0465FAA4AF51}" type="datetimeFigureOut">
               <a:rPr lang="en-US" smtClean="0"/>
-              <a:t>8/17/20</a:t>
+              <a:t>8/19/20</a:t>
             </a:fld>
             <a:endParaRPr lang="en-US"/>
           </a:p>
@@ -2620,7 +2620,7 @@
           <a:p>
             <a:fld id="{B84125C9-AED3-0F47-B44C-0465FAA4AF51}" type="datetimeFigureOut">
               <a:rPr lang="en-US" smtClean="0"/>
-              <a:t>8/17/20</a:t>
+              <a:t>8/19/20</a:t>
             </a:fld>
             <a:endParaRPr lang="en-US"/>
           </a:p>
@@ -2761,7 +2761,7 @@
           <a:p>
             <a:fld id="{B84125C9-AED3-0F47-B44C-0465FAA4AF51}" type="datetimeFigureOut">
               <a:rPr lang="en-US" smtClean="0"/>
-              <a:t>8/17/20</a:t>
+              <a:t>8/19/20</a:t>
             </a:fld>
             <a:endParaRPr lang="en-US"/>
           </a:p>
@@ -2874,7 +2874,7 @@
           <a:p>
             <a:fld id="{B84125C9-AED3-0F47-B44C-0465FAA4AF51}" type="datetimeFigureOut">
               <a:rPr lang="en-US" smtClean="0"/>
-              <a:t>8/17/20</a:t>
+              <a:t>8/19/20</a:t>
             </a:fld>
             <a:endParaRPr lang="en-US"/>
           </a:p>
@@ -3185,7 +3185,7 @@
           <a:p>
             <a:fld id="{B84125C9-AED3-0F47-B44C-0465FAA4AF51}" type="datetimeFigureOut">
               <a:rPr lang="en-US" smtClean="0"/>
-              <a:t>8/17/20</a:t>
+              <a:t>8/19/20</a:t>
             </a:fld>
             <a:endParaRPr lang="en-US"/>
           </a:p>
@@ -3426,7 +3426,7 @@
           <a:p>
             <a:fld id="{B84125C9-AED3-0F47-B44C-0465FAA4AF51}" type="datetimeFigureOut">
               <a:rPr lang="en-US" smtClean="0"/>
-              <a:t>8/17/20</a:t>
+              <a:t>8/19/20</a:t>
             </a:fld>
             <a:endParaRPr lang="en-US"/>
           </a:p>
@@ -6814,7 +6814,10 @@
           <a:bodyPr/>
           <a:lstStyle/>
           <a:p>
-            <a:endParaRPr lang="en-US"/>
+            <a:r>
+              <a:rPr lang="en-US" dirty="0"/>
+              <a:t>Abstraction in C</a:t>
+            </a:r>
           </a:p>
         </p:txBody>
       </p:sp>
@@ -6843,7 +6846,7 @@
           <a:p>
             <a:r>
               <a:rPr lang="en-US" dirty="0"/>
-              <a:t>Peter Mackenzie-Helnwein</a:t>
+              <a:t>Frank McKenna</a:t>
             </a:r>
           </a:p>
         </p:txBody>
@@ -6873,7 +6876,7 @@
           <a:p>
             <a:r>
               <a:rPr lang="en-US" dirty="0"/>
-              <a:t>University of Washington</a:t>
+              <a:t>University of California at Berkeley</a:t>
             </a:r>
           </a:p>
         </p:txBody>
@@ -6881,7 +6884,7 @@
     </p:spTree>
     <p:extLst>
       <p:ext uri="{BB962C8B-B14F-4D97-AF65-F5344CB8AC3E}">
-        <p14:creationId xmlns:p14="http://schemas.microsoft.com/office/powerpoint/2010/main" val="3458516751"/>
+        <p14:creationId xmlns:p14="http://schemas.microsoft.com/office/powerpoint/2010/main" val="2733220156"/>
       </p:ext>
     </p:extLst>
   </p:cSld>
@@ -6929,7 +6932,10 @@
           <a:bodyPr/>
           <a:lstStyle/>
           <a:p>
-            <a:endParaRPr lang="en-US"/>
+            <a:r>
+              <a:rPr lang="en-US" dirty="0"/>
+              <a:t>Object Oriented Programming in C++</a:t>
+            </a:r>
           </a:p>
         </p:txBody>
       </p:sp>
@@ -6958,7 +6964,7 @@
           <a:p>
             <a:r>
               <a:rPr lang="en-US" dirty="0"/>
-              <a:t>Peter Mackenzie-Helnwein</a:t>
+              <a:t>Frank McKenna</a:t>
             </a:r>
           </a:p>
         </p:txBody>
@@ -6988,7 +6994,7 @@
           <a:p>
             <a:r>
               <a:rPr lang="en-US" dirty="0"/>
-              <a:t>University of Washington</a:t>
+              <a:t>University of California at Berkeley</a:t>
             </a:r>
           </a:p>
         </p:txBody>
@@ -6996,7 +7002,7 @@
     </p:spTree>
     <p:extLst>
       <p:ext uri="{BB962C8B-B14F-4D97-AF65-F5344CB8AC3E}">
-        <p14:creationId xmlns:p14="http://schemas.microsoft.com/office/powerpoint/2010/main" val="3927800354"/>
+        <p14:creationId xmlns:p14="http://schemas.microsoft.com/office/powerpoint/2010/main" val="21911372"/>
       </p:ext>
     </p:extLst>
   </p:cSld>
@@ -7044,7 +7050,15 @@
           <a:bodyPr/>
           <a:lstStyle/>
           <a:p>
-            <a:endParaRPr lang="en-US"/>
+            <a:r>
+              <a:rPr lang="en-US" dirty="0"/>
+              <a:t>Software Design Example: </a:t>
+            </a:r>
+            <a:r>
+              <a:rPr lang="en-US" dirty="0" err="1"/>
+              <a:t>OpenSees</a:t>
+            </a:r>
+            <a:endParaRPr lang="en-US" dirty="0"/>
           </a:p>
         </p:txBody>
       </p:sp>
@@ -7073,7 +7087,7 @@
           <a:p>
             <a:r>
               <a:rPr lang="en-US" dirty="0"/>
-              <a:t>Peter Mackenzie-Helnwein</a:t>
+              <a:t>Frank McKenna</a:t>
             </a:r>
           </a:p>
         </p:txBody>
@@ -7103,7 +7117,7 @@
           <a:p>
             <a:r>
               <a:rPr lang="en-US" dirty="0"/>
-              <a:t>University of Washington</a:t>
+              <a:t>University of California at Berkeley</a:t>
             </a:r>
           </a:p>
         </p:txBody>
@@ -7111,7 +7125,7 @@
     </p:spTree>
     <p:extLst>
       <p:ext uri="{BB962C8B-B14F-4D97-AF65-F5344CB8AC3E}">
-        <p14:creationId xmlns:p14="http://schemas.microsoft.com/office/powerpoint/2010/main" val="3408692930"/>
+        <p14:creationId xmlns:p14="http://schemas.microsoft.com/office/powerpoint/2010/main" val="1421085571"/>
       </p:ext>
     </p:extLst>
   </p:cSld>
@@ -7159,7 +7173,10 @@
           <a:bodyPr/>
           <a:lstStyle/>
           <a:p>
-            <a:endParaRPr lang="en-US"/>
+            <a:r>
+              <a:rPr lang="en-US" dirty="0"/>
+              <a:t>EMACS - Tips &amp; Tricks</a:t>
+            </a:r>
           </a:p>
         </p:txBody>
       </p:sp>
@@ -7188,7 +7205,7 @@
           <a:p>
             <a:r>
               <a:rPr lang="en-US" dirty="0"/>
-              <a:t>Peter Mackenzie-Helnwein</a:t>
+              <a:t>Frank McKenna</a:t>
             </a:r>
           </a:p>
         </p:txBody>
@@ -7218,7 +7235,7 @@
           <a:p>
             <a:r>
               <a:rPr lang="en-US" dirty="0"/>
-              <a:t>University of Washington</a:t>
+              <a:t>University of California at Berkeley</a:t>
             </a:r>
           </a:p>
         </p:txBody>
@@ -7226,7 +7243,7 @@
     </p:spTree>
     <p:extLst>
       <p:ext uri="{BB962C8B-B14F-4D97-AF65-F5344CB8AC3E}">
-        <p14:creationId xmlns:p14="http://schemas.microsoft.com/office/powerpoint/2010/main" val="891150914"/>
+        <p14:creationId xmlns:p14="http://schemas.microsoft.com/office/powerpoint/2010/main" val="3326774658"/>
       </p:ext>
     </p:extLst>
   </p:cSld>
@@ -7274,7 +7291,15 @@
           <a:bodyPr/>
           <a:lstStyle/>
           <a:p>
-            <a:endParaRPr lang="en-US"/>
+            <a:r>
+              <a:rPr lang="en-US" dirty="0"/>
+              <a:t>Coding Exercise: a </a:t>
+            </a:r>
+            <a:r>
+              <a:rPr lang="en-US"/>
+              <a:t>Vector class</a:t>
+            </a:r>
+            <a:endParaRPr lang="en-US" dirty="0"/>
           </a:p>
         </p:txBody>
       </p:sp>
@@ -7303,7 +7328,7 @@
           <a:p>
             <a:r>
               <a:rPr lang="en-US" dirty="0"/>
-              <a:t>Peter Mackenzie-Helnwein</a:t>
+              <a:t>Frank McKenna</a:t>
             </a:r>
           </a:p>
         </p:txBody>
@@ -7333,7 +7358,7 @@
           <a:p>
             <a:r>
               <a:rPr lang="en-US" dirty="0"/>
-              <a:t>University of Washington</a:t>
+              <a:t>University of California at Berkeley</a:t>
             </a:r>
           </a:p>
         </p:txBody>
@@ -7341,7 +7366,7 @@
     </p:spTree>
     <p:extLst>
       <p:ext uri="{BB962C8B-B14F-4D97-AF65-F5344CB8AC3E}">
-        <p14:creationId xmlns:p14="http://schemas.microsoft.com/office/powerpoint/2010/main" val="1230198216"/>
+        <p14:creationId xmlns:p14="http://schemas.microsoft.com/office/powerpoint/2010/main" val="4264458214"/>
       </p:ext>
     </p:extLst>
   </p:cSld>
@@ -7389,7 +7414,7 @@
           <a:bodyPr/>
           <a:lstStyle/>
           <a:p>
-            <a:endParaRPr lang="en-US"/>
+            <a:endParaRPr lang="en-US" dirty="0"/>
           </a:p>
         </p:txBody>
       </p:sp>
@@ -7416,10 +7441,7 @@
           </a:bodyPr>
           <a:lstStyle/>
           <a:p>
-            <a:r>
-              <a:rPr lang="en-US" dirty="0"/>
-              <a:t>Peter Mackenzie-Helnwein</a:t>
-            </a:r>
+            <a:endParaRPr lang="en-US" dirty="0"/>
           </a:p>
         </p:txBody>
       </p:sp>
@@ -7448,7 +7470,7 @@
           <a:p>
             <a:r>
               <a:rPr lang="en-US" dirty="0"/>
-              <a:t>University of Washington</a:t>
+              <a:t>University of California at Berkeley</a:t>
             </a:r>
           </a:p>
         </p:txBody>
@@ -7456,7 +7478,7 @@
     </p:spTree>
     <p:extLst>
       <p:ext uri="{BB962C8B-B14F-4D97-AF65-F5344CB8AC3E}">
-        <p14:creationId xmlns:p14="http://schemas.microsoft.com/office/powerpoint/2010/main" val="4178150776"/>
+        <p14:creationId xmlns:p14="http://schemas.microsoft.com/office/powerpoint/2010/main" val="2222291941"/>
       </p:ext>
     </p:extLst>
   </p:cSld>

</xml_diff>

<commit_message>
Adding GUI, SimCenter Tools, and Closing Remarks to video list
</commit_message>
<xml_diff>
--- a/presentations/SimCenter Bootcamp Python.pptx
+++ b/presentations/SimCenter Bootcamp Python.pptx
@@ -44,7 +44,10 @@
     <p:sldId id="302" r:id="rId38"/>
     <p:sldId id="303" r:id="rId39"/>
     <p:sldId id="301" r:id="rId40"/>
-    <p:sldId id="257" r:id="rId41"/>
+    <p:sldId id="304" r:id="rId41"/>
+    <p:sldId id="306" r:id="rId42"/>
+    <p:sldId id="307" r:id="rId43"/>
+    <p:sldId id="257" r:id="rId44"/>
   </p:sldIdLst>
   <p:sldSz cx="12192000" cy="6858000"/>
   <p:notesSz cx="6858000" cy="9144000"/>
@@ -847,7 +850,7 @@
           <a:p>
             <a:fld id="{B84125C9-AED3-0F47-B44C-0465FAA4AF51}" type="datetimeFigureOut">
               <a:rPr lang="en-US" smtClean="0"/>
-              <a:t>8/19/20</a:t>
+              <a:t>8/21/20</a:t>
             </a:fld>
             <a:endParaRPr lang="en-US"/>
           </a:p>
@@ -1045,7 +1048,7 @@
           <a:p>
             <a:fld id="{B84125C9-AED3-0F47-B44C-0465FAA4AF51}" type="datetimeFigureOut">
               <a:rPr lang="en-US" smtClean="0"/>
-              <a:t>8/19/20</a:t>
+              <a:t>8/21/20</a:t>
             </a:fld>
             <a:endParaRPr lang="en-US"/>
           </a:p>
@@ -1253,7 +1256,7 @@
           <a:p>
             <a:fld id="{B84125C9-AED3-0F47-B44C-0465FAA4AF51}" type="datetimeFigureOut">
               <a:rPr lang="en-US" smtClean="0"/>
-              <a:t>8/19/20</a:t>
+              <a:t>8/21/20</a:t>
             </a:fld>
             <a:endParaRPr lang="en-US"/>
           </a:p>
@@ -1473,7 +1476,7 @@
           <a:p>
             <a:fld id="{B84125C9-AED3-0F47-B44C-0465FAA4AF51}" type="datetimeFigureOut">
               <a:rPr lang="en-US" smtClean="0"/>
-              <a:t>8/19/20</a:t>
+              <a:t>8/21/20</a:t>
             </a:fld>
             <a:endParaRPr lang="en-US"/>
           </a:p>
@@ -1671,7 +1674,7 @@
           <a:p>
             <a:fld id="{B84125C9-AED3-0F47-B44C-0465FAA4AF51}" type="datetimeFigureOut">
               <a:rPr lang="en-US" smtClean="0"/>
-              <a:t>8/19/20</a:t>
+              <a:t>8/21/20</a:t>
             </a:fld>
             <a:endParaRPr lang="en-US"/>
           </a:p>
@@ -1946,7 +1949,7 @@
           <a:p>
             <a:fld id="{B84125C9-AED3-0F47-B44C-0465FAA4AF51}" type="datetimeFigureOut">
               <a:rPr lang="en-US" smtClean="0"/>
-              <a:t>8/19/20</a:t>
+              <a:t>8/21/20</a:t>
             </a:fld>
             <a:endParaRPr lang="en-US"/>
           </a:p>
@@ -2211,7 +2214,7 @@
           <a:p>
             <a:fld id="{B84125C9-AED3-0F47-B44C-0465FAA4AF51}" type="datetimeFigureOut">
               <a:rPr lang="en-US" smtClean="0"/>
-              <a:t>8/19/20</a:t>
+              <a:t>8/21/20</a:t>
             </a:fld>
             <a:endParaRPr lang="en-US"/>
           </a:p>
@@ -2623,7 +2626,7 @@
           <a:p>
             <a:fld id="{B84125C9-AED3-0F47-B44C-0465FAA4AF51}" type="datetimeFigureOut">
               <a:rPr lang="en-US" smtClean="0"/>
-              <a:t>8/19/20</a:t>
+              <a:t>8/21/20</a:t>
             </a:fld>
             <a:endParaRPr lang="en-US"/>
           </a:p>
@@ -2764,7 +2767,7 @@
           <a:p>
             <a:fld id="{B84125C9-AED3-0F47-B44C-0465FAA4AF51}" type="datetimeFigureOut">
               <a:rPr lang="en-US" smtClean="0"/>
-              <a:t>8/19/20</a:t>
+              <a:t>8/21/20</a:t>
             </a:fld>
             <a:endParaRPr lang="en-US"/>
           </a:p>
@@ -2877,7 +2880,7 @@
           <a:p>
             <a:fld id="{B84125C9-AED3-0F47-B44C-0465FAA4AF51}" type="datetimeFigureOut">
               <a:rPr lang="en-US" smtClean="0"/>
-              <a:t>8/19/20</a:t>
+              <a:t>8/21/20</a:t>
             </a:fld>
             <a:endParaRPr lang="en-US"/>
           </a:p>
@@ -3188,7 +3191,7 @@
           <a:p>
             <a:fld id="{B84125C9-AED3-0F47-B44C-0465FAA4AF51}" type="datetimeFigureOut">
               <a:rPr lang="en-US" smtClean="0"/>
-              <a:t>8/19/20</a:t>
+              <a:t>8/21/20</a:t>
             </a:fld>
             <a:endParaRPr lang="en-US"/>
           </a:p>
@@ -3429,7 +3432,7 @@
           <a:p>
             <a:fld id="{B84125C9-AED3-0F47-B44C-0465FAA4AF51}" type="datetimeFigureOut">
               <a:rPr lang="en-US" smtClean="0"/>
-              <a:t>8/19/20</a:t>
+              <a:t>8/21/20</a:t>
             </a:fld>
             <a:endParaRPr lang="en-US"/>
           </a:p>
@@ -8053,6 +8056,370 @@
       </p:grpSpPr>
       <p:sp>
         <p:nvSpPr>
+          <p:cNvPr id="7" name="Subtitle 6">
+            <a:extLst>
+              <a:ext uri="{FF2B5EF4-FFF2-40B4-BE49-F238E27FC236}">
+                <a16:creationId xmlns:a16="http://schemas.microsoft.com/office/drawing/2014/main" id="{B21F99FE-2B30-814C-BB06-2595F16BD124}"/>
+              </a:ext>
+            </a:extLst>
+          </p:cNvPr>
+          <p:cNvSpPr>
+            <a:spLocks noGrp="1"/>
+          </p:cNvSpPr>
+          <p:nvPr>
+            <p:ph type="subTitle" idx="1"/>
+          </p:nvPr>
+        </p:nvSpPr>
+        <p:spPr/>
+        <p:txBody>
+          <a:bodyPr/>
+          <a:lstStyle/>
+          <a:p>
+            <a:r>
+              <a:rPr lang="en-US" dirty="0"/>
+              <a:t>Intro to Graphical User Interfaces (GUI)</a:t>
+            </a:r>
+          </a:p>
+        </p:txBody>
+      </p:sp>
+      <p:sp>
+        <p:nvSpPr>
+          <p:cNvPr id="5" name="Text Placeholder 4">
+            <a:extLst>
+              <a:ext uri="{FF2B5EF4-FFF2-40B4-BE49-F238E27FC236}">
+                <a16:creationId xmlns:a16="http://schemas.microsoft.com/office/drawing/2014/main" id="{F828C3F3-D358-8D4F-BAC9-9043145A88D1}"/>
+              </a:ext>
+            </a:extLst>
+          </p:cNvPr>
+          <p:cNvSpPr>
+            <a:spLocks noGrp="1"/>
+          </p:cNvSpPr>
+          <p:nvPr>
+            <p:ph type="body" sz="quarter" idx="11"/>
+          </p:nvPr>
+        </p:nvSpPr>
+        <p:spPr/>
+        <p:txBody>
+          <a:bodyPr>
+            <a:normAutofit lnSpcReduction="10000"/>
+          </a:bodyPr>
+          <a:lstStyle/>
+          <a:p>
+            <a:r>
+              <a:rPr lang="en-US" dirty="0"/>
+              <a:t>Peter Mackenzie-Helnwein</a:t>
+            </a:r>
+          </a:p>
+        </p:txBody>
+      </p:sp>
+      <p:sp>
+        <p:nvSpPr>
+          <p:cNvPr id="6" name="Text Placeholder 5">
+            <a:extLst>
+              <a:ext uri="{FF2B5EF4-FFF2-40B4-BE49-F238E27FC236}">
+                <a16:creationId xmlns:a16="http://schemas.microsoft.com/office/drawing/2014/main" id="{860E1C64-9002-3948-A97E-48870344E6E7}"/>
+              </a:ext>
+            </a:extLst>
+          </p:cNvPr>
+          <p:cNvSpPr>
+            <a:spLocks noGrp="1"/>
+          </p:cNvSpPr>
+          <p:nvPr>
+            <p:ph type="body" sz="quarter" idx="12"/>
+          </p:nvPr>
+        </p:nvSpPr>
+        <p:spPr/>
+        <p:txBody>
+          <a:bodyPr>
+            <a:normAutofit fontScale="92500" lnSpcReduction="20000"/>
+          </a:bodyPr>
+          <a:lstStyle/>
+          <a:p>
+            <a:r>
+              <a:rPr lang="en-US" dirty="0"/>
+              <a:t>University of Washington</a:t>
+            </a:r>
+          </a:p>
+        </p:txBody>
+      </p:sp>
+    </p:spTree>
+    <p:extLst>
+      <p:ext uri="{BB962C8B-B14F-4D97-AF65-F5344CB8AC3E}">
+        <p14:creationId xmlns:p14="http://schemas.microsoft.com/office/powerpoint/2010/main" val="360970698"/>
+      </p:ext>
+    </p:extLst>
+  </p:cSld>
+  <p:clrMapOvr>
+    <a:masterClrMapping/>
+  </p:clrMapOvr>
+</p:sld>
+</file>
+
+<file path=ppt/slides/slide41.xml><?xml version="1.0" encoding="utf-8"?>
+<p:sld xmlns:a="http://schemas.openxmlformats.org/drawingml/2006/main" xmlns:r="http://schemas.openxmlformats.org/officeDocument/2006/relationships" xmlns:p="http://schemas.openxmlformats.org/presentationml/2006/main">
+  <p:cSld>
+    <p:spTree>
+      <p:nvGrpSpPr>
+        <p:cNvPr id="1" name=""/>
+        <p:cNvGrpSpPr/>
+        <p:nvPr/>
+      </p:nvGrpSpPr>
+      <p:grpSpPr>
+        <a:xfrm>
+          <a:off x="0" y="0"/>
+          <a:ext cx="0" cy="0"/>
+          <a:chOff x="0" y="0"/>
+          <a:chExt cx="0" cy="0"/>
+        </a:xfrm>
+      </p:grpSpPr>
+      <p:sp>
+        <p:nvSpPr>
+          <p:cNvPr id="7" name="Subtitle 6">
+            <a:extLst>
+              <a:ext uri="{FF2B5EF4-FFF2-40B4-BE49-F238E27FC236}">
+                <a16:creationId xmlns:a16="http://schemas.microsoft.com/office/drawing/2014/main" id="{B21F99FE-2B30-814C-BB06-2595F16BD124}"/>
+              </a:ext>
+            </a:extLst>
+          </p:cNvPr>
+          <p:cNvSpPr>
+            <a:spLocks noGrp="1"/>
+          </p:cNvSpPr>
+          <p:nvPr>
+            <p:ph type="subTitle" idx="1"/>
+          </p:nvPr>
+        </p:nvSpPr>
+        <p:spPr/>
+        <p:txBody>
+          <a:bodyPr/>
+          <a:lstStyle/>
+          <a:p>
+            <a:r>
+              <a:rPr lang="en-US" dirty="0"/>
+              <a:t>Application Examples: </a:t>
+            </a:r>
+            <a:r>
+              <a:rPr lang="en-US" dirty="0" err="1"/>
+              <a:t>SimCenter</a:t>
+            </a:r>
+            <a:r>
+              <a:rPr lang="en-US"/>
+              <a:t> Tools</a:t>
+            </a:r>
+            <a:endParaRPr lang="en-US" dirty="0"/>
+          </a:p>
+        </p:txBody>
+      </p:sp>
+      <p:sp>
+        <p:nvSpPr>
+          <p:cNvPr id="5" name="Text Placeholder 4">
+            <a:extLst>
+              <a:ext uri="{FF2B5EF4-FFF2-40B4-BE49-F238E27FC236}">
+                <a16:creationId xmlns:a16="http://schemas.microsoft.com/office/drawing/2014/main" id="{F828C3F3-D358-8D4F-BAC9-9043145A88D1}"/>
+              </a:ext>
+            </a:extLst>
+          </p:cNvPr>
+          <p:cNvSpPr>
+            <a:spLocks noGrp="1"/>
+          </p:cNvSpPr>
+          <p:nvPr>
+            <p:ph type="body" sz="quarter" idx="11"/>
+          </p:nvPr>
+        </p:nvSpPr>
+        <p:spPr/>
+        <p:txBody>
+          <a:bodyPr>
+            <a:normAutofit lnSpcReduction="10000"/>
+          </a:bodyPr>
+          <a:lstStyle/>
+          <a:p>
+            <a:r>
+              <a:rPr lang="en-US" dirty="0"/>
+              <a:t>Frank McKenna</a:t>
+            </a:r>
+          </a:p>
+        </p:txBody>
+      </p:sp>
+      <p:sp>
+        <p:nvSpPr>
+          <p:cNvPr id="6" name="Text Placeholder 5">
+            <a:extLst>
+              <a:ext uri="{FF2B5EF4-FFF2-40B4-BE49-F238E27FC236}">
+                <a16:creationId xmlns:a16="http://schemas.microsoft.com/office/drawing/2014/main" id="{860E1C64-9002-3948-A97E-48870344E6E7}"/>
+              </a:ext>
+            </a:extLst>
+          </p:cNvPr>
+          <p:cNvSpPr>
+            <a:spLocks noGrp="1"/>
+          </p:cNvSpPr>
+          <p:nvPr>
+            <p:ph type="body" sz="quarter" idx="12"/>
+          </p:nvPr>
+        </p:nvSpPr>
+        <p:spPr/>
+        <p:txBody>
+          <a:bodyPr>
+            <a:normAutofit fontScale="92500" lnSpcReduction="20000"/>
+          </a:bodyPr>
+          <a:lstStyle/>
+          <a:p>
+            <a:r>
+              <a:rPr lang="en-US" dirty="0"/>
+              <a:t>University of California at Berkeley</a:t>
+            </a:r>
+          </a:p>
+        </p:txBody>
+      </p:sp>
+    </p:spTree>
+    <p:extLst>
+      <p:ext uri="{BB962C8B-B14F-4D97-AF65-F5344CB8AC3E}">
+        <p14:creationId xmlns:p14="http://schemas.microsoft.com/office/powerpoint/2010/main" val="2397171243"/>
+      </p:ext>
+    </p:extLst>
+  </p:cSld>
+  <p:clrMapOvr>
+    <a:masterClrMapping/>
+  </p:clrMapOvr>
+</p:sld>
+</file>
+
+<file path=ppt/slides/slide42.xml><?xml version="1.0" encoding="utf-8"?>
+<p:sld xmlns:a="http://schemas.openxmlformats.org/drawingml/2006/main" xmlns:r="http://schemas.openxmlformats.org/officeDocument/2006/relationships" xmlns:p="http://schemas.openxmlformats.org/presentationml/2006/main">
+  <p:cSld>
+    <p:spTree>
+      <p:nvGrpSpPr>
+        <p:cNvPr id="1" name=""/>
+        <p:cNvGrpSpPr/>
+        <p:nvPr/>
+      </p:nvGrpSpPr>
+      <p:grpSpPr>
+        <a:xfrm>
+          <a:off x="0" y="0"/>
+          <a:ext cx="0" cy="0"/>
+          <a:chOff x="0" y="0"/>
+          <a:chExt cx="0" cy="0"/>
+        </a:xfrm>
+      </p:grpSpPr>
+      <p:sp>
+        <p:nvSpPr>
+          <p:cNvPr id="7" name="Subtitle 6">
+            <a:extLst>
+              <a:ext uri="{FF2B5EF4-FFF2-40B4-BE49-F238E27FC236}">
+                <a16:creationId xmlns:a16="http://schemas.microsoft.com/office/drawing/2014/main" id="{B21F99FE-2B30-814C-BB06-2595F16BD124}"/>
+              </a:ext>
+            </a:extLst>
+          </p:cNvPr>
+          <p:cNvSpPr>
+            <a:spLocks noGrp="1"/>
+          </p:cNvSpPr>
+          <p:nvPr>
+            <p:ph type="subTitle" idx="1"/>
+          </p:nvPr>
+        </p:nvSpPr>
+        <p:spPr/>
+        <p:txBody>
+          <a:bodyPr/>
+          <a:lstStyle/>
+          <a:p>
+            <a:r>
+              <a:rPr lang="en-US"/>
+              <a:t>Closing Remarks</a:t>
+            </a:r>
+            <a:endParaRPr lang="en-US" dirty="0"/>
+          </a:p>
+        </p:txBody>
+      </p:sp>
+      <p:sp>
+        <p:nvSpPr>
+          <p:cNvPr id="5" name="Text Placeholder 4">
+            <a:extLst>
+              <a:ext uri="{FF2B5EF4-FFF2-40B4-BE49-F238E27FC236}">
+                <a16:creationId xmlns:a16="http://schemas.microsoft.com/office/drawing/2014/main" id="{F828C3F3-D358-8D4F-BAC9-9043145A88D1}"/>
+              </a:ext>
+            </a:extLst>
+          </p:cNvPr>
+          <p:cNvSpPr>
+            <a:spLocks noGrp="1"/>
+          </p:cNvSpPr>
+          <p:nvPr>
+            <p:ph type="body" sz="quarter" idx="11"/>
+          </p:nvPr>
+        </p:nvSpPr>
+        <p:spPr/>
+        <p:txBody>
+          <a:bodyPr>
+            <a:normAutofit lnSpcReduction="10000"/>
+          </a:bodyPr>
+          <a:lstStyle/>
+          <a:p>
+            <a:r>
+              <a:rPr lang="en-US" dirty="0"/>
+              <a:t>Frank McKenna</a:t>
+            </a:r>
+          </a:p>
+        </p:txBody>
+      </p:sp>
+      <p:sp>
+        <p:nvSpPr>
+          <p:cNvPr id="6" name="Text Placeholder 5">
+            <a:extLst>
+              <a:ext uri="{FF2B5EF4-FFF2-40B4-BE49-F238E27FC236}">
+                <a16:creationId xmlns:a16="http://schemas.microsoft.com/office/drawing/2014/main" id="{860E1C64-9002-3948-A97E-48870344E6E7}"/>
+              </a:ext>
+            </a:extLst>
+          </p:cNvPr>
+          <p:cNvSpPr>
+            <a:spLocks noGrp="1"/>
+          </p:cNvSpPr>
+          <p:nvPr>
+            <p:ph type="body" sz="quarter" idx="12"/>
+          </p:nvPr>
+        </p:nvSpPr>
+        <p:spPr/>
+        <p:txBody>
+          <a:bodyPr>
+            <a:normAutofit fontScale="92500" lnSpcReduction="20000"/>
+          </a:bodyPr>
+          <a:lstStyle/>
+          <a:p>
+            <a:r>
+              <a:rPr lang="en-US" dirty="0"/>
+              <a:t>University of California at Berkeley</a:t>
+            </a:r>
+          </a:p>
+        </p:txBody>
+      </p:sp>
+    </p:spTree>
+    <p:extLst>
+      <p:ext uri="{BB962C8B-B14F-4D97-AF65-F5344CB8AC3E}">
+        <p14:creationId xmlns:p14="http://schemas.microsoft.com/office/powerpoint/2010/main" val="1483014488"/>
+      </p:ext>
+    </p:extLst>
+  </p:cSld>
+  <p:clrMapOvr>
+    <a:masterClrMapping/>
+  </p:clrMapOvr>
+</p:sld>
+</file>
+
+<file path=ppt/slides/slide43.xml><?xml version="1.0" encoding="utf-8"?>
+<p:sld xmlns:a="http://schemas.openxmlformats.org/drawingml/2006/main" xmlns:r="http://schemas.openxmlformats.org/officeDocument/2006/relationships" xmlns:p="http://schemas.openxmlformats.org/presentationml/2006/main">
+  <p:cSld>
+    <p:spTree>
+      <p:nvGrpSpPr>
+        <p:cNvPr id="1" name=""/>
+        <p:cNvGrpSpPr/>
+        <p:nvPr/>
+      </p:nvGrpSpPr>
+      <p:grpSpPr>
+        <a:xfrm>
+          <a:off x="0" y="0"/>
+          <a:ext cx="0" cy="0"/>
+          <a:chOff x="0" y="0"/>
+          <a:chExt cx="0" cy="0"/>
+        </a:xfrm>
+      </p:grpSpPr>
+      <p:sp>
+        <p:nvSpPr>
           <p:cNvPr id="2" name="Title 1">
             <a:extLst>
               <a:ext uri="{FF2B5EF4-FFF2-40B4-BE49-F238E27FC236}">

</xml_diff>